<commit_message>
docs: Improve PowerPoint presentation layout
- Create presentation-optimized markdown (quickguide-slides.md)
- Better slide pagination with explicit breaks
- Reduced content per slide for readability
- Improved text sizing for display
- Split complex content across multiple slides
</commit_message>
<xml_diff>
--- a/chapter-01/quickguide.pptx
+++ b/chapter-01/quickguide.pptx
@@ -19,6 +19,21 @@
     <p:sldId id="267" r:id="rId13"/>
     <p:sldId id="268" r:id="rId14"/>
     <p:sldId id="269" r:id="rId15"/>
+    <p:sldId id="270" r:id="rId16"/>
+    <p:sldId id="271" r:id="rId17"/>
+    <p:sldId id="272" r:id="rId18"/>
+    <p:sldId id="273" r:id="rId19"/>
+    <p:sldId id="274" r:id="rId20"/>
+    <p:sldId id="275" r:id="rId21"/>
+    <p:sldId id="276" r:id="rId22"/>
+    <p:sldId id="277" r:id="rId23"/>
+    <p:sldId id="278" r:id="rId24"/>
+    <p:sldId id="279" r:id="rId25"/>
+    <p:sldId id="280" r:id="rId26"/>
+    <p:sldId id="281" r:id="rId27"/>
+    <p:sldId id="282" r:id="rId28"/>
+    <p:sldId id="283" r:id="rId29"/>
+    <p:sldId id="284" r:id="rId30"/>
   </p:sldIdLst>
   <p:sldSz cx="9144000" cy="5143500" type="screen16x9"/>
   <p:notesSz cx="6858000" cy="9144000"/>
@@ -3110,10 +3125,15 @@
             <a:spLocks noGrp="1"/>
           </p:cNvSpPr>
           <p:nvPr>
-            <p:ph type="title"/>
-          </p:nvPr>
-        </p:nvSpPr>
-        <p:spPr/>
+            <p:ph type="ctrTitle"/>
+          </p:nvPr>
+        </p:nvSpPr>
+        <p:spPr>
+          <a:xfrm>
+            <a:off x="685800" y="1597819"/>
+            <a:ext cx="7772400" cy="1102519"/>
+          </a:xfrm>
+        </p:spPr>
         <p:txBody>
           <a:bodyPr/>
           <a:lstStyle/>
@@ -3123,22 +3143,27 @@
             </a:pPr>
             <a:r>
               <a:rPr/>
-              <a:t>REST APIとMCP - 5分でわかる比較ガイド</a:t>
-            </a:r>
-          </a:p>
-        </p:txBody>
-      </p:sp>
-      <p:sp>
-        <p:nvSpPr>
-          <p:cNvPr id="3" name="Content Placeholder 2"/>
-          <p:cNvSpPr>
-            <a:spLocks noGrp="1"/>
-          </p:cNvSpPr>
-          <p:nvPr>
-            <p:ph idx="1"/>
-          </p:nvPr>
-        </p:nvSpPr>
-        <p:spPr/>
+              <a:t>REST APIとMCP</a:t>
+            </a:r>
+          </a:p>
+        </p:txBody>
+      </p:sp>
+      <p:sp>
+        <p:nvSpPr>
+          <p:cNvPr id="3" name="Subtitle 2"/>
+          <p:cNvSpPr>
+            <a:spLocks noGrp="1"/>
+          </p:cNvSpPr>
+          <p:nvPr>
+            <p:ph idx="1" type="subTitle"/>
+          </p:nvPr>
+        </p:nvSpPr>
+        <p:spPr>
+          <a:xfrm>
+            <a:off x="1371600" y="2914650"/>
+            <a:ext cx="6400800" cy="1314450"/>
+          </a:xfrm>
+        </p:spPr>
         <p:txBody>
           <a:bodyPr/>
           <a:lstStyle/>
@@ -3147,25 +3172,33 @@
               <a:buNone/>
             </a:pPr>
             <a:r>
-              <a:rPr b="1"/>
-              <a:t>対象:</a:t>
-            </a:r>
-            <a:r>
-              <a:rPr/>
-              <a:t> 非エンジニアのビジネスユーザー、企画担当者、マネージャー</a:t>
-            </a:r>
-          </a:p>
+              <a:rPr/>
+              <a:t>5分でわかる比較ガイド</a:t>
+            </a:r>
+          </a:p>
+        </p:txBody>
+      </p:sp>
+      <p:sp>
+        <p:nvSpPr>
+          <p:cNvPr id="4" name="Date Placeholder 3"/>
+          <p:cNvSpPr>
+            <a:spLocks noGrp="1"/>
+          </p:cNvSpPr>
+          <p:nvPr>
+            <p:ph idx="10" sz="half" type="dt"/>
+          </p:nvPr>
+        </p:nvSpPr>
+        <p:spPr/>
+        <p:txBody>
+          <a:bodyPr/>
+          <a:lstStyle/>
           <a:p>
             <a:pPr lvl="0" indent="0" marL="0">
               <a:buNone/>
             </a:pPr>
             <a:r>
-              <a:rPr b="1"/>
-              <a:t>読了時間:</a:t>
-            </a:r>
-            <a:r>
-              <a:rPr/>
-              <a:t> 5分</a:t>
+              <a:rPr/>
+              <a:t>2025年12月</a:t>
             </a:r>
           </a:p>
         </p:txBody>
@@ -3194,12 +3227,12 @@
       </p:grpSpPr>
       <p:sp>
         <p:nvSpPr>
-          <p:cNvPr id="3" name="Content Placeholder 2"/>
-          <p:cNvSpPr>
-            <a:spLocks noGrp="1"/>
-          </p:cNvSpPr>
-          <p:nvPr>
-            <p:ph idx="1"/>
+          <p:cNvPr id="2" name="Title 1"/>
+          <p:cNvSpPr>
+            <a:spLocks noGrp="1"/>
+          </p:cNvSpPr>
+          <p:nvPr>
+            <p:ph type="title"/>
           </p:nvPr>
         </p:nvSpPr>
         <p:spPr/>
@@ -3208,53 +3241,11 @@
           <a:lstStyle/>
           <a:p>
             <a:pPr lvl="0" indent="0" marL="0">
-              <a:spcBef>
-                <a:spcPts val="3000"/>
-              </a:spcBef>
-              <a:buNone/>
-            </a:pPr>
-            <a:r>
-              <a:rPr b="1"/>
-              <a:t>🤝 併用も可能</a:t>
-            </a:r>
-          </a:p>
-          <a:p>
-            <a:pPr lvl="0" indent="0" marL="0">
-              <a:buNone/>
-            </a:pPr>
-            <a:r>
-              <a:rPr b="1"/>
-              <a:t>重要:</a:t>
-            </a:r>
-            <a:r>
-              <a:rPr/>
-              <a:t> REST API と MCP は対立するものではありません。</a:t>
-            </a:r>
-          </a:p>
-          <a:p>
-            <a:pPr lvl="0" indent="0">
-              <a:buNone/>
-            </a:pPr>
-            <a:r>
-              <a:rPr>
-                <a:latin typeface="Courier"/>
-              </a:rPr>
-              <a:t>外部向けAPI → REST API
-     +
-AI連携機能 → MCP</a:t>
-            </a:r>
-          </a:p>
-          <a:p>
-            <a:pPr lvl="0" indent="0" marL="0">
-              <a:buNone/>
-            </a:pPr>
-            <a:r>
-              <a:rPr b="1"/>
-              <a:t>実際の例:</a:t>
-            </a:r>
-            <a:r>
-              <a:rPr/>
-              <a:t> - 一般ユーザー向け: REST API - Claude などのAIアシスタント向け: MCP - 両方を提供することで、幅広いユーザーに対応</a:t>
+              <a:buNone/>
+            </a:pPr>
+            <a:r>
+              <a:rPr/>
+              <a:t>🎯 ビジネス価値の比較</a:t>
             </a:r>
           </a:p>
         </p:txBody>
@@ -3283,12 +3274,12 @@
       </p:grpSpPr>
       <p:sp>
         <p:nvSpPr>
-          <p:cNvPr id="3" name="Content Placeholder 2"/>
-          <p:cNvSpPr>
-            <a:spLocks noGrp="1"/>
-          </p:cNvSpPr>
-          <p:nvPr>
-            <p:ph idx="1"/>
+          <p:cNvPr id="2" name="Title 1"/>
+          <p:cNvSpPr>
+            <a:spLocks noGrp="1"/>
+          </p:cNvSpPr>
+          <p:nvPr>
+            <p:ph type="title"/>
           </p:nvPr>
         </p:nvSpPr>
         <p:spPr/>
@@ -3297,1020 +3288,11 @@
           <a:lstStyle/>
           <a:p>
             <a:pPr lvl="0" indent="0" marL="0">
-              <a:spcBef>
-                <a:spcPts val="3000"/>
-              </a:spcBef>
-              <a:buNone/>
-            </a:pPr>
-            <a:r>
-              <a:rPr b="1"/>
-              <a:t>✅ まとめ: 5つのポイント</a:t>
-            </a:r>
-          </a:p>
-          <a:p>
-            <a:pPr lvl="0" indent="0" marL="0">
-              <a:spcBef>
-                <a:spcPts val="3000"/>
-              </a:spcBef>
-              <a:buNone/>
-            </a:pPr>
-            <a:r>
-              <a:rPr b="1"/>
-              <a:t>1. 自己説明性</a:t>
-            </a:r>
-          </a:p>
-          <a:p>
-            <a:pPr lvl="0"/>
-            <a:r>
-              <a:rPr b="1"/>
-              <a:t>REST API:</a:t>
-            </a:r>
-            <a:r>
-              <a:rPr/>
-              <a:t> ドキュメントを読む必要がある</a:t>
-            </a:r>
-          </a:p>
-          <a:p>
-            <a:pPr lvl="0"/>
-            <a:r>
-              <a:rPr b="1"/>
-              <a:t>MCP:</a:t>
-            </a:r>
-            <a:r>
-              <a:rPr/>
-              <a:t> システムが「何ができるか」を自動で説明</a:t>
-            </a:r>
-          </a:p>
-          <a:p>
-            <a:pPr lvl="0" indent="0" marL="0">
-              <a:spcBef>
-                <a:spcPts val="3000"/>
-              </a:spcBef>
-              <a:buNone/>
-            </a:pPr>
-            <a:r>
-              <a:rPr b="1"/>
-              <a:t>2. AI対応</a:t>
-            </a:r>
-          </a:p>
-          <a:p>
-            <a:pPr lvl="0"/>
-            <a:r>
-              <a:rPr b="1"/>
-              <a:t>REST API:</a:t>
-            </a:r>
-            <a:r>
-              <a:rPr/>
-              <a:t> AIに使わせるには追加設定が必要</a:t>
-            </a:r>
-          </a:p>
-          <a:p>
-            <a:pPr lvl="0"/>
-            <a:r>
-              <a:rPr b="1"/>
-              <a:t>MCP:</a:t>
-            </a:r>
-            <a:r>
-              <a:rPr/>
-              <a:t> AIがそのまま理解して使える</a:t>
-            </a:r>
-          </a:p>
-          <a:p>
-            <a:pPr lvl="0" indent="0" marL="0">
-              <a:spcBef>
-                <a:spcPts val="3000"/>
-              </a:spcBef>
-              <a:buNone/>
-            </a:pPr>
-            <a:r>
-              <a:rPr b="1"/>
-              <a:t>3. 変更への対応</a:t>
-            </a:r>
-          </a:p>
-          <a:p>
-            <a:pPr lvl="0"/>
-            <a:r>
-              <a:rPr b="1"/>
-              <a:t>REST API:</a:t>
-            </a:r>
-            <a:r>
-              <a:rPr/>
-              <a:t> 変更時にドキュメントも更新が必要</a:t>
-            </a:r>
-          </a:p>
-          <a:p>
-            <a:pPr lvl="0"/>
-            <a:r>
-              <a:rPr b="1"/>
-              <a:t>MCP:</a:t>
-            </a:r>
-            <a:r>
-              <a:rPr/>
-              <a:t> システムが自動で最新情報を提供</a:t>
-            </a:r>
-          </a:p>
-          <a:p>
-            <a:pPr lvl="0" indent="0" marL="0">
-              <a:spcBef>
-                <a:spcPts val="3000"/>
-              </a:spcBef>
-              <a:buNone/>
-            </a:pPr>
-            <a:r>
-              <a:rPr b="1"/>
-              <a:t>4. 使い分け</a:t>
-            </a:r>
-          </a:p>
-          <a:p>
-            <a:pPr lvl="0"/>
-            <a:r>
-              <a:rPr b="1"/>
-              <a:t>REST API:</a:t>
-            </a:r>
-            <a:r>
-              <a:rPr/>
-              <a:t> 一般的なWebサービス、外部公開API</a:t>
-            </a:r>
-          </a:p>
-          <a:p>
-            <a:pPr lvl="0"/>
-            <a:r>
-              <a:rPr b="1"/>
-              <a:t>MCP:</a:t>
-            </a:r>
-            <a:r>
-              <a:rPr/>
-              <a:t> AI連携、社内ツール、エージェントシステム</a:t>
-            </a:r>
-          </a:p>
-          <a:p>
-            <a:pPr lvl="0" indent="0" marL="0">
-              <a:spcBef>
-                <a:spcPts val="3000"/>
-              </a:spcBef>
-              <a:buNone/>
-            </a:pPr>
-            <a:r>
-              <a:rPr b="1"/>
-              <a:t>5. 将来性</a:t>
-            </a:r>
-          </a:p>
-          <a:p>
-            <a:pPr lvl="0"/>
-            <a:r>
-              <a:rPr b="1"/>
-              <a:t>REST API:</a:t>
-            </a:r>
-            <a:r>
-              <a:rPr/>
-              <a:t> 実績豊富で安定</a:t>
-            </a:r>
-          </a:p>
-          <a:p>
-            <a:pPr lvl="0"/>
-            <a:r>
-              <a:rPr b="1"/>
-              <a:t>MCP:</a:t>
-            </a:r>
-            <a:r>
-              <a:rPr/>
-              <a:t> AI時代の新しい標準として期待</a:t>
-            </a:r>
-          </a:p>
-        </p:txBody>
-      </p:sp>
-    </p:spTree>
-  </p:cSld>
-</p:sld>
-</file>
-
-<file path=ppt/slides/slide12.xml><?xml version="1.0" encoding="utf-8"?>
-<p:sld xmlns:a="http://schemas.openxmlformats.org/drawingml/2006/main" xmlns:r="http://schemas.openxmlformats.org/officeDocument/2006/relationships" xmlns:p="http://schemas.openxmlformats.org/presentationml/2006/main">
-  <p:cSld>
-    <p:spTree>
-      <p:nvGrpSpPr>
-        <p:cNvPr id="1" name=""/>
-        <p:cNvGrpSpPr/>
-        <p:nvPr/>
-      </p:nvGrpSpPr>
-      <p:grpSpPr>
-        <a:xfrm>
-          <a:off x="0" y="0"/>
-          <a:ext cx="0" cy="0"/>
-          <a:chOff x="0" y="0"/>
-          <a:chExt cx="0" cy="0"/>
-        </a:xfrm>
-      </p:grpSpPr>
-      <p:sp>
-        <p:nvSpPr>
-          <p:cNvPr id="3" name="Content Placeholder 2"/>
-          <p:cNvSpPr>
-            <a:spLocks noGrp="1"/>
-          </p:cNvSpPr>
-          <p:nvPr>
-            <p:ph idx="1"/>
-          </p:nvPr>
-        </p:nvSpPr>
-        <p:spPr/>
-        <p:txBody>
-          <a:bodyPr/>
-          <a:lstStyle/>
-          <a:p>
-            <a:pPr lvl="0" indent="0" marL="0">
-              <a:spcBef>
-                <a:spcPts val="3000"/>
-              </a:spcBef>
-              <a:buNone/>
-            </a:pPr>
-            <a:r>
-              <a:rPr b="1"/>
-              <a:t>🎓 Next Steps</a:t>
-            </a:r>
-          </a:p>
-          <a:p>
-            <a:pPr lvl="0" indent="0" marL="0">
-              <a:spcBef>
-                <a:spcPts val="3000"/>
-              </a:spcBef>
-              <a:buNone/>
-            </a:pPr>
-            <a:r>
-              <a:rPr b="1"/>
-              <a:t>興味を持たれた方へ</a:t>
-            </a:r>
-          </a:p>
-          <a:p>
-            <a:pPr lvl="0" indent="-342900" marL="342900">
-              <a:buAutoNum type="arabicPeriod"/>
-            </a:pPr>
-            <a:r>
-              <a:rPr b="1"/>
-              <a:t>体験してみる</a:t>
-            </a:r>
-          </a:p>
-          <a:p>
-            <a:pPr lvl="1"/>
-            <a:r>
-              <a:rPr/>
-              <a:t>このフォルダの </a:t>
-            </a:r>
-            <a:r>
-              <a:rPr>
-                <a:latin typeface="Courier"/>
-              </a:rPr>
-              <a:t>guide.md</a:t>
-            </a:r>
-            <a:r>
-              <a:rPr/>
-              <a:t> で実際に動かせます</a:t>
-            </a:r>
-          </a:p>
-          <a:p>
-            <a:pPr lvl="1"/>
-            <a:r>
-              <a:rPr/>
-              <a:t>エンジニアと一緒に5分試すだけで実感できます</a:t>
-            </a:r>
-          </a:p>
-          <a:p>
-            <a:pPr lvl="0" indent="-342900" marL="342900">
-              <a:buAutoNum type="arabicPeriod"/>
-            </a:pPr>
-            <a:r>
-              <a:rPr b="1"/>
-              <a:t>ビジネス検討</a:t>
-            </a:r>
-          </a:p>
-          <a:p>
-            <a:pPr lvl="1"/>
-            <a:r>
-              <a:rPr/>
-              <a:t>自社のAI活用戦略にMCPが合うか検討</a:t>
-            </a:r>
-          </a:p>
-          <a:p>
-            <a:pPr lvl="1"/>
-            <a:r>
-              <a:rPr/>
-              <a:t>パイロットプロジェクトの企画</a:t>
-            </a:r>
-          </a:p>
-          <a:p>
-            <a:pPr lvl="0" indent="-342900" marL="342900">
-              <a:buAutoNum type="arabicPeriod"/>
-            </a:pPr>
-            <a:r>
-              <a:rPr b="1"/>
-              <a:t>詳細を学ぶ</a:t>
-            </a:r>
-          </a:p>
-          <a:p>
-            <a:pPr lvl="1"/>
-            <a:r>
-              <a:rPr/>
-              <a:t>技術詳細は </a:t>
-            </a:r>
-            <a:r>
-              <a:rPr>
-                <a:latin typeface="Courier"/>
-              </a:rPr>
-              <a:t>guide.md</a:t>
-            </a:r>
-            <a:r>
-              <a:rPr/>
-              <a:t> を参照</a:t>
-            </a:r>
-          </a:p>
-          <a:p>
-            <a:pPr lvl="1"/>
-            <a:r>
-              <a:rPr/>
-              <a:t>エンジニアチームと相談</a:t>
-            </a:r>
-          </a:p>
-        </p:txBody>
-      </p:sp>
-    </p:spTree>
-  </p:cSld>
-</p:sld>
-</file>
-
-<file path=ppt/slides/slide13.xml><?xml version="1.0" encoding="utf-8"?>
-<p:sld xmlns:a="http://schemas.openxmlformats.org/drawingml/2006/main" xmlns:r="http://schemas.openxmlformats.org/officeDocument/2006/relationships" xmlns:p="http://schemas.openxmlformats.org/presentationml/2006/main">
-  <p:cSld>
-    <p:spTree>
-      <p:nvGrpSpPr>
-        <p:cNvPr id="1" name=""/>
-        <p:cNvGrpSpPr/>
-        <p:nvPr/>
-      </p:nvGrpSpPr>
-      <p:grpSpPr>
-        <a:xfrm>
-          <a:off x="0" y="0"/>
-          <a:ext cx="0" cy="0"/>
-          <a:chOff x="0" y="0"/>
-          <a:chExt cx="0" cy="0"/>
-        </a:xfrm>
-      </p:grpSpPr>
-      <p:sp>
-        <p:nvSpPr>
-          <p:cNvPr id="3" name="Content Placeholder 2"/>
-          <p:cNvSpPr>
-            <a:spLocks noGrp="1"/>
-          </p:cNvSpPr>
-          <p:nvPr>
-            <p:ph idx="1"/>
-          </p:nvPr>
-        </p:nvSpPr>
-        <p:spPr/>
-        <p:txBody>
-          <a:bodyPr/>
-          <a:lstStyle/>
-          <a:p>
-            <a:pPr lvl="0" indent="0" marL="0">
-              <a:spcBef>
-                <a:spcPts val="3000"/>
-              </a:spcBef>
-              <a:buNone/>
-            </a:pPr>
-            <a:r>
-              <a:rPr b="1"/>
-              <a:t>📞 よくある質問</a:t>
-            </a:r>
-          </a:p>
-          <a:p>
-            <a:pPr lvl="0" indent="0" marL="0">
-              <a:buNone/>
-            </a:pPr>
-            <a:r>
-              <a:rPr b="1"/>
-              <a:t>Q: REST APIを使っていますが、MCPに移行すべき？</a:t>
-            </a:r>
-            <a:br/>
-            <a:r>
-              <a:rPr/>
-              <a:t>A: いいえ、必ずしもその必要はありません。既存のREST APIはそのまま使い続け、AI連携が必要な部分だけMCPを追加することも可能です。</a:t>
-            </a:r>
-          </a:p>
-          <a:p>
-            <a:pPr lvl="0" indent="0" marL="0">
-              <a:buNone/>
-            </a:pPr>
-            <a:r>
-              <a:rPr b="1"/>
-              <a:t>Q: MCPは難しい技術ですか？</a:t>
-            </a:r>
-            <a:br/>
-            <a:r>
-              <a:rPr/>
-              <a:t>A: エンジニアにとっては新しい概念ですが、REST APIと比べて特別に難しいわけではありません。むしろ、自己説明的な設計のため、使う側は楽になります。</a:t>
-            </a:r>
-          </a:p>
-          <a:p>
-            <a:pPr lvl="0" indent="0" marL="0">
-              <a:buNone/>
-            </a:pPr>
-            <a:r>
-              <a:rPr b="1"/>
-              <a:t>Q: コストはどのくらい違う？</a:t>
-            </a:r>
-            <a:br/>
-            <a:r>
-              <a:rPr/>
-              <a:t>A: 初期開発はやや増えますが、ドキュメント作成・メンテナンスのコストが大幅に削減されます。AI連携を考えると、トータルではコスト減の可能性が高いです。</a:t>
-            </a:r>
-          </a:p>
-          <a:p>
-            <a:pPr lvl="0" indent="0" marL="0">
-              <a:buNone/>
-            </a:pPr>
-            <a:r>
-              <a:rPr b="1"/>
-              <a:t>Q: いつまでに導入を検討すべき？</a:t>
-            </a:r>
-            <a:br/>
-            <a:r>
-              <a:rPr/>
-              <a:t>A: AI活用を進めている企業は、今から検証開始をお勧めします。2-3年後には標準的な選択肢の一つになると予想されます。</a:t>
-            </a:r>
-          </a:p>
-        </p:txBody>
-      </p:sp>
-    </p:spTree>
-  </p:cSld>
-</p:sld>
-</file>
-
-<file path=ppt/slides/slide14.xml><?xml version="1.0" encoding="utf-8"?>
-<p:sld xmlns:a="http://schemas.openxmlformats.org/drawingml/2006/main" xmlns:r="http://schemas.openxmlformats.org/officeDocument/2006/relationships" xmlns:p="http://schemas.openxmlformats.org/presentationml/2006/main">
-  <p:cSld>
-    <p:spTree>
-      <p:nvGrpSpPr>
-        <p:cNvPr id="1" name=""/>
-        <p:cNvGrpSpPr/>
-        <p:nvPr/>
-      </p:nvGrpSpPr>
-      <p:grpSpPr>
-        <a:xfrm>
-          <a:off x="0" y="0"/>
-          <a:ext cx="0" cy="0"/>
-          <a:chOff x="0" y="0"/>
-          <a:chExt cx="0" cy="0"/>
-        </a:xfrm>
-      </p:grpSpPr>
-      <p:sp>
-        <p:nvSpPr>
-          <p:cNvPr id="3" name="Content Placeholder 2"/>
-          <p:cNvSpPr>
-            <a:spLocks noGrp="1"/>
-          </p:cNvSpPr>
-          <p:nvPr>
-            <p:ph idx="1"/>
-          </p:nvPr>
-        </p:nvSpPr>
-        <p:spPr/>
-        <p:txBody>
-          <a:bodyPr/>
-          <a:lstStyle/>
-          <a:p>
-            <a:pPr lvl="0" indent="0" marL="0">
-              <a:buNone/>
-            </a:pPr>
-            <a:r>
-              <a:rPr b="1"/>
-              <a:t>作成日:</a:t>
-            </a:r>
-            <a:r>
-              <a:rPr/>
-              <a:t> 2025年12月</a:t>
-            </a:r>
-            <a:br/>
-            <a:r>
-              <a:rPr b="1"/>
-              <a:t>対象読者:</a:t>
-            </a:r>
-            <a:r>
-              <a:rPr/>
-              <a:t> 非エンジニアのビジネスユーザー</a:t>
-            </a:r>
-            <a:br/>
-            <a:r>
-              <a:rPr b="1"/>
-              <a:t>技術詳細:</a:t>
-            </a:r>
-            <a:r>
-              <a:rPr/>
-              <a:t> </a:t>
-            </a:r>
-            <a:r>
-              <a:rPr>
-                <a:hlinkClick r:id="rId2"/>
-              </a:rPr>
-              <a:t>guide.md</a:t>
-            </a:r>
-            <a:r>
-              <a:rPr/>
-              <a:t> を参照</a:t>
-            </a:r>
-          </a:p>
-        </p:txBody>
-      </p:sp>
-    </p:spTree>
-  </p:cSld>
-</p:sld>
-</file>
-
-<file path=ppt/slides/slide2.xml><?xml version="1.0" encoding="utf-8"?>
-<p:sld xmlns:a="http://schemas.openxmlformats.org/drawingml/2006/main" xmlns:r="http://schemas.openxmlformats.org/officeDocument/2006/relationships" xmlns:p="http://schemas.openxmlformats.org/presentationml/2006/main">
-  <p:cSld>
-    <p:spTree>
-      <p:nvGrpSpPr>
-        <p:cNvPr id="1" name=""/>
-        <p:cNvGrpSpPr/>
-        <p:nvPr/>
-      </p:nvGrpSpPr>
-      <p:grpSpPr>
-        <a:xfrm>
-          <a:off x="0" y="0"/>
-          <a:ext cx="0" cy="0"/>
-          <a:chOff x="0" y="0"/>
-          <a:chExt cx="0" cy="0"/>
-        </a:xfrm>
-      </p:grpSpPr>
-      <p:sp>
-        <p:nvSpPr>
-          <p:cNvPr id="3" name="Content Placeholder 2"/>
-          <p:cNvSpPr>
-            <a:spLocks noGrp="1"/>
-          </p:cNvSpPr>
-          <p:nvPr>
-            <p:ph idx="1"/>
-          </p:nvPr>
-        </p:nvSpPr>
-        <p:spPr/>
-        <p:txBody>
-          <a:bodyPr/>
-          <a:lstStyle/>
-          <a:p>
-            <a:pPr lvl="0" indent="0" marL="0">
-              <a:spcBef>
-                <a:spcPts val="3000"/>
-              </a:spcBef>
-              <a:buNone/>
-            </a:pPr>
-            <a:r>
-              <a:rPr b="1"/>
-              <a:t>🤔 そもそも何が違うの？</a:t>
-            </a:r>
-          </a:p>
-          <a:p>
-            <a:pPr lvl="0" indent="0" marL="0">
-              <a:spcBef>
-                <a:spcPts val="3000"/>
-              </a:spcBef>
-              <a:buNone/>
-            </a:pPr>
-            <a:r>
-              <a:rPr b="1"/>
-              <a:t>一言で言うと</a:t>
-            </a:r>
-          </a:p>
-          <a:p>
-            <a:pPr lvl="0" indent="0" marL="0">
-              <a:buNone/>
-            </a:pPr>
-            <a:r>
-              <a:rPr b="1"/>
-              <a:t>REST API:</a:t>
-            </a:r>
-            <a:r>
-              <a:rPr/>
-              <a:t> レストランのメニュー（紙）</a:t>
-            </a:r>
-            <a:br/>
-            <a:r>
-              <a:rPr b="1"/>
-              <a:t>MCP:</a:t>
-            </a:r>
-            <a:r>
-              <a:rPr/>
-              <a:t> スマートなウェイター（AI対応）</a:t>
-            </a:r>
-          </a:p>
-        </p:txBody>
-      </p:sp>
-    </p:spTree>
-  </p:cSld>
-</p:sld>
-</file>
-
-<file path=ppt/slides/slide3.xml><?xml version="1.0" encoding="utf-8"?>
-<p:sld xmlns:a="http://schemas.openxmlformats.org/drawingml/2006/main" xmlns:r="http://schemas.openxmlformats.org/officeDocument/2006/relationships" xmlns:p="http://schemas.openxmlformats.org/presentationml/2006/main">
-  <p:cSld>
-    <p:spTree>
-      <p:nvGrpSpPr>
-        <p:cNvPr id="1" name=""/>
-        <p:cNvGrpSpPr/>
-        <p:nvPr/>
-      </p:nvGrpSpPr>
-      <p:grpSpPr>
-        <a:xfrm>
-          <a:off x="0" y="0"/>
-          <a:ext cx="0" cy="0"/>
-          <a:chOff x="0" y="0"/>
-          <a:chExt cx="0" cy="0"/>
-        </a:xfrm>
-      </p:grpSpPr>
-      <p:sp>
-        <p:nvSpPr>
-          <p:cNvPr id="3" name="Content Placeholder 2"/>
-          <p:cNvSpPr>
-            <a:spLocks noGrp="1"/>
-          </p:cNvSpPr>
-          <p:nvPr>
-            <p:ph idx="1"/>
-          </p:nvPr>
-        </p:nvSpPr>
-        <p:spPr/>
-        <p:txBody>
-          <a:bodyPr/>
-          <a:lstStyle/>
-          <a:p>
-            <a:pPr lvl="0" indent="0" marL="0">
-              <a:spcBef>
-                <a:spcPts val="3000"/>
-              </a:spcBef>
-              <a:buNone/>
-            </a:pPr>
-            <a:r>
-              <a:rPr b="1"/>
-              <a:t>📖 レストランの例えで理解する</a:t>
-            </a:r>
-          </a:p>
-          <a:p>
-            <a:pPr lvl="0" indent="0" marL="0">
-              <a:spcBef>
-                <a:spcPts val="3000"/>
-              </a:spcBef>
-              <a:buNone/>
-            </a:pPr>
-            <a:r>
-              <a:rPr b="1"/>
-              <a:t>REST API = 紙のメニュー方式</a:t>
-            </a:r>
-          </a:p>
-          <a:p>
-            <a:pPr lvl="0" indent="0">
-              <a:buNone/>
-            </a:pPr>
-            <a:r>
-              <a:rPr>
-                <a:latin typeface="Courier"/>
-              </a:rPr>
-              <a:t>あなた（客）
-  ↓
-紙のメニューを見る
-  ↓
-「ハンバーグセット1つください」と注文
-  ↓
-ウェイター（システム）が持ってくる</a:t>
-            </a:r>
-          </a:p>
-          <a:p>
-            <a:pPr lvl="0" indent="0" marL="0">
-              <a:buNone/>
-            </a:pPr>
-            <a:r>
-              <a:rPr b="1"/>
-              <a:t>特徴:</a:t>
-            </a:r>
-            <a:r>
-              <a:rPr/>
-              <a:t> - ✅ シンプルで分かりやすい - ✅ 誰でも使える（メニューさえ見れば） - ❌ メニューに載っていない料理は注文できない - ❌ 新しいメニューが増えても、紙のメニューは更新されない - ❌ ウェイターに「今日のおすすめは？」と聞けない</a:t>
-            </a:r>
-          </a:p>
-          <a:p>
-            <a:pPr lvl="0" indent="0" marL="0">
-              <a:spcBef>
-                <a:spcPts val="3000"/>
-              </a:spcBef>
-              <a:buNone/>
-            </a:pPr>
-            <a:r>
-              <a:rPr b="1"/>
-              <a:t>MCP = スマートウェイター方式</a:t>
-            </a:r>
-          </a:p>
-          <a:p>
-            <a:pPr lvl="0" indent="0">
-              <a:buNone/>
-            </a:pPr>
-            <a:r>
-              <a:rPr>
-                <a:latin typeface="Courier"/>
-              </a:rPr>
-              <a:t>あなた（客）
-  ↓
-ウェイターに話しかける
-  ↓
-ウェイター「今日のメニューはこちらです」（自動で説明）
-  ↓
-ウェイター「アレルギーは？」「おすすめは？」（対話的）
-  ↓
-最適な料理を提案＆提供</a:t>
-            </a:r>
-          </a:p>
-          <a:p>
-            <a:pPr lvl="0" indent="0" marL="0">
-              <a:buNone/>
-            </a:pPr>
-            <a:r>
-              <a:rPr b="1"/>
-              <a:t>特徴:</a:t>
-            </a:r>
-            <a:r>
-              <a:rPr/>
-              <a:t> - ✅ システム自身が「何ができるか」を説明してくれる - ✅ AIと対話しながら使える - ✅ メニューが変わっても自動で対応 - ✅ 「今日のおすすめは？」などの質問に答えられる - 💡 特にAIアシスタントとの相性が抜群</a:t>
-            </a:r>
-          </a:p>
-        </p:txBody>
-      </p:sp>
-    </p:spTree>
-  </p:cSld>
-</p:sld>
-</file>
-
-<file path=ppt/slides/slide4.xml><?xml version="1.0" encoding="utf-8"?>
-<p:sld xmlns:a="http://schemas.openxmlformats.org/drawingml/2006/main" xmlns:r="http://schemas.openxmlformats.org/officeDocument/2006/relationships" xmlns:p="http://schemas.openxmlformats.org/presentationml/2006/main">
-  <p:cSld>
-    <p:spTree>
-      <p:nvGrpSpPr>
-        <p:cNvPr id="1" name=""/>
-        <p:cNvGrpSpPr/>
-        <p:nvPr/>
-      </p:nvGrpSpPr>
-      <p:grpSpPr>
-        <a:xfrm>
-          <a:off x="0" y="0"/>
-          <a:ext cx="0" cy="0"/>
-          <a:chOff x="0" y="0"/>
-          <a:chExt cx="0" cy="0"/>
-        </a:xfrm>
-      </p:grpSpPr>
-      <p:sp>
-        <p:nvSpPr>
-          <p:cNvPr id="3" name="Content Placeholder 2"/>
-          <p:cNvSpPr>
-            <a:spLocks noGrp="1"/>
-          </p:cNvSpPr>
-          <p:nvPr>
-            <p:ph idx="1"/>
-          </p:nvPr>
-        </p:nvSpPr>
-        <p:spPr/>
-        <p:txBody>
-          <a:bodyPr/>
-          <a:lstStyle/>
-          <a:p>
-            <a:pPr lvl="0" indent="0" marL="0">
-              <a:spcBef>
-                <a:spcPts val="3000"/>
-              </a:spcBef>
-              <a:buNone/>
-            </a:pPr>
-            <a:r>
-              <a:rPr b="1"/>
-              <a:t>📊 実際の使い方の違い</a:t>
-            </a:r>
-          </a:p>
-          <a:p>
-            <a:pPr lvl="0" indent="0" marL="0">
-              <a:spcBef>
-                <a:spcPts val="3000"/>
-              </a:spcBef>
-              <a:buNone/>
-            </a:pPr>
-            <a:r>
-              <a:rPr b="1"/>
-              <a:t>タスク管理システムの例</a:t>
-            </a:r>
-          </a:p>
-          <a:p>
-            <a:pPr lvl="0" indent="0" marL="0">
-              <a:spcBef>
-                <a:spcPts val="3000"/>
-              </a:spcBef>
-              <a:buNone/>
-            </a:pPr>
-            <a:r>
-              <a:rPr b="1"/>
-              <a:t>REST API の場合</a:t>
-            </a:r>
-          </a:p>
-          <a:p>
-            <a:pPr lvl="0" indent="0" marL="0">
-              <a:buNone/>
-            </a:pPr>
-            <a:r>
-              <a:rPr b="1"/>
-              <a:t>1. タスク一覧を見たい</a:t>
-            </a:r>
-          </a:p>
-          <a:p>
-            <a:pPr lvl="0" indent="0">
-              <a:buNone/>
-            </a:pPr>
-            <a:r>
-              <a:rPr>
-                <a:latin typeface="Courier"/>
-              </a:rPr>
-              <a:t>→ 「GET /tasks というURLにアクセスしてください」
-→ http://example.com/tasks を開く
-→ タスク一覧が表示される</a:t>
-            </a:r>
-          </a:p>
-          <a:p>
-            <a:pPr lvl="0" indent="0" marL="0">
-              <a:buNone/>
-            </a:pPr>
-            <a:r>
-              <a:rPr b="1"/>
-              <a:t>2. 新しいタスクを作りたい</a:t>
-            </a:r>
-          </a:p>
-          <a:p>
-            <a:pPr lvl="0" indent="0">
-              <a:buNone/>
-            </a:pPr>
-            <a:r>
-              <a:rPr>
-                <a:latin typeface="Courier"/>
-              </a:rPr>
-              <a:t>→ 「POST /tasks というURLに、JSONデータを送ってください」
-→ 専用のツール（curlなど）を使って送信
-→ タスクが作成される</a:t>
-            </a:r>
-          </a:p>
-          <a:p>
-            <a:pPr lvl="0" indent="0" marL="0">
-              <a:buNone/>
-            </a:pPr>
-            <a:r>
-              <a:rPr b="1"/>
-              <a:t>問題点:</a:t>
-            </a:r>
-            <a:r>
-              <a:rPr/>
-              <a:t> - どのURLにアクセスすればいいか、</a:t>
-            </a:r>
-            <a:r>
-              <a:rPr b="1"/>
-              <a:t>事前に知っておく必要がある</a:t>
-            </a:r>
-            <a:r>
-              <a:rPr/>
-              <a:t> - ドキュメントを読まないと使えない - AIに「タスクを作って」と言っても、まずドキュメントを読ませる必要がある</a:t>
-            </a:r>
-          </a:p>
-          <a:p>
-            <a:pPr lvl="0" indent="0" marL="0">
-              <a:spcBef>
-                <a:spcPts val="3000"/>
-              </a:spcBef>
-              <a:buNone/>
-            </a:pPr>
-            <a:r>
-              <a:rPr b="1"/>
-              <a:t>MCP の場合</a:t>
-            </a:r>
-          </a:p>
-          <a:p>
-            <a:pPr lvl="0" indent="0" marL="0">
-              <a:buNone/>
-            </a:pPr>
-            <a:r>
-              <a:rPr b="1"/>
-              <a:t>1. タスク一覧を見たい</a:t>
-            </a:r>
-          </a:p>
-          <a:p>
-            <a:pPr lvl="0" indent="0">
-              <a:buNone/>
-            </a:pPr>
-            <a:r>
-              <a:rPr>
-                <a:latin typeface="Courier"/>
-              </a:rPr>
-              <a:t>AI: 「何ができるか教えて」
-→ システム: 「タスク一覧を見れます（task://list）」
-→ AI: 「じゃあ見せて」
-→ タスク一覧が表示される</a:t>
-            </a:r>
-          </a:p>
-          <a:p>
-            <a:pPr lvl="0" indent="0" marL="0">
-              <a:buNone/>
-            </a:pPr>
-            <a:r>
-              <a:rPr b="1"/>
-              <a:t>2. 新しいタスクを作りたい</a:t>
-            </a:r>
-          </a:p>
-          <a:p>
-            <a:pPr lvl="0" indent="0">
-              <a:buNone/>
-            </a:pPr>
-            <a:r>
-              <a:rPr>
-                <a:latin typeface="Courier"/>
-              </a:rPr>
-              <a:t>AI: 「どんな操作ができる？」
-→ システム: 「create_task で新規作成できます。必要なのはタイトルです」
-→ AI: 「タイトル『買い物』で作成して」
-→ タスクが作成される</a:t>
-            </a:r>
-          </a:p>
-          <a:p>
-            <a:pPr lvl="0" indent="0" marL="0">
-              <a:buNone/>
-            </a:pPr>
-            <a:r>
-              <a:rPr b="1"/>
-              <a:t>メリット:</a:t>
-            </a:r>
-            <a:r>
-              <a:rPr/>
-              <a:t> - システムに聞けば、</a:t>
-            </a:r>
-            <a:r>
-              <a:rPr b="1"/>
-              <a:t>何ができるか自動で教えてくれる</a:t>
-            </a:r>
-            <a:r>
-              <a:rPr/>
-              <a:t> - ドキュメントを読まなくても使える - AIが自然に使いこなせる</a:t>
-            </a:r>
-          </a:p>
-        </p:txBody>
-      </p:sp>
-    </p:spTree>
-  </p:cSld>
-</p:sld>
-</file>
-
-<file path=ppt/slides/slide5.xml><?xml version="1.0" encoding="utf-8"?>
-<p:sld xmlns:a="http://schemas.openxmlformats.org/drawingml/2006/main" xmlns:r="http://schemas.openxmlformats.org/officeDocument/2006/relationships" xmlns:p="http://schemas.openxmlformats.org/presentationml/2006/main">
-  <p:cSld>
-    <p:spTree>
-      <p:nvGrpSpPr>
-        <p:cNvPr id="1" name=""/>
-        <p:cNvGrpSpPr/>
-        <p:nvPr/>
-      </p:nvGrpSpPr>
-      <p:grpSpPr>
-        <a:xfrm>
-          <a:off x="0" y="0"/>
-          <a:ext cx="0" cy="0"/>
-          <a:chOff x="0" y="0"/>
-          <a:chExt cx="0" cy="0"/>
-        </a:xfrm>
-      </p:grpSpPr>
-      <p:sp>
-        <p:nvSpPr>
-          <p:cNvPr id="4" name="Text Placeholder 3"/>
-          <p:cNvSpPr>
-            <a:spLocks noGrp="1"/>
-          </p:cNvSpPr>
-          <p:nvPr>
-            <p:ph idx="2" sz="half" type="body"/>
-          </p:nvPr>
-        </p:nvSpPr>
-        <p:spPr/>
-        <p:txBody>
-          <a:bodyPr/>
-          <a:lstStyle/>
-          <a:p>
-            <a:pPr lvl="0" indent="0" marL="0">
-              <a:spcBef>
-                <a:spcPts val="3000"/>
-              </a:spcBef>
-              <a:buNone/>
-            </a:pPr>
-            <a:r>
-              <a:rPr b="1"/>
-              <a:t>🎯 ビジネス上の違い</a:t>
-            </a:r>
-          </a:p>
-          <a:p>
-            <a:pPr lvl="0" indent="0" marL="0">
-              <a:spcBef>
-                <a:spcPts val="3000"/>
-              </a:spcBef>
-              <a:buNone/>
-            </a:pPr>
-            <a:r>
-              <a:rPr b="1"/>
-              <a:t>REST API</a:t>
+              <a:buNone/>
+            </a:pPr>
+            <a:r>
+              <a:rPr/>
+              <a:t>REST API の評価</a:t>
             </a:r>
           </a:p>
         </p:txBody>
@@ -4326,8 +3308,8 @@
           </p:nvPr>
         </p:nvGraphicFramePr>
         <p:xfrm>
-          <a:off x="3568700" y="203200"/>
-          <a:ext cx="5105400" cy="4381500"/>
+          <a:off x="457200" y="1193800"/>
+          <a:ext cx="8229600" cy="3390900"/>
         </p:xfrm>
         <a:graphic>
           <a:graphicData uri="http://schemas.openxmlformats.org/drawingml/2006/table">
@@ -4336,9 +3318,8 @@
                 <a:tableStyleId>{5C22544A-7EE6-4342-B048-85BDC9FD1C3A}</a:tableStyleId>
               </a:tblPr>
               <a:tblGrid>
-                <a:gridCol w="1701800"/>
-                <a:gridCol w="1701800"/>
-                <a:gridCol w="1701800"/>
+                <a:gridCol w="4114800"/>
+                <a:gridCol w="4114800"/>
               </a:tblGrid>
               <a:tr h="0">
                 <a:tc>
@@ -4373,22 +3354,6 @@
                   </a:txBody>
                   <a:tcPr/>
                 </a:tc>
-                <a:tc>
-                  <a:txBody>
-                    <a:bodyPr/>
-                    <a:lstStyle/>
-                    <a:p>
-                      <a:pPr lvl="0" indent="0" marL="0">
-                        <a:buNone/>
-                      </a:pPr>
-                      <a:r>
-                        <a:rPr/>
-                        <a:t>説明</a:t>
-                      </a:r>
-                    </a:p>
-                  </a:txBody>
-                  <a:tcPr/>
-                </a:tc>
               </a:tr>
               <a:tr h="0">
                 <a:tc>
@@ -4400,7 +3365,7 @@
                         <a:buNone/>
                       </a:pPr>
                       <a:r>
-                        <a:rPr b="1"/>
+                        <a:rPr/>
                         <a:t>導入のしやすさ</a:t>
                       </a:r>
                     </a:p>
@@ -4421,21 +3386,6 @@
                     </a:p>
                   </a:txBody>
                 </a:tc>
-                <a:tc>
-                  <a:txBody>
-                    <a:bodyPr/>
-                    <a:lstStyle/>
-                    <a:p>
-                      <a:pPr lvl="0" indent="0" marL="0">
-                        <a:buNone/>
-                      </a:pPr>
-                      <a:r>
-                        <a:rPr/>
-                        <a:t>広く使われており、実績が豊富</a:t>
-                      </a:r>
-                    </a:p>
-                  </a:txBody>
-                </a:tc>
               </a:tr>
               <a:tr h="0">
                 <a:tc>
@@ -4447,7 +3397,7 @@
                         <a:buNone/>
                       </a:pPr>
                       <a:r>
-                        <a:rPr b="1"/>
+                        <a:rPr/>
                         <a:t>開発コスト</a:t>
                       </a:r>
                     </a:p>
@@ -4468,21 +3418,6 @@
                     </a:p>
                   </a:txBody>
                 </a:tc>
-                <a:tc>
-                  <a:txBody>
-                    <a:bodyPr/>
-                    <a:lstStyle/>
-                    <a:p>
-                      <a:pPr lvl="0" indent="0" marL="0">
-                        <a:buNone/>
-                      </a:pPr>
-                      <a:r>
-                        <a:rPr/>
-                        <a:t>標準的</a:t>
-                      </a:r>
-                    </a:p>
-                  </a:txBody>
-                </a:tc>
               </a:tr>
               <a:tr h="0">
                 <a:tc>
@@ -4494,7 +3429,7 @@
                         <a:buNone/>
                       </a:pPr>
                       <a:r>
-                        <a:rPr b="1"/>
+                        <a:rPr/>
                         <a:t>ドキュメント作成</a:t>
                       </a:r>
                     </a:p>
@@ -4515,21 +3450,6 @@
                     </a:p>
                   </a:txBody>
                 </a:tc>
-                <a:tc>
-                  <a:txBody>
-                    <a:bodyPr/>
-                    <a:lstStyle/>
-                    <a:p>
-                      <a:pPr lvl="0" indent="0" marL="0">
-                        <a:buNone/>
-                      </a:pPr>
-                      <a:r>
-                        <a:rPr/>
-                        <a:t>別途詳細なドキュメントが必要</a:t>
-                      </a:r>
-                    </a:p>
-                  </a:txBody>
-                </a:tc>
               </a:tr>
               <a:tr h="0">
                 <a:tc>
@@ -4541,8 +3461,8 @@
                         <a:buNone/>
                       </a:pPr>
                       <a:r>
-                        <a:rPr b="1"/>
-                        <a:t>AIとの連携</a:t>
+                        <a:rPr/>
+                        <a:t>AI連携</a:t>
                       </a:r>
                     </a:p>
                   </a:txBody>
@@ -4562,21 +3482,6 @@
                     </a:p>
                   </a:txBody>
                 </a:tc>
-                <a:tc>
-                  <a:txBody>
-                    <a:bodyPr/>
-                    <a:lstStyle/>
-                    <a:p>
-                      <a:pPr lvl="0" indent="0" marL="0">
-                        <a:buNone/>
-                      </a:pPr>
-                      <a:r>
-                        <a:rPr/>
-                        <a:t>可能だが、事前設定が複雜</a:t>
-                      </a:r>
-                    </a:p>
-                  </a:txBody>
-                </a:tc>
               </a:tr>
               <a:tr h="0">
                 <a:tc>
@@ -4588,7 +3493,7 @@
                         <a:buNone/>
                       </a:pPr>
                       <a:r>
-                        <a:rPr b="1"/>
+                        <a:rPr/>
                         <a:t>変更への対応</a:t>
                       </a:r>
                     </a:p>
@@ -4609,21 +3514,6 @@
                     </a:p>
                   </a:txBody>
                 </a:tc>
-                <a:tc>
-                  <a:txBody>
-                    <a:bodyPr/>
-                    <a:lstStyle/>
-                    <a:p>
-                      <a:pPr lvl="0" indent="0" marL="0">
-                        <a:buNone/>
-                      </a:pPr>
-                      <a:r>
-                        <a:rPr/>
-                        <a:t>API変更時にドキュメント更新が必要</a:t>
-                      </a:r>
-                    </a:p>
-                  </a:txBody>
-                </a:tc>
               </a:tr>
             </a:tbl>
           </a:graphicData>
@@ -4634,7 +3524,7 @@
 </p:sld>
 </file>
 
-<file path=ppt/slides/slide6.xml><?xml version="1.0" encoding="utf-8"?>
+<file path=ppt/slides/slide12.xml><?xml version="1.0" encoding="utf-8"?>
 <p:sld xmlns:a="http://schemas.openxmlformats.org/drawingml/2006/main" xmlns:r="http://schemas.openxmlformats.org/officeDocument/2006/relationships" xmlns:p="http://schemas.openxmlformats.org/presentationml/2006/main">
   <p:cSld>
     <p:spTree>
@@ -4653,12 +3543,12 @@
       </p:grpSpPr>
       <p:sp>
         <p:nvSpPr>
-          <p:cNvPr id="4" name="Text Placeholder 3"/>
-          <p:cNvSpPr>
-            <a:spLocks noGrp="1"/>
-          </p:cNvSpPr>
-          <p:nvPr>
-            <p:ph idx="2" sz="half" type="body"/>
+          <p:cNvPr id="3" name="Content Placeholder 2"/>
+          <p:cNvSpPr>
+            <a:spLocks noGrp="1"/>
+          </p:cNvSpPr>
+          <p:nvPr>
+            <p:ph idx="1"/>
           </p:nvPr>
         </p:nvSpPr>
         <p:spPr/>
@@ -4671,23 +3561,58 @@
             </a:pPr>
             <a:r>
               <a:rPr b="1"/>
-              <a:t>向いているケース:</a:t>
-            </a:r>
-            <a:r>
-              <a:rPr/>
-              <a:t> - Web サイトやモバイルアプリ - 外部に公開するAPI - 既存システムとの連携</a:t>
-            </a:r>
-          </a:p>
+              <a:t>向いているケース</a:t>
+            </a:r>
+            <a:r>
+              <a:rPr/>
+              <a:t> - Webサイト、モバイルアプリ - 外部公開API</a:t>
+            </a:r>
+          </a:p>
+        </p:txBody>
+      </p:sp>
+    </p:spTree>
+  </p:cSld>
+</p:sld>
+</file>
+
+<file path=ppt/slides/slide13.xml><?xml version="1.0" encoding="utf-8"?>
+<p:sld xmlns:a="http://schemas.openxmlformats.org/drawingml/2006/main" xmlns:r="http://schemas.openxmlformats.org/officeDocument/2006/relationships" xmlns:p="http://schemas.openxmlformats.org/presentationml/2006/main">
+  <p:cSld>
+    <p:spTree>
+      <p:nvGrpSpPr>
+        <p:cNvPr id="1" name=""/>
+        <p:cNvGrpSpPr/>
+        <p:nvPr/>
+      </p:nvGrpSpPr>
+      <p:grpSpPr>
+        <a:xfrm>
+          <a:off x="0" y="0"/>
+          <a:ext cx="0" cy="0"/>
+          <a:chOff x="0" y="0"/>
+          <a:chExt cx="0" cy="0"/>
+        </a:xfrm>
+      </p:grpSpPr>
+      <p:sp>
+        <p:nvSpPr>
+          <p:cNvPr id="2" name="Title 1"/>
+          <p:cNvSpPr>
+            <a:spLocks noGrp="1"/>
+          </p:cNvSpPr>
+          <p:nvPr>
+            <p:ph type="title"/>
+          </p:nvPr>
+        </p:nvSpPr>
+        <p:spPr/>
+        <p:txBody>
+          <a:bodyPr/>
+          <a:lstStyle/>
           <a:p>
             <a:pPr lvl="0" indent="0" marL="0">
-              <a:spcBef>
-                <a:spcPts val="3000"/>
-              </a:spcBef>
-              <a:buNone/>
-            </a:pPr>
-            <a:r>
-              <a:rPr b="1"/>
-              <a:t>MCP</a:t>
+              <a:buNone/>
+            </a:pPr>
+            <a:r>
+              <a:rPr/>
+              <a:t>MCPの評価</a:t>
             </a:r>
           </a:p>
         </p:txBody>
@@ -4703,8 +3628,8 @@
           </p:nvPr>
         </p:nvGraphicFramePr>
         <p:xfrm>
-          <a:off x="3568700" y="203200"/>
-          <a:ext cx="5105400" cy="4381500"/>
+          <a:off x="457200" y="1193800"/>
+          <a:ext cx="8229600" cy="3390900"/>
         </p:xfrm>
         <a:graphic>
           <a:graphicData uri="http://schemas.openxmlformats.org/drawingml/2006/table">
@@ -4713,9 +3638,8 @@
                 <a:tableStyleId>{5C22544A-7EE6-4342-B048-85BDC9FD1C3A}</a:tableStyleId>
               </a:tblPr>
               <a:tblGrid>
-                <a:gridCol w="1701800"/>
-                <a:gridCol w="1701800"/>
-                <a:gridCol w="1701800"/>
+                <a:gridCol w="4114800"/>
+                <a:gridCol w="4114800"/>
               </a:tblGrid>
               <a:tr h="0">
                 <a:tc>
@@ -4750,22 +3674,6 @@
                   </a:txBody>
                   <a:tcPr/>
                 </a:tc>
-                <a:tc>
-                  <a:txBody>
-                    <a:bodyPr/>
-                    <a:lstStyle/>
-                    <a:p>
-                      <a:pPr lvl="0" indent="0" marL="0">
-                        <a:buNone/>
-                      </a:pPr>
-                      <a:r>
-                        <a:rPr/>
-                        <a:t>説明</a:t>
-                      </a:r>
-                    </a:p>
-                  </a:txBody>
-                  <a:tcPr/>
-                </a:tc>
               </a:tr>
               <a:tr h="0">
                 <a:tc>
@@ -4777,7 +3685,7 @@
                         <a:buNone/>
                       </a:pPr>
                       <a:r>
-                        <a:rPr b="1"/>
+                        <a:rPr/>
                         <a:t>導入のしやすさ</a:t>
                       </a:r>
                     </a:p>
@@ -4798,21 +3706,6 @@
                     </a:p>
                   </a:txBody>
                 </a:tc>
-                <a:tc>
-                  <a:txBody>
-                    <a:bodyPr/>
-                    <a:lstStyle/>
-                    <a:p>
-                      <a:pPr lvl="0" indent="0" marL="0">
-                        <a:buNone/>
-                      </a:pPr>
-                      <a:r>
-                        <a:rPr/>
-                        <a:t>新しい技術で学習が必要</a:t>
-                      </a:r>
-                    </a:p>
-                  </a:txBody>
-                </a:tc>
               </a:tr>
               <a:tr h="0">
                 <a:tc>
@@ -4824,7 +3717,7 @@
                         <a:buNone/>
                       </a:pPr>
                       <a:r>
-                        <a:rPr b="1"/>
+                        <a:rPr/>
                         <a:t>開発コスト</a:t>
                       </a:r>
                     </a:p>
@@ -4845,21 +3738,6 @@
                     </a:p>
                   </a:txBody>
                 </a:tc>
-                <a:tc>
-                  <a:txBody>
-                    <a:bodyPr/>
-                    <a:lstStyle/>
-                    <a:p>
-                      <a:pPr lvl="0" indent="0" marL="0">
-                        <a:buNone/>
-                      </a:pPr>
-                      <a:r>
-                        <a:rPr/>
-                        <a:t>初期投資はやや高め</a:t>
-                      </a:r>
-                    </a:p>
-                  </a:txBody>
-                </a:tc>
               </a:tr>
               <a:tr h="0">
                 <a:tc>
@@ -4871,7 +3749,7 @@
                         <a:buNone/>
                       </a:pPr>
                       <a:r>
-                        <a:rPr b="1"/>
+                        <a:rPr/>
                         <a:t>ドキュメント作成</a:t>
                       </a:r>
                     </a:p>
@@ -4892,21 +3770,6 @@
                     </a:p>
                   </a:txBody>
                 </a:tc>
-                <a:tc>
-                  <a:txBody>
-                    <a:bodyPr/>
-                    <a:lstStyle/>
-                    <a:p>
-                      <a:pPr lvl="0" indent="0" marL="0">
-                        <a:buNone/>
-                      </a:pPr>
-                      <a:r>
-                        <a:rPr/>
-                        <a:t>システム自体が説明するため最小限</a:t>
-                      </a:r>
-                    </a:p>
-                  </a:txBody>
-                </a:tc>
               </a:tr>
               <a:tr h="0">
                 <a:tc>
@@ -4918,8 +3781,8 @@
                         <a:buNone/>
                       </a:pPr>
                       <a:r>
-                        <a:rPr b="1"/>
-                        <a:t>AIとの連携</a:t>
+                        <a:rPr/>
+                        <a:t>AI連携</a:t>
                       </a:r>
                     </a:p>
                   </a:txBody>
@@ -4939,21 +3802,6 @@
                     </a:p>
                   </a:txBody>
                 </a:tc>
-                <a:tc>
-                  <a:txBody>
-                    <a:bodyPr/>
-                    <a:lstStyle/>
-                    <a:p>
-                      <a:pPr lvl="0" indent="0" marL="0">
-                        <a:buNone/>
-                      </a:pPr>
-                      <a:r>
-                        <a:rPr/>
-                        <a:t>AIが自動的に理解して使える</a:t>
-                      </a:r>
-                    </a:p>
-                  </a:txBody>
-                </a:tc>
               </a:tr>
               <a:tr h="0">
                 <a:tc>
@@ -4965,7 +3813,7 @@
                         <a:buNone/>
                       </a:pPr>
                       <a:r>
-                        <a:rPr b="1"/>
+                        <a:rPr/>
                         <a:t>変更への対応</a:t>
                       </a:r>
                     </a:p>
@@ -4986,26 +3834,2072 @@
                     </a:p>
                   </a:txBody>
                 </a:tc>
-                <a:tc>
-                  <a:txBody>
-                    <a:bodyPr/>
-                    <a:lstStyle/>
-                    <a:p>
-                      <a:pPr lvl="0" indent="0" marL="0">
-                        <a:buNone/>
-                      </a:pPr>
-                      <a:r>
-                        <a:rPr/>
-                        <a:t>システムが自己説明するため自動対応</a:t>
-                      </a:r>
-                    </a:p>
-                  </a:txBody>
-                </a:tc>
               </a:tr>
             </a:tbl>
           </a:graphicData>
         </a:graphic>
       </p:graphicFrame>
+    </p:spTree>
+  </p:cSld>
+</p:sld>
+</file>
+
+<file path=ppt/slides/slide14.xml><?xml version="1.0" encoding="utf-8"?>
+<p:sld xmlns:a="http://schemas.openxmlformats.org/drawingml/2006/main" xmlns:r="http://schemas.openxmlformats.org/officeDocument/2006/relationships" xmlns:p="http://schemas.openxmlformats.org/presentationml/2006/main">
+  <p:cSld>
+    <p:spTree>
+      <p:nvGrpSpPr>
+        <p:cNvPr id="1" name=""/>
+        <p:cNvGrpSpPr/>
+        <p:nvPr/>
+      </p:nvGrpSpPr>
+      <p:grpSpPr>
+        <a:xfrm>
+          <a:off x="0" y="0"/>
+          <a:ext cx="0" cy="0"/>
+          <a:chOff x="0" y="0"/>
+          <a:chExt cx="0" cy="0"/>
+        </a:xfrm>
+      </p:grpSpPr>
+      <p:sp>
+        <p:nvSpPr>
+          <p:cNvPr id="3" name="Content Placeholder 2"/>
+          <p:cNvSpPr>
+            <a:spLocks noGrp="1"/>
+          </p:cNvSpPr>
+          <p:nvPr>
+            <p:ph idx="1"/>
+          </p:nvPr>
+        </p:nvSpPr>
+        <p:spPr/>
+        <p:txBody>
+          <a:bodyPr/>
+          <a:lstStyle/>
+          <a:p>
+            <a:pPr lvl="0" indent="0" marL="0">
+              <a:buNone/>
+            </a:pPr>
+            <a:r>
+              <a:rPr b="1"/>
+              <a:t>向いているケース</a:t>
+            </a:r>
+            <a:r>
+              <a:rPr/>
+              <a:t> - AIアシスタント統合 - 社内業務自動化</a:t>
+            </a:r>
+          </a:p>
+        </p:txBody>
+      </p:sp>
+    </p:spTree>
+  </p:cSld>
+</p:sld>
+</file>
+
+<file path=ppt/slides/slide15.xml><?xml version="1.0" encoding="utf-8"?>
+<p:sld xmlns:a="http://schemas.openxmlformats.org/drawingml/2006/main" xmlns:r="http://schemas.openxmlformats.org/officeDocument/2006/relationships" xmlns:p="http://schemas.openxmlformats.org/presentationml/2006/main">
+  <p:cSld>
+    <p:spTree>
+      <p:nvGrpSpPr>
+        <p:cNvPr id="1" name=""/>
+        <p:cNvGrpSpPr/>
+        <p:nvPr/>
+      </p:nvGrpSpPr>
+      <p:grpSpPr>
+        <a:xfrm>
+          <a:off x="0" y="0"/>
+          <a:ext cx="0" cy="0"/>
+          <a:chOff x="0" y="0"/>
+          <a:chExt cx="0" cy="0"/>
+        </a:xfrm>
+      </p:grpSpPr>
+      <p:sp>
+        <p:nvSpPr>
+          <p:cNvPr id="2" name="Title 1"/>
+          <p:cNvSpPr>
+            <a:spLocks noGrp="1"/>
+          </p:cNvSpPr>
+          <p:nvPr>
+            <p:ph type="title"/>
+          </p:nvPr>
+        </p:nvSpPr>
+        <p:spPr/>
+        <p:txBody>
+          <a:bodyPr/>
+          <a:lstStyle/>
+          <a:p>
+            <a:pPr lvl="0" indent="0" marL="0">
+              <a:buNone/>
+            </a:pPr>
+            <a:r>
+              <a:rPr/>
+              <a:t>💡 REST API が適している例</a:t>
+            </a:r>
+          </a:p>
+        </p:txBody>
+      </p:sp>
+      <p:sp>
+        <p:nvSpPr>
+          <p:cNvPr id="3" name="Content Placeholder 2"/>
+          <p:cNvSpPr>
+            <a:spLocks noGrp="1"/>
+          </p:cNvSpPr>
+          <p:nvPr>
+            <p:ph idx="1"/>
+          </p:nvPr>
+        </p:nvSpPr>
+        <p:spPr/>
+        <p:txBody>
+          <a:bodyPr/>
+          <a:lstStyle/>
+          <a:p>
+            <a:pPr lvl="0" indent="0" marL="0">
+              <a:spcBef>
+                <a:spcPts val="3000"/>
+              </a:spcBef>
+              <a:buNone/>
+            </a:pPr>
+            <a:r>
+              <a:rPr b="1"/>
+              <a:t>✅ ECサイトのAPI</a:t>
+            </a:r>
+          </a:p>
+          <a:p>
+            <a:pPr lvl="0"/>
+            <a:r>
+              <a:rPr/>
+              <a:t>商品検索、カート、注文</a:t>
+            </a:r>
+          </a:p>
+          <a:p>
+            <a:pPr lvl="0"/>
+            <a:r>
+              <a:rPr/>
+              <a:t>多くのユーザーが同じ方法で使用</a:t>
+            </a:r>
+          </a:p>
+          <a:p>
+            <a:pPr lvl="0" indent="0" marL="0">
+              <a:spcBef>
+                <a:spcPts val="3000"/>
+              </a:spcBef>
+              <a:buNone/>
+            </a:pPr>
+            <a:r>
+              <a:rPr b="1"/>
+              <a:t>✅ SNSのAPI</a:t>
+            </a:r>
+          </a:p>
+          <a:p>
+            <a:pPr lvl="0"/>
+            <a:r>
+              <a:rPr/>
+              <a:t>投稿、いいね、フォロー</a:t>
+            </a:r>
+          </a:p>
+          <a:p>
+            <a:pPr lvl="0"/>
+            <a:r>
+              <a:rPr/>
+              <a:t>広く使われる標準的な機能</a:t>
+            </a:r>
+          </a:p>
+        </p:txBody>
+      </p:sp>
+    </p:spTree>
+  </p:cSld>
+</p:sld>
+</file>
+
+<file path=ppt/slides/slide16.xml><?xml version="1.0" encoding="utf-8"?>
+<p:sld xmlns:a="http://schemas.openxmlformats.org/drawingml/2006/main" xmlns:r="http://schemas.openxmlformats.org/officeDocument/2006/relationships" xmlns:p="http://schemas.openxmlformats.org/presentationml/2006/main">
+  <p:cSld>
+    <p:spTree>
+      <p:nvGrpSpPr>
+        <p:cNvPr id="1" name=""/>
+        <p:cNvGrpSpPr/>
+        <p:nvPr/>
+      </p:nvGrpSpPr>
+      <p:grpSpPr>
+        <a:xfrm>
+          <a:off x="0" y="0"/>
+          <a:ext cx="0" cy="0"/>
+          <a:chOff x="0" y="0"/>
+          <a:chExt cx="0" cy="0"/>
+        </a:xfrm>
+      </p:grpSpPr>
+      <p:sp>
+        <p:nvSpPr>
+          <p:cNvPr id="2" name="Title 1"/>
+          <p:cNvSpPr>
+            <a:spLocks noGrp="1"/>
+          </p:cNvSpPr>
+          <p:nvPr>
+            <p:ph type="title"/>
+          </p:nvPr>
+        </p:nvSpPr>
+        <p:spPr/>
+        <p:txBody>
+          <a:bodyPr/>
+          <a:lstStyle/>
+          <a:p>
+            <a:pPr lvl="0" indent="0" marL="0">
+              <a:buNone/>
+            </a:pPr>
+            <a:r>
+              <a:rPr/>
+              <a:t>💡 MCPが適している例</a:t>
+            </a:r>
+          </a:p>
+        </p:txBody>
+      </p:sp>
+      <p:sp>
+        <p:nvSpPr>
+          <p:cNvPr id="3" name="Content Placeholder 2"/>
+          <p:cNvSpPr>
+            <a:spLocks noGrp="1"/>
+          </p:cNvSpPr>
+          <p:nvPr>
+            <p:ph idx="1"/>
+          </p:nvPr>
+        </p:nvSpPr>
+        <p:spPr/>
+        <p:txBody>
+          <a:bodyPr/>
+          <a:lstStyle/>
+          <a:p>
+            <a:pPr lvl="0" indent="0" marL="0">
+              <a:spcBef>
+                <a:spcPts val="3000"/>
+              </a:spcBef>
+              <a:buNone/>
+            </a:pPr>
+            <a:r>
+              <a:rPr b="1"/>
+              <a:t>✅ AIアシスタント連携</a:t>
+            </a:r>
+          </a:p>
+          <a:p>
+            <a:pPr lvl="0"/>
+            <a:r>
+              <a:rPr/>
+              <a:t>「会議資料を準備して」</a:t>
+            </a:r>
+          </a:p>
+          <a:p>
+            <a:pPr lvl="0"/>
+            <a:r>
+              <a:rPr/>
+              <a:t>AIが必要なツールを自動選択</a:t>
+            </a:r>
+          </a:p>
+          <a:p>
+            <a:pPr lvl="0" indent="0" marL="0">
+              <a:spcBef>
+                <a:spcPts val="3000"/>
+              </a:spcBef>
+              <a:buNone/>
+            </a:pPr>
+            <a:r>
+              <a:rPr b="1"/>
+              <a:t>✅ 社内業務の自動化</a:t>
+            </a:r>
+          </a:p>
+          <a:p>
+            <a:pPr lvl="0"/>
+            <a:r>
+              <a:rPr/>
+              <a:t>機能が頻繁に追加・変更</a:t>
+            </a:r>
+          </a:p>
+          <a:p>
+            <a:pPr lvl="0"/>
+            <a:r>
+              <a:rPr/>
+              <a:t>部署ごとに使い方が違う</a:t>
+            </a:r>
+          </a:p>
+          <a:p>
+            <a:pPr lvl="0" indent="0" marL="0">
+              <a:spcBef>
+                <a:spcPts val="3000"/>
+              </a:spcBef>
+              <a:buNone/>
+            </a:pPr>
+            <a:r>
+              <a:rPr b="1"/>
+              <a:t>✅ 複雑な業務フロー</a:t>
+            </a:r>
+          </a:p>
+          <a:p>
+            <a:pPr lvl="0"/>
+            <a:r>
+              <a:rPr/>
+              <a:t>AIが複数のツールを組み合わせ</a:t>
+            </a:r>
+          </a:p>
+        </p:txBody>
+      </p:sp>
+    </p:spTree>
+  </p:cSld>
+</p:sld>
+</file>
+
+<file path=ppt/slides/slide17.xml><?xml version="1.0" encoding="utf-8"?>
+<p:sld xmlns:a="http://schemas.openxmlformats.org/drawingml/2006/main" xmlns:r="http://schemas.openxmlformats.org/officeDocument/2006/relationships" xmlns:p="http://schemas.openxmlformats.org/presentationml/2006/main">
+  <p:cSld>
+    <p:spTree>
+      <p:nvGrpSpPr>
+        <p:cNvPr id="1" name=""/>
+        <p:cNvGrpSpPr/>
+        <p:nvPr/>
+      </p:nvGrpSpPr>
+      <p:grpSpPr>
+        <a:xfrm>
+          <a:off x="0" y="0"/>
+          <a:ext cx="0" cy="0"/>
+          <a:chOff x="0" y="0"/>
+          <a:chExt cx="0" cy="0"/>
+        </a:xfrm>
+      </p:grpSpPr>
+      <p:sp>
+        <p:nvSpPr>
+          <p:cNvPr id="2" name="Title 1"/>
+          <p:cNvSpPr>
+            <a:spLocks noGrp="1"/>
+          </p:cNvSpPr>
+          <p:nvPr>
+            <p:ph type="title"/>
+          </p:nvPr>
+        </p:nvSpPr>
+        <p:spPr/>
+        <p:txBody>
+          <a:bodyPr/>
+          <a:lstStyle/>
+          <a:p>
+            <a:pPr lvl="0" indent="0" marL="0">
+              <a:buNone/>
+            </a:pPr>
+            <a:r>
+              <a:rPr/>
+              <a:t>📈 将来性</a:t>
+            </a:r>
+          </a:p>
+        </p:txBody>
+      </p:sp>
+      <p:sp>
+        <p:nvSpPr>
+          <p:cNvPr id="3" name="Content Placeholder 2"/>
+          <p:cNvSpPr>
+            <a:spLocks noGrp="1"/>
+          </p:cNvSpPr>
+          <p:nvPr>
+            <p:ph idx="1"/>
+          </p:nvPr>
+        </p:nvSpPr>
+        <p:spPr/>
+        <p:txBody>
+          <a:bodyPr/>
+          <a:lstStyle/>
+          <a:p>
+            <a:pPr lvl="0" indent="0" marL="0">
+              <a:spcBef>
+                <a:spcPts val="3000"/>
+              </a:spcBef>
+              <a:buNone/>
+            </a:pPr>
+            <a:r>
+              <a:rPr b="1"/>
+              <a:t>REST API</a:t>
+            </a:r>
+          </a:p>
+          <a:p>
+            <a:pPr lvl="0"/>
+            <a:r>
+              <a:rPr/>
+              <a:t>✅ 広く普及済み</a:t>
+            </a:r>
+          </a:p>
+          <a:p>
+            <a:pPr lvl="0"/>
+            <a:r>
+              <a:rPr/>
+              <a:t>✅ 豊富なツール・ライブラリ</a:t>
+            </a:r>
+          </a:p>
+          <a:p>
+            <a:pPr lvl="0"/>
+            <a:r>
+              <a:rPr/>
+              <a:t>⚠️ AI時代は追加工夫が必要</a:t>
+            </a:r>
+          </a:p>
+          <a:p>
+            <a:pPr lvl="0" indent="0" marL="0">
+              <a:spcBef>
+                <a:spcPts val="3000"/>
+              </a:spcBef>
+              <a:buNone/>
+            </a:pPr>
+            <a:r>
+              <a:rPr b="1"/>
+              <a:t>MCP</a:t>
+            </a:r>
+          </a:p>
+          <a:p>
+            <a:pPr lvl="0"/>
+            <a:r>
+              <a:rPr/>
+              <a:t>🆕 2024年登場の新技術</a:t>
+            </a:r>
+          </a:p>
+          <a:p>
+            <a:pPr lvl="0"/>
+            <a:r>
+              <a:rPr/>
+              <a:t>📈 AI・エージェント時代に最適</a:t>
+            </a:r>
+          </a:p>
+          <a:p>
+            <a:pPr lvl="0"/>
+            <a:r>
+              <a:rPr/>
+              <a:t>🚀 今後の成長が期待</a:t>
+            </a:r>
+          </a:p>
+          <a:p>
+            <a:pPr lvl="0"/>
+            <a:r>
+              <a:rPr/>
+              <a:t>💡 AnthropicのClaudeが採用</a:t>
+            </a:r>
+          </a:p>
+        </p:txBody>
+      </p:sp>
+    </p:spTree>
+  </p:cSld>
+</p:sld>
+</file>
+
+<file path=ppt/slides/slide18.xml><?xml version="1.0" encoding="utf-8"?>
+<p:sld xmlns:a="http://schemas.openxmlformats.org/drawingml/2006/main" xmlns:r="http://schemas.openxmlformats.org/officeDocument/2006/relationships" xmlns:p="http://schemas.openxmlformats.org/presentationml/2006/main">
+  <p:cSld>
+    <p:spTree>
+      <p:nvGrpSpPr>
+        <p:cNvPr id="1" name=""/>
+        <p:cNvGrpSpPr/>
+        <p:nvPr/>
+      </p:nvGrpSpPr>
+      <p:grpSpPr>
+        <a:xfrm>
+          <a:off x="0" y="0"/>
+          <a:ext cx="0" cy="0"/>
+          <a:chOff x="0" y="0"/>
+          <a:chExt cx="0" cy="0"/>
+        </a:xfrm>
+      </p:grpSpPr>
+      <p:sp>
+        <p:nvSpPr>
+          <p:cNvPr id="2" name="Title 1"/>
+          <p:cNvSpPr>
+            <a:spLocks noGrp="1"/>
+          </p:cNvSpPr>
+          <p:nvPr>
+            <p:ph type="title"/>
+          </p:nvPr>
+        </p:nvSpPr>
+        <p:spPr/>
+        <p:txBody>
+          <a:bodyPr/>
+          <a:lstStyle/>
+          <a:p>
+            <a:pPr lvl="0" indent="0" marL="0">
+              <a:buNone/>
+            </a:pPr>
+            <a:r>
+              <a:rPr/>
+              <a:t>🤝 併用も可能</a:t>
+            </a:r>
+          </a:p>
+        </p:txBody>
+      </p:sp>
+      <p:sp>
+        <p:nvSpPr>
+          <p:cNvPr id="3" name="Content Placeholder 2"/>
+          <p:cNvSpPr>
+            <a:spLocks noGrp="1"/>
+          </p:cNvSpPr>
+          <p:nvPr>
+            <p:ph idx="1"/>
+          </p:nvPr>
+        </p:nvSpPr>
+        <p:spPr/>
+        <p:txBody>
+          <a:bodyPr/>
+          <a:lstStyle/>
+          <a:p>
+            <a:pPr lvl="0" indent="0" marL="0">
+              <a:spcBef>
+                <a:spcPts val="3000"/>
+              </a:spcBef>
+              <a:buNone/>
+            </a:pPr>
+            <a:r>
+              <a:rPr b="1"/>
+              <a:t>使い分け</a:t>
+            </a:r>
+          </a:p>
+          <a:p>
+            <a:pPr lvl="0" indent="0">
+              <a:buNone/>
+            </a:pPr>
+            <a:r>
+              <a:rPr>
+                <a:latin typeface="Courier"/>
+              </a:rPr>
+              <a:t>外部向けAPI → REST API
+     +
+AI連携機能 → MCP</a:t>
+            </a:r>
+          </a:p>
+          <a:p>
+            <a:pPr lvl="0" indent="0" marL="0">
+              <a:spcBef>
+                <a:spcPts val="3000"/>
+              </a:spcBef>
+              <a:buNone/>
+            </a:pPr>
+            <a:r>
+              <a:rPr b="1"/>
+              <a:t>実際の例</a:t>
+            </a:r>
+          </a:p>
+          <a:p>
+            <a:pPr lvl="0"/>
+            <a:r>
+              <a:rPr/>
+              <a:t>一般ユーザー向け: REST API</a:t>
+            </a:r>
+          </a:p>
+          <a:p>
+            <a:pPr lvl="0"/>
+            <a:r>
+              <a:rPr/>
+              <a:t>AIアシスタント向け: MCP</a:t>
+            </a:r>
+          </a:p>
+          <a:p>
+            <a:pPr lvl="0"/>
+            <a:r>
+              <a:rPr b="1"/>
+              <a:t>両方を提供可能</a:t>
+            </a:r>
+          </a:p>
+        </p:txBody>
+      </p:sp>
+    </p:spTree>
+  </p:cSld>
+</p:sld>
+</file>
+
+<file path=ppt/slides/slide19.xml><?xml version="1.0" encoding="utf-8"?>
+<p:sld xmlns:a="http://schemas.openxmlformats.org/drawingml/2006/main" xmlns:r="http://schemas.openxmlformats.org/officeDocument/2006/relationships" xmlns:p="http://schemas.openxmlformats.org/presentationml/2006/main">
+  <p:cSld>
+    <p:spTree>
+      <p:nvGrpSpPr>
+        <p:cNvPr id="1" name=""/>
+        <p:cNvGrpSpPr/>
+        <p:nvPr/>
+      </p:nvGrpSpPr>
+      <p:grpSpPr>
+        <a:xfrm>
+          <a:off x="0" y="0"/>
+          <a:ext cx="0" cy="0"/>
+          <a:chOff x="0" y="0"/>
+          <a:chExt cx="0" cy="0"/>
+        </a:xfrm>
+      </p:grpSpPr>
+      <p:sp>
+        <p:nvSpPr>
+          <p:cNvPr id="2" name="Title 1"/>
+          <p:cNvSpPr>
+            <a:spLocks noGrp="1"/>
+          </p:cNvSpPr>
+          <p:nvPr>
+            <p:ph type="title"/>
+          </p:nvPr>
+        </p:nvSpPr>
+        <p:spPr/>
+        <p:txBody>
+          <a:bodyPr/>
+          <a:lstStyle/>
+          <a:p>
+            <a:pPr lvl="0" indent="0" marL="0">
+              <a:buNone/>
+            </a:pPr>
+            <a:r>
+              <a:rPr/>
+              <a:t>✅ まとめ: 5つのポイント</a:t>
+            </a:r>
+          </a:p>
+        </p:txBody>
+      </p:sp>
+    </p:spTree>
+  </p:cSld>
+</p:sld>
+</file>
+
+<file path=ppt/slides/slide2.xml><?xml version="1.0" encoding="utf-8"?>
+<p:sld xmlns:a="http://schemas.openxmlformats.org/drawingml/2006/main" xmlns:r="http://schemas.openxmlformats.org/officeDocument/2006/relationships" xmlns:p="http://schemas.openxmlformats.org/presentationml/2006/main">
+  <p:cSld>
+    <p:spTree>
+      <p:nvGrpSpPr>
+        <p:cNvPr id="1" name=""/>
+        <p:cNvGrpSpPr/>
+        <p:nvPr/>
+      </p:nvGrpSpPr>
+      <p:grpSpPr>
+        <a:xfrm>
+          <a:off x="0" y="0"/>
+          <a:ext cx="0" cy="0"/>
+          <a:chOff x="0" y="0"/>
+          <a:chExt cx="0" cy="0"/>
+        </a:xfrm>
+      </p:grpSpPr>
+      <p:sp>
+        <p:nvSpPr>
+          <p:cNvPr id="2" name="Title 1"/>
+          <p:cNvSpPr>
+            <a:spLocks noGrp="1"/>
+          </p:cNvSpPr>
+          <p:nvPr>
+            <p:ph type="title"/>
+          </p:nvPr>
+        </p:nvSpPr>
+        <p:spPr/>
+        <p:txBody>
+          <a:bodyPr/>
+          <a:lstStyle/>
+          <a:p>
+            <a:pPr lvl="0" indent="0" marL="0">
+              <a:buNone/>
+            </a:pPr>
+            <a:r>
+              <a:rPr/>
+              <a:t>📋 本日の内容</a:t>
+            </a:r>
+          </a:p>
+        </p:txBody>
+      </p:sp>
+      <p:sp>
+        <p:nvSpPr>
+          <p:cNvPr id="3" name="Content Placeholder 2"/>
+          <p:cNvSpPr>
+            <a:spLocks noGrp="1"/>
+          </p:cNvSpPr>
+          <p:nvPr>
+            <p:ph idx="1"/>
+          </p:nvPr>
+        </p:nvSpPr>
+        <p:spPr/>
+        <p:txBody>
+          <a:bodyPr/>
+          <a:lstStyle/>
+          <a:p>
+            <a:pPr lvl="0"/>
+            <a:r>
+              <a:rPr/>
+              <a:t>REST APIとMCPの違い</a:t>
+            </a:r>
+          </a:p>
+          <a:p>
+            <a:pPr lvl="0"/>
+            <a:r>
+              <a:rPr/>
+              <a:t>レストランの例えで理解</a:t>
+            </a:r>
+          </a:p>
+          <a:p>
+            <a:pPr lvl="0"/>
+            <a:r>
+              <a:rPr/>
+              <a:t>ビジネス価値の比較</a:t>
+            </a:r>
+          </a:p>
+          <a:p>
+            <a:pPr lvl="0"/>
+            <a:r>
+              <a:rPr/>
+              <a:t>具体的なユースケース</a:t>
+            </a:r>
+          </a:p>
+        </p:txBody>
+      </p:sp>
+    </p:spTree>
+  </p:cSld>
+</p:sld>
+</file>
+
+<file path=ppt/slides/slide20.xml><?xml version="1.0" encoding="utf-8"?>
+<p:sld xmlns:a="http://schemas.openxmlformats.org/drawingml/2006/main" xmlns:r="http://schemas.openxmlformats.org/officeDocument/2006/relationships" xmlns:p="http://schemas.openxmlformats.org/presentationml/2006/main">
+  <p:cSld>
+    <p:spTree>
+      <p:nvGrpSpPr>
+        <p:cNvPr id="1" name=""/>
+        <p:cNvGrpSpPr/>
+        <p:nvPr/>
+      </p:nvGrpSpPr>
+      <p:grpSpPr>
+        <a:xfrm>
+          <a:off x="0" y="0"/>
+          <a:ext cx="0" cy="0"/>
+          <a:chOff x="0" y="0"/>
+          <a:chExt cx="0" cy="0"/>
+        </a:xfrm>
+      </p:grpSpPr>
+      <p:sp>
+        <p:nvSpPr>
+          <p:cNvPr id="2" name="Title 1"/>
+          <p:cNvSpPr>
+            <a:spLocks noGrp="1"/>
+          </p:cNvSpPr>
+          <p:nvPr>
+            <p:ph type="title"/>
+          </p:nvPr>
+        </p:nvSpPr>
+        <p:spPr/>
+        <p:txBody>
+          <a:bodyPr/>
+          <a:lstStyle/>
+          <a:p>
+            <a:pPr lvl="0" indent="0" marL="0">
+              <a:buNone/>
+            </a:pPr>
+            <a:r>
+              <a:rPr/>
+              <a:t>1. 自己説明性</a:t>
+            </a:r>
+          </a:p>
+        </p:txBody>
+      </p:sp>
+      <p:sp>
+        <p:nvSpPr>
+          <p:cNvPr id="3" name="Content Placeholder 2"/>
+          <p:cNvSpPr>
+            <a:spLocks noGrp="1"/>
+          </p:cNvSpPr>
+          <p:nvPr>
+            <p:ph idx="1"/>
+          </p:nvPr>
+        </p:nvSpPr>
+        <p:spPr/>
+        <p:txBody>
+          <a:bodyPr/>
+          <a:lstStyle/>
+          <a:p>
+            <a:pPr lvl="0"/>
+            <a:r>
+              <a:rPr b="1"/>
+              <a:t>REST API:</a:t>
+            </a:r>
+            <a:r>
+              <a:rPr/>
+              <a:t> ドキュメントを読む必要がある</a:t>
+            </a:r>
+          </a:p>
+          <a:p>
+            <a:pPr lvl="0"/>
+            <a:r>
+              <a:rPr b="1"/>
+              <a:t>MCP:</a:t>
+            </a:r>
+            <a:r>
+              <a:rPr/>
+              <a:t> システムが「何ができるか」を自動で説明</a:t>
+            </a:r>
+          </a:p>
+        </p:txBody>
+      </p:sp>
+    </p:spTree>
+  </p:cSld>
+</p:sld>
+</file>
+
+<file path=ppt/slides/slide21.xml><?xml version="1.0" encoding="utf-8"?>
+<p:sld xmlns:a="http://schemas.openxmlformats.org/drawingml/2006/main" xmlns:r="http://schemas.openxmlformats.org/officeDocument/2006/relationships" xmlns:p="http://schemas.openxmlformats.org/presentationml/2006/main">
+  <p:cSld>
+    <p:spTree>
+      <p:nvGrpSpPr>
+        <p:cNvPr id="1" name=""/>
+        <p:cNvGrpSpPr/>
+        <p:nvPr/>
+      </p:nvGrpSpPr>
+      <p:grpSpPr>
+        <a:xfrm>
+          <a:off x="0" y="0"/>
+          <a:ext cx="0" cy="0"/>
+          <a:chOff x="0" y="0"/>
+          <a:chExt cx="0" cy="0"/>
+        </a:xfrm>
+      </p:grpSpPr>
+      <p:sp>
+        <p:nvSpPr>
+          <p:cNvPr id="2" name="Title 1"/>
+          <p:cNvSpPr>
+            <a:spLocks noGrp="1"/>
+          </p:cNvSpPr>
+          <p:nvPr>
+            <p:ph type="title"/>
+          </p:nvPr>
+        </p:nvSpPr>
+        <p:spPr/>
+        <p:txBody>
+          <a:bodyPr/>
+          <a:lstStyle/>
+          <a:p>
+            <a:pPr lvl="0" indent="0" marL="0">
+              <a:buNone/>
+            </a:pPr>
+            <a:r>
+              <a:rPr/>
+              <a:t>2. AI対応</a:t>
+            </a:r>
+          </a:p>
+        </p:txBody>
+      </p:sp>
+      <p:sp>
+        <p:nvSpPr>
+          <p:cNvPr id="3" name="Content Placeholder 2"/>
+          <p:cNvSpPr>
+            <a:spLocks noGrp="1"/>
+          </p:cNvSpPr>
+          <p:nvPr>
+            <p:ph idx="1"/>
+          </p:nvPr>
+        </p:nvSpPr>
+        <p:spPr/>
+        <p:txBody>
+          <a:bodyPr/>
+          <a:lstStyle/>
+          <a:p>
+            <a:pPr lvl="0"/>
+            <a:r>
+              <a:rPr b="1"/>
+              <a:t>REST API:</a:t>
+            </a:r>
+            <a:r>
+              <a:rPr/>
+              <a:t> AIに使わせるには追加設定が必要</a:t>
+            </a:r>
+          </a:p>
+          <a:p>
+            <a:pPr lvl="0"/>
+            <a:r>
+              <a:rPr b="1"/>
+              <a:t>MCP:</a:t>
+            </a:r>
+            <a:r>
+              <a:rPr/>
+              <a:t> AIがそのまま理解して使える</a:t>
+            </a:r>
+          </a:p>
+        </p:txBody>
+      </p:sp>
+    </p:spTree>
+  </p:cSld>
+</p:sld>
+</file>
+
+<file path=ppt/slides/slide22.xml><?xml version="1.0" encoding="utf-8"?>
+<p:sld xmlns:a="http://schemas.openxmlformats.org/drawingml/2006/main" xmlns:r="http://schemas.openxmlformats.org/officeDocument/2006/relationships" xmlns:p="http://schemas.openxmlformats.org/presentationml/2006/main">
+  <p:cSld>
+    <p:spTree>
+      <p:nvGrpSpPr>
+        <p:cNvPr id="1" name=""/>
+        <p:cNvGrpSpPr/>
+        <p:nvPr/>
+      </p:nvGrpSpPr>
+      <p:grpSpPr>
+        <a:xfrm>
+          <a:off x="0" y="0"/>
+          <a:ext cx="0" cy="0"/>
+          <a:chOff x="0" y="0"/>
+          <a:chExt cx="0" cy="0"/>
+        </a:xfrm>
+      </p:grpSpPr>
+      <p:sp>
+        <p:nvSpPr>
+          <p:cNvPr id="2" name="Title 1"/>
+          <p:cNvSpPr>
+            <a:spLocks noGrp="1"/>
+          </p:cNvSpPr>
+          <p:nvPr>
+            <p:ph type="title"/>
+          </p:nvPr>
+        </p:nvSpPr>
+        <p:spPr/>
+        <p:txBody>
+          <a:bodyPr/>
+          <a:lstStyle/>
+          <a:p>
+            <a:pPr lvl="0" indent="0" marL="0">
+              <a:buNone/>
+            </a:pPr>
+            <a:r>
+              <a:rPr/>
+              <a:t>3. 変更への対応</a:t>
+            </a:r>
+          </a:p>
+        </p:txBody>
+      </p:sp>
+      <p:sp>
+        <p:nvSpPr>
+          <p:cNvPr id="3" name="Content Placeholder 2"/>
+          <p:cNvSpPr>
+            <a:spLocks noGrp="1"/>
+          </p:cNvSpPr>
+          <p:nvPr>
+            <p:ph idx="1"/>
+          </p:nvPr>
+        </p:nvSpPr>
+        <p:spPr/>
+        <p:txBody>
+          <a:bodyPr/>
+          <a:lstStyle/>
+          <a:p>
+            <a:pPr lvl="0"/>
+            <a:r>
+              <a:rPr b="1"/>
+              <a:t>REST API:</a:t>
+            </a:r>
+            <a:r>
+              <a:rPr/>
+              <a:t> 変更時にドキュメントも更新が必要</a:t>
+            </a:r>
+          </a:p>
+          <a:p>
+            <a:pPr lvl="0"/>
+            <a:r>
+              <a:rPr b="1"/>
+              <a:t>MCP:</a:t>
+            </a:r>
+            <a:r>
+              <a:rPr/>
+              <a:t> システムが自動で最新情報を提供</a:t>
+            </a:r>
+          </a:p>
+        </p:txBody>
+      </p:sp>
+    </p:spTree>
+  </p:cSld>
+</p:sld>
+</file>
+
+<file path=ppt/slides/slide23.xml><?xml version="1.0" encoding="utf-8"?>
+<p:sld xmlns:a="http://schemas.openxmlformats.org/drawingml/2006/main" xmlns:r="http://schemas.openxmlformats.org/officeDocument/2006/relationships" xmlns:p="http://schemas.openxmlformats.org/presentationml/2006/main">
+  <p:cSld>
+    <p:spTree>
+      <p:nvGrpSpPr>
+        <p:cNvPr id="1" name=""/>
+        <p:cNvGrpSpPr/>
+        <p:nvPr/>
+      </p:nvGrpSpPr>
+      <p:grpSpPr>
+        <a:xfrm>
+          <a:off x="0" y="0"/>
+          <a:ext cx="0" cy="0"/>
+          <a:chOff x="0" y="0"/>
+          <a:chExt cx="0" cy="0"/>
+        </a:xfrm>
+      </p:grpSpPr>
+      <p:sp>
+        <p:nvSpPr>
+          <p:cNvPr id="2" name="Title 1"/>
+          <p:cNvSpPr>
+            <a:spLocks noGrp="1"/>
+          </p:cNvSpPr>
+          <p:nvPr>
+            <p:ph type="title"/>
+          </p:nvPr>
+        </p:nvSpPr>
+        <p:spPr/>
+        <p:txBody>
+          <a:bodyPr/>
+          <a:lstStyle/>
+          <a:p>
+            <a:pPr lvl="0" indent="0" marL="0">
+              <a:buNone/>
+            </a:pPr>
+            <a:r>
+              <a:rPr/>
+              <a:t>4. 使い分け</a:t>
+            </a:r>
+          </a:p>
+        </p:txBody>
+      </p:sp>
+      <p:sp>
+        <p:nvSpPr>
+          <p:cNvPr id="3" name="Content Placeholder 2"/>
+          <p:cNvSpPr>
+            <a:spLocks noGrp="1"/>
+          </p:cNvSpPr>
+          <p:nvPr>
+            <p:ph idx="1"/>
+          </p:nvPr>
+        </p:nvSpPr>
+        <p:spPr/>
+        <p:txBody>
+          <a:bodyPr/>
+          <a:lstStyle/>
+          <a:p>
+            <a:pPr lvl="0"/>
+            <a:r>
+              <a:rPr b="1"/>
+              <a:t>REST API:</a:t>
+            </a:r>
+            <a:r>
+              <a:rPr/>
+              <a:t> 一般的なWebサービス、外部公開API</a:t>
+            </a:r>
+          </a:p>
+          <a:p>
+            <a:pPr lvl="0"/>
+            <a:r>
+              <a:rPr b="1"/>
+              <a:t>MCP:</a:t>
+            </a:r>
+            <a:r>
+              <a:rPr/>
+              <a:t> AI連携、社内ツール、エージェントシステム</a:t>
+            </a:r>
+          </a:p>
+        </p:txBody>
+      </p:sp>
+    </p:spTree>
+  </p:cSld>
+</p:sld>
+</file>
+
+<file path=ppt/slides/slide24.xml><?xml version="1.0" encoding="utf-8"?>
+<p:sld xmlns:a="http://schemas.openxmlformats.org/drawingml/2006/main" xmlns:r="http://schemas.openxmlformats.org/officeDocument/2006/relationships" xmlns:p="http://schemas.openxmlformats.org/presentationml/2006/main">
+  <p:cSld>
+    <p:spTree>
+      <p:nvGrpSpPr>
+        <p:cNvPr id="1" name=""/>
+        <p:cNvGrpSpPr/>
+        <p:nvPr/>
+      </p:nvGrpSpPr>
+      <p:grpSpPr>
+        <a:xfrm>
+          <a:off x="0" y="0"/>
+          <a:ext cx="0" cy="0"/>
+          <a:chOff x="0" y="0"/>
+          <a:chExt cx="0" cy="0"/>
+        </a:xfrm>
+      </p:grpSpPr>
+      <p:sp>
+        <p:nvSpPr>
+          <p:cNvPr id="2" name="Title 1"/>
+          <p:cNvSpPr>
+            <a:spLocks noGrp="1"/>
+          </p:cNvSpPr>
+          <p:nvPr>
+            <p:ph type="title"/>
+          </p:nvPr>
+        </p:nvSpPr>
+        <p:spPr/>
+        <p:txBody>
+          <a:bodyPr/>
+          <a:lstStyle/>
+          <a:p>
+            <a:pPr lvl="0" indent="0" marL="0">
+              <a:buNone/>
+            </a:pPr>
+            <a:r>
+              <a:rPr/>
+              <a:t>5. 将来性</a:t>
+            </a:r>
+          </a:p>
+        </p:txBody>
+      </p:sp>
+      <p:sp>
+        <p:nvSpPr>
+          <p:cNvPr id="3" name="Content Placeholder 2"/>
+          <p:cNvSpPr>
+            <a:spLocks noGrp="1"/>
+          </p:cNvSpPr>
+          <p:nvPr>
+            <p:ph idx="1"/>
+          </p:nvPr>
+        </p:nvSpPr>
+        <p:spPr/>
+        <p:txBody>
+          <a:bodyPr/>
+          <a:lstStyle/>
+          <a:p>
+            <a:pPr lvl="0"/>
+            <a:r>
+              <a:rPr b="1"/>
+              <a:t>REST API:</a:t>
+            </a:r>
+            <a:r>
+              <a:rPr/>
+              <a:t> 実績豊富で安定</a:t>
+            </a:r>
+          </a:p>
+          <a:p>
+            <a:pPr lvl="0"/>
+            <a:r>
+              <a:rPr b="1"/>
+              <a:t>MCP:</a:t>
+            </a:r>
+            <a:r>
+              <a:rPr/>
+              <a:t> AI時代の新しい標準として期待</a:t>
+            </a:r>
+          </a:p>
+        </p:txBody>
+      </p:sp>
+    </p:spTree>
+  </p:cSld>
+</p:sld>
+</file>
+
+<file path=ppt/slides/slide25.xml><?xml version="1.0" encoding="utf-8"?>
+<p:sld xmlns:a="http://schemas.openxmlformats.org/drawingml/2006/main" xmlns:r="http://schemas.openxmlformats.org/officeDocument/2006/relationships" xmlns:p="http://schemas.openxmlformats.org/presentationml/2006/main">
+  <p:cSld>
+    <p:spTree>
+      <p:nvGrpSpPr>
+        <p:cNvPr id="1" name=""/>
+        <p:cNvGrpSpPr/>
+        <p:nvPr/>
+      </p:nvGrpSpPr>
+      <p:grpSpPr>
+        <a:xfrm>
+          <a:off x="0" y="0"/>
+          <a:ext cx="0" cy="0"/>
+          <a:chOff x="0" y="0"/>
+          <a:chExt cx="0" cy="0"/>
+        </a:xfrm>
+      </p:grpSpPr>
+      <p:sp>
+        <p:nvSpPr>
+          <p:cNvPr id="2" name="Title 1"/>
+          <p:cNvSpPr>
+            <a:spLocks noGrp="1"/>
+          </p:cNvSpPr>
+          <p:nvPr>
+            <p:ph type="title"/>
+          </p:nvPr>
+        </p:nvSpPr>
+        <p:spPr/>
+        <p:txBody>
+          <a:bodyPr/>
+          <a:lstStyle/>
+          <a:p>
+            <a:pPr lvl="0" indent="0" marL="0">
+              <a:buNone/>
+            </a:pPr>
+            <a:r>
+              <a:rPr/>
+              <a:t>💡 よくある質問（1/3）</a:t>
+            </a:r>
+          </a:p>
+        </p:txBody>
+      </p:sp>
+      <p:sp>
+        <p:nvSpPr>
+          <p:cNvPr id="3" name="Content Placeholder 2"/>
+          <p:cNvSpPr>
+            <a:spLocks noGrp="1"/>
+          </p:cNvSpPr>
+          <p:nvPr>
+            <p:ph idx="1"/>
+          </p:nvPr>
+        </p:nvSpPr>
+        <p:spPr/>
+        <p:txBody>
+          <a:bodyPr/>
+          <a:lstStyle/>
+          <a:p>
+            <a:pPr lvl="0" indent="0" marL="0">
+              <a:spcBef>
+                <a:spcPts val="3000"/>
+              </a:spcBef>
+              <a:buNone/>
+            </a:pPr>
+            <a:r>
+              <a:rPr b="1"/>
+              <a:t>Q: REST APIから移行すべき？</a:t>
+            </a:r>
+          </a:p>
+          <a:p>
+            <a:pPr lvl="0" indent="0" marL="0">
+              <a:buNone/>
+            </a:pPr>
+            <a:r>
+              <a:rPr b="1"/>
+              <a:t>A:</a:t>
+            </a:r>
+            <a:r>
+              <a:rPr/>
+              <a:t> いいえ。既存のREST APIはそのまま継続。</a:t>
+            </a:r>
+            <a:br/>
+            <a:r>
+              <a:rPr/>
+              <a:t>AI連携が必要な部分だけMCPを追加することも可能。</a:t>
+            </a:r>
+          </a:p>
+        </p:txBody>
+      </p:sp>
+    </p:spTree>
+  </p:cSld>
+</p:sld>
+</file>
+
+<file path=ppt/slides/slide26.xml><?xml version="1.0" encoding="utf-8"?>
+<p:sld xmlns:a="http://schemas.openxmlformats.org/drawingml/2006/main" xmlns:r="http://schemas.openxmlformats.org/officeDocument/2006/relationships" xmlns:p="http://schemas.openxmlformats.org/presentationml/2006/main">
+  <p:cSld>
+    <p:spTree>
+      <p:nvGrpSpPr>
+        <p:cNvPr id="1" name=""/>
+        <p:cNvGrpSpPr/>
+        <p:nvPr/>
+      </p:nvGrpSpPr>
+      <p:grpSpPr>
+        <a:xfrm>
+          <a:off x="0" y="0"/>
+          <a:ext cx="0" cy="0"/>
+          <a:chOff x="0" y="0"/>
+          <a:chExt cx="0" cy="0"/>
+        </a:xfrm>
+      </p:grpSpPr>
+      <p:sp>
+        <p:nvSpPr>
+          <p:cNvPr id="2" name="Title 1"/>
+          <p:cNvSpPr>
+            <a:spLocks noGrp="1"/>
+          </p:cNvSpPr>
+          <p:nvPr>
+            <p:ph type="title"/>
+          </p:nvPr>
+        </p:nvSpPr>
+        <p:spPr/>
+        <p:txBody>
+          <a:bodyPr/>
+          <a:lstStyle/>
+          <a:p>
+            <a:pPr lvl="0" indent="0" marL="0">
+              <a:buNone/>
+            </a:pPr>
+            <a:r>
+              <a:rPr/>
+              <a:t>💡 よくある質問（2/3）</a:t>
+            </a:r>
+          </a:p>
+        </p:txBody>
+      </p:sp>
+      <p:sp>
+        <p:nvSpPr>
+          <p:cNvPr id="3" name="Content Placeholder 2"/>
+          <p:cNvSpPr>
+            <a:spLocks noGrp="1"/>
+          </p:cNvSpPr>
+          <p:nvPr>
+            <p:ph idx="1"/>
+          </p:nvPr>
+        </p:nvSpPr>
+        <p:spPr/>
+        <p:txBody>
+          <a:bodyPr/>
+          <a:lstStyle/>
+          <a:p>
+            <a:pPr lvl="0" indent="0" marL="0">
+              <a:spcBef>
+                <a:spcPts val="3000"/>
+              </a:spcBef>
+              <a:buNone/>
+            </a:pPr>
+            <a:r>
+              <a:rPr b="1"/>
+              <a:t>Q: MCPは難しい技術？</a:t>
+            </a:r>
+          </a:p>
+          <a:p>
+            <a:pPr lvl="0" indent="0" marL="0">
+              <a:buNone/>
+            </a:pPr>
+            <a:r>
+              <a:rPr b="1"/>
+              <a:t>A:</a:t>
+            </a:r>
+            <a:r>
+              <a:rPr/>
+              <a:t> エンジニアにとって新しいですが、</a:t>
+            </a:r>
+            <a:br/>
+            <a:r>
+              <a:rPr/>
+              <a:t>特別に難しくはありません。</a:t>
+            </a:r>
+            <a:br/>
+            <a:r>
+              <a:rPr/>
+              <a:t>むしろ使う側は楽になります。</a:t>
+            </a:r>
+          </a:p>
+        </p:txBody>
+      </p:sp>
+    </p:spTree>
+  </p:cSld>
+</p:sld>
+</file>
+
+<file path=ppt/slides/slide27.xml><?xml version="1.0" encoding="utf-8"?>
+<p:sld xmlns:a="http://schemas.openxmlformats.org/drawingml/2006/main" xmlns:r="http://schemas.openxmlformats.org/officeDocument/2006/relationships" xmlns:p="http://schemas.openxmlformats.org/presentationml/2006/main">
+  <p:cSld>
+    <p:spTree>
+      <p:nvGrpSpPr>
+        <p:cNvPr id="1" name=""/>
+        <p:cNvGrpSpPr/>
+        <p:nvPr/>
+      </p:nvGrpSpPr>
+      <p:grpSpPr>
+        <a:xfrm>
+          <a:off x="0" y="0"/>
+          <a:ext cx="0" cy="0"/>
+          <a:chOff x="0" y="0"/>
+          <a:chExt cx="0" cy="0"/>
+        </a:xfrm>
+      </p:grpSpPr>
+      <p:sp>
+        <p:nvSpPr>
+          <p:cNvPr id="2" name="Title 1"/>
+          <p:cNvSpPr>
+            <a:spLocks noGrp="1"/>
+          </p:cNvSpPr>
+          <p:nvPr>
+            <p:ph type="title"/>
+          </p:nvPr>
+        </p:nvSpPr>
+        <p:spPr/>
+        <p:txBody>
+          <a:bodyPr/>
+          <a:lstStyle/>
+          <a:p>
+            <a:pPr lvl="0" indent="0" marL="0">
+              <a:buNone/>
+            </a:pPr>
+            <a:r>
+              <a:rPr/>
+              <a:t>💡 よくある質問（3/3）</a:t>
+            </a:r>
+          </a:p>
+        </p:txBody>
+      </p:sp>
+      <p:sp>
+        <p:nvSpPr>
+          <p:cNvPr id="3" name="Content Placeholder 2"/>
+          <p:cNvSpPr>
+            <a:spLocks noGrp="1"/>
+          </p:cNvSpPr>
+          <p:nvPr>
+            <p:ph idx="1"/>
+          </p:nvPr>
+        </p:nvSpPr>
+        <p:spPr/>
+        <p:txBody>
+          <a:bodyPr/>
+          <a:lstStyle/>
+          <a:p>
+            <a:pPr lvl="0" indent="0" marL="0">
+              <a:spcBef>
+                <a:spcPts val="3000"/>
+              </a:spcBef>
+              <a:buNone/>
+            </a:pPr>
+            <a:r>
+              <a:rPr b="1"/>
+              <a:t>Q: いつまでに導入を検討すべき？</a:t>
+            </a:r>
+          </a:p>
+          <a:p>
+            <a:pPr lvl="0" indent="0" marL="0">
+              <a:buNone/>
+            </a:pPr>
+            <a:r>
+              <a:rPr b="1"/>
+              <a:t>A:</a:t>
+            </a:r>
+            <a:r>
+              <a:rPr/>
+              <a:t> AI活用を進めている企業は、</a:t>
+            </a:r>
+            <a:br/>
+            <a:r>
+              <a:rPr/>
+              <a:t>今から検証開始をお勧めします。</a:t>
+            </a:r>
+            <a:br/>
+            <a:r>
+              <a:rPr/>
+              <a:t>2-3年後には標準的な選択肢の一つに。</a:t>
+            </a:r>
+          </a:p>
+        </p:txBody>
+      </p:sp>
+    </p:spTree>
+  </p:cSld>
+</p:sld>
+</file>
+
+<file path=ppt/slides/slide28.xml><?xml version="1.0" encoding="utf-8"?>
+<p:sld xmlns:a="http://schemas.openxmlformats.org/drawingml/2006/main" xmlns:r="http://schemas.openxmlformats.org/officeDocument/2006/relationships" xmlns:p="http://schemas.openxmlformats.org/presentationml/2006/main">
+  <p:cSld>
+    <p:spTree>
+      <p:nvGrpSpPr>
+        <p:cNvPr id="1" name=""/>
+        <p:cNvGrpSpPr/>
+        <p:nvPr/>
+      </p:nvGrpSpPr>
+      <p:grpSpPr>
+        <a:xfrm>
+          <a:off x="0" y="0"/>
+          <a:ext cx="0" cy="0"/>
+          <a:chOff x="0" y="0"/>
+          <a:chExt cx="0" cy="0"/>
+        </a:xfrm>
+      </p:grpSpPr>
+      <p:sp>
+        <p:nvSpPr>
+          <p:cNvPr id="2" name="Title 1"/>
+          <p:cNvSpPr>
+            <a:spLocks noGrp="1"/>
+          </p:cNvSpPr>
+          <p:nvPr>
+            <p:ph type="title"/>
+          </p:nvPr>
+        </p:nvSpPr>
+        <p:spPr/>
+        <p:txBody>
+          <a:bodyPr/>
+          <a:lstStyle/>
+          <a:p>
+            <a:pPr lvl="0" indent="0" marL="0">
+              <a:buNone/>
+            </a:pPr>
+            <a:r>
+              <a:rPr/>
+              <a:t>🎓 Next Steps</a:t>
+            </a:r>
+          </a:p>
+        </p:txBody>
+      </p:sp>
+      <p:sp>
+        <p:nvSpPr>
+          <p:cNvPr id="3" name="Content Placeholder 2"/>
+          <p:cNvSpPr>
+            <a:spLocks noGrp="1"/>
+          </p:cNvSpPr>
+          <p:nvPr>
+            <p:ph idx="1"/>
+          </p:nvPr>
+        </p:nvSpPr>
+        <p:spPr/>
+        <p:txBody>
+          <a:bodyPr/>
+          <a:lstStyle/>
+          <a:p>
+            <a:pPr lvl="0" indent="0" marL="0">
+              <a:spcBef>
+                <a:spcPts val="3000"/>
+              </a:spcBef>
+              <a:buNone/>
+            </a:pPr>
+            <a:r>
+              <a:rPr b="1"/>
+              <a:t>1. 体験してみる</a:t>
+            </a:r>
+          </a:p>
+          <a:p>
+            <a:pPr lvl="0"/>
+            <a:r>
+              <a:rPr/>
+              <a:t>エンジニアと一緒に5分試す</a:t>
+            </a:r>
+          </a:p>
+          <a:p>
+            <a:pPr lvl="0" indent="0" marL="0">
+              <a:spcBef>
+                <a:spcPts val="3000"/>
+              </a:spcBef>
+              <a:buNone/>
+            </a:pPr>
+            <a:r>
+              <a:rPr b="1"/>
+              <a:t>2. ビジネス検討</a:t>
+            </a:r>
+          </a:p>
+          <a:p>
+            <a:pPr lvl="0"/>
+            <a:r>
+              <a:rPr/>
+              <a:t>自社のAI活用戦略との適合性</a:t>
+            </a:r>
+          </a:p>
+          <a:p>
+            <a:pPr lvl="0" indent="0" marL="0">
+              <a:spcBef>
+                <a:spcPts val="3000"/>
+              </a:spcBef>
+              <a:buNone/>
+            </a:pPr>
+            <a:r>
+              <a:rPr b="1"/>
+              <a:t>3. 詳細を学ぶ</a:t>
+            </a:r>
+          </a:p>
+          <a:p>
+            <a:pPr lvl="0"/>
+            <a:r>
+              <a:rPr/>
+              <a:t>技術詳細は guide.md を参照</a:t>
+            </a:r>
+          </a:p>
+        </p:txBody>
+      </p:sp>
+    </p:spTree>
+  </p:cSld>
+</p:sld>
+</file>
+
+<file path=ppt/slides/slide29.xml><?xml version="1.0" encoding="utf-8"?>
+<p:sld xmlns:a="http://schemas.openxmlformats.org/drawingml/2006/main" xmlns:r="http://schemas.openxmlformats.org/officeDocument/2006/relationships" xmlns:p="http://schemas.openxmlformats.org/presentationml/2006/main">
+  <p:cSld>
+    <p:spTree>
+      <p:nvGrpSpPr>
+        <p:cNvPr id="1" name=""/>
+        <p:cNvGrpSpPr/>
+        <p:nvPr/>
+      </p:nvGrpSpPr>
+      <p:grpSpPr>
+        <a:xfrm>
+          <a:off x="0" y="0"/>
+          <a:ext cx="0" cy="0"/>
+          <a:chOff x="0" y="0"/>
+          <a:chExt cx="0" cy="0"/>
+        </a:xfrm>
+      </p:grpSpPr>
+      <p:sp>
+        <p:nvSpPr>
+          <p:cNvPr id="2" name="Title 1"/>
+          <p:cNvSpPr>
+            <a:spLocks noGrp="1"/>
+          </p:cNvSpPr>
+          <p:nvPr>
+            <p:ph type="title"/>
+          </p:nvPr>
+        </p:nvSpPr>
+        <p:spPr/>
+        <p:txBody>
+          <a:bodyPr/>
+          <a:lstStyle/>
+          <a:p>
+            <a:pPr lvl="0" indent="0" marL="0">
+              <a:buNone/>
+            </a:pPr>
+            <a:r>
+              <a:rPr/>
+              <a:t>ご清聴ありがとうございました</a:t>
+            </a:r>
+          </a:p>
+        </p:txBody>
+      </p:sp>
+      <p:sp>
+        <p:nvSpPr>
+          <p:cNvPr id="3" name="Content Placeholder 2"/>
+          <p:cNvSpPr>
+            <a:spLocks noGrp="1"/>
+          </p:cNvSpPr>
+          <p:nvPr>
+            <p:ph idx="1"/>
+          </p:nvPr>
+        </p:nvSpPr>
+        <p:spPr/>
+        <p:txBody>
+          <a:bodyPr/>
+          <a:lstStyle/>
+          <a:p>
+            <a:pPr lvl="0" indent="0" marL="0">
+              <a:buNone/>
+            </a:pPr>
+            <a:r>
+              <a:rPr b="1"/>
+              <a:t>質問・お問い合わせ</a:t>
+            </a:r>
+          </a:p>
+          <a:p>
+            <a:pPr lvl="0" indent="0" marL="0">
+              <a:buNone/>
+            </a:pPr>
+            <a:r>
+              <a:rPr/>
+              <a:t>詳細な技術ドキュメント:</a:t>
+            </a:r>
+            <a:br/>
+            <a:r>
+              <a:rPr>
+                <a:latin typeface="Courier"/>
+              </a:rPr>
+              <a:t>guide.md</a:t>
+            </a:r>
+            <a:r>
+              <a:rPr/>
+              <a:t> を参照してください</a:t>
+            </a:r>
+          </a:p>
+        </p:txBody>
+      </p:sp>
+    </p:spTree>
+  </p:cSld>
+</p:sld>
+</file>
+
+<file path=ppt/slides/slide3.xml><?xml version="1.0" encoding="utf-8"?>
+<p:sld xmlns:a="http://schemas.openxmlformats.org/drawingml/2006/main" xmlns:r="http://schemas.openxmlformats.org/officeDocument/2006/relationships" xmlns:p="http://schemas.openxmlformats.org/presentationml/2006/main">
+  <p:cSld>
+    <p:spTree>
+      <p:nvGrpSpPr>
+        <p:cNvPr id="1" name=""/>
+        <p:cNvGrpSpPr/>
+        <p:nvPr/>
+      </p:nvGrpSpPr>
+      <p:grpSpPr>
+        <a:xfrm>
+          <a:off x="0" y="0"/>
+          <a:ext cx="0" cy="0"/>
+          <a:chOff x="0" y="0"/>
+          <a:chExt cx="0" cy="0"/>
+        </a:xfrm>
+      </p:grpSpPr>
+      <p:sp>
+        <p:nvSpPr>
+          <p:cNvPr id="2" name="Title 1"/>
+          <p:cNvSpPr>
+            <a:spLocks noGrp="1"/>
+          </p:cNvSpPr>
+          <p:nvPr>
+            <p:ph type="title"/>
+          </p:nvPr>
+        </p:nvSpPr>
+        <p:spPr/>
+        <p:txBody>
+          <a:bodyPr/>
+          <a:lstStyle/>
+          <a:p>
+            <a:pPr lvl="0" indent="0" marL="0">
+              <a:buNone/>
+            </a:pPr>
+            <a:r>
+              <a:rPr/>
+              <a:t>🤔 一言で言うと</a:t>
+            </a:r>
+          </a:p>
+        </p:txBody>
+      </p:sp>
+      <p:sp>
+        <p:nvSpPr>
+          <p:cNvPr id="3" name="Content Placeholder 2"/>
+          <p:cNvSpPr>
+            <a:spLocks noGrp="1"/>
+          </p:cNvSpPr>
+          <p:nvPr>
+            <p:ph idx="1"/>
+          </p:nvPr>
+        </p:nvSpPr>
+        <p:spPr/>
+        <p:txBody>
+          <a:bodyPr/>
+          <a:lstStyle/>
+          <a:p>
+            <a:pPr lvl="0" indent="0" marL="0">
+              <a:spcBef>
+                <a:spcPts val="3000"/>
+              </a:spcBef>
+              <a:buNone/>
+            </a:pPr>
+            <a:r>
+              <a:rPr b="1"/>
+              <a:t>REST API</a:t>
+            </a:r>
+          </a:p>
+          <a:p>
+            <a:pPr lvl="0" indent="0" marL="0">
+              <a:buNone/>
+            </a:pPr>
+            <a:r>
+              <a:rPr b="1"/>
+              <a:t>レストランのメニュー（紙）</a:t>
+            </a:r>
+          </a:p>
+          <a:p>
+            <a:pPr lvl="0" indent="0" marL="0">
+              <a:spcBef>
+                <a:spcPts val="3000"/>
+              </a:spcBef>
+              <a:buNone/>
+            </a:pPr>
+            <a:r>
+              <a:rPr b="1"/>
+              <a:t>MCP</a:t>
+            </a:r>
+          </a:p>
+          <a:p>
+            <a:pPr lvl="0" indent="0" marL="0">
+              <a:buNone/>
+            </a:pPr>
+            <a:r>
+              <a:rPr b="1"/>
+              <a:t>スマートなウェイター（AI対応）</a:t>
+            </a:r>
+          </a:p>
+        </p:txBody>
+      </p:sp>
+    </p:spTree>
+  </p:cSld>
+</p:sld>
+</file>
+
+<file path=ppt/slides/slide4.xml><?xml version="1.0" encoding="utf-8"?>
+<p:sld xmlns:a="http://schemas.openxmlformats.org/drawingml/2006/main" xmlns:r="http://schemas.openxmlformats.org/officeDocument/2006/relationships" xmlns:p="http://schemas.openxmlformats.org/presentationml/2006/main">
+  <p:cSld>
+    <p:spTree>
+      <p:nvGrpSpPr>
+        <p:cNvPr id="1" name=""/>
+        <p:cNvGrpSpPr/>
+        <p:nvPr/>
+      </p:nvGrpSpPr>
+      <p:grpSpPr>
+        <a:xfrm>
+          <a:off x="0" y="0"/>
+          <a:ext cx="0" cy="0"/>
+          <a:chOff x="0" y="0"/>
+          <a:chExt cx="0" cy="0"/>
+        </a:xfrm>
+      </p:grpSpPr>
+      <p:sp>
+        <p:nvSpPr>
+          <p:cNvPr id="2" name="Title 1"/>
+          <p:cNvSpPr>
+            <a:spLocks noGrp="1"/>
+          </p:cNvSpPr>
+          <p:nvPr>
+            <p:ph type="title"/>
+          </p:nvPr>
+        </p:nvSpPr>
+        <p:spPr/>
+        <p:txBody>
+          <a:bodyPr/>
+          <a:lstStyle/>
+          <a:p>
+            <a:pPr lvl="0" indent="0" marL="0">
+              <a:buNone/>
+            </a:pPr>
+            <a:r>
+              <a:rPr/>
+              <a:t>📖 REST API = 紙のメニュー</a:t>
+            </a:r>
+          </a:p>
+        </p:txBody>
+      </p:sp>
+      <p:sp>
+        <p:nvSpPr>
+          <p:cNvPr id="3" name="Content Placeholder 2"/>
+          <p:cNvSpPr>
+            <a:spLocks noGrp="1"/>
+          </p:cNvSpPr>
+          <p:nvPr>
+            <p:ph idx="1"/>
+          </p:nvPr>
+        </p:nvSpPr>
+        <p:spPr/>
+        <p:txBody>
+          <a:bodyPr/>
+          <a:lstStyle/>
+          <a:p>
+            <a:pPr lvl="0" indent="0" marL="0">
+              <a:spcBef>
+                <a:spcPts val="3000"/>
+              </a:spcBef>
+              <a:buNone/>
+            </a:pPr>
+            <a:r>
+              <a:rPr b="1"/>
+              <a:t>使い方</a:t>
+            </a:r>
+          </a:p>
+          <a:p>
+            <a:pPr lvl="0" indent="-342900" marL="342900">
+              <a:buAutoNum type="arabicPeriod"/>
+            </a:pPr>
+            <a:r>
+              <a:rPr/>
+              <a:t>紙のメニューを見る</a:t>
+            </a:r>
+          </a:p>
+          <a:p>
+            <a:pPr lvl="0" indent="-342900" marL="342900">
+              <a:buAutoNum type="arabicPeriod"/>
+            </a:pPr>
+            <a:r>
+              <a:rPr/>
+              <a:t>注文を伝える</a:t>
+            </a:r>
+          </a:p>
+          <a:p>
+            <a:pPr lvl="0" indent="-342900" marL="342900">
+              <a:buAutoNum type="arabicPeriod"/>
+            </a:pPr>
+            <a:r>
+              <a:rPr/>
+              <a:t>ウェイターが持ってくる</a:t>
+            </a:r>
+          </a:p>
+        </p:txBody>
+      </p:sp>
+    </p:spTree>
+  </p:cSld>
+</p:sld>
+</file>
+
+<file path=ppt/slides/slide5.xml><?xml version="1.0" encoding="utf-8"?>
+<p:sld xmlns:a="http://schemas.openxmlformats.org/drawingml/2006/main" xmlns:r="http://schemas.openxmlformats.org/officeDocument/2006/relationships" xmlns:p="http://schemas.openxmlformats.org/presentationml/2006/main">
+  <p:cSld>
+    <p:spTree>
+      <p:nvGrpSpPr>
+        <p:cNvPr id="1" name=""/>
+        <p:cNvGrpSpPr/>
+        <p:nvPr/>
+      </p:nvGrpSpPr>
+      <p:grpSpPr>
+        <a:xfrm>
+          <a:off x="0" y="0"/>
+          <a:ext cx="0" cy="0"/>
+          <a:chOff x="0" y="0"/>
+          <a:chExt cx="0" cy="0"/>
+        </a:xfrm>
+      </p:grpSpPr>
+      <p:sp>
+        <p:nvSpPr>
+          <p:cNvPr id="2" name="Title 1"/>
+          <p:cNvSpPr>
+            <a:spLocks noGrp="1"/>
+          </p:cNvSpPr>
+          <p:nvPr>
+            <p:ph type="title"/>
+          </p:nvPr>
+        </p:nvSpPr>
+        <p:spPr/>
+        <p:txBody>
+          <a:bodyPr/>
+          <a:lstStyle/>
+          <a:p>
+            <a:pPr lvl="0" indent="0" marL="0">
+              <a:buNone/>
+            </a:pPr>
+            <a:r>
+              <a:rPr/>
+              <a:t>REST APIの特徴</a:t>
+            </a:r>
+          </a:p>
+        </p:txBody>
+      </p:sp>
+      <p:sp>
+        <p:nvSpPr>
+          <p:cNvPr id="3" name="Content Placeholder 2"/>
+          <p:cNvSpPr>
+            <a:spLocks noGrp="1"/>
+          </p:cNvSpPr>
+          <p:nvPr>
+            <p:ph idx="1"/>
+          </p:nvPr>
+        </p:nvSpPr>
+        <p:spPr/>
+        <p:txBody>
+          <a:bodyPr/>
+          <a:lstStyle/>
+          <a:p>
+            <a:pPr lvl="0" indent="0" marL="0">
+              <a:spcBef>
+                <a:spcPts val="3000"/>
+              </a:spcBef>
+              <a:buNone/>
+            </a:pPr>
+            <a:r>
+              <a:rPr b="1"/>
+              <a:t>✅ メリット</a:t>
+            </a:r>
+          </a:p>
+          <a:p>
+            <a:pPr lvl="0"/>
+            <a:r>
+              <a:rPr/>
+              <a:t>シンプルで分かりやすい</a:t>
+            </a:r>
+          </a:p>
+          <a:p>
+            <a:pPr lvl="0"/>
+            <a:r>
+              <a:rPr/>
+              <a:t>誰でも使える</a:t>
+            </a:r>
+          </a:p>
+          <a:p>
+            <a:pPr lvl="0" indent="0" marL="0">
+              <a:spcBef>
+                <a:spcPts val="3000"/>
+              </a:spcBef>
+              <a:buNone/>
+            </a:pPr>
+            <a:r>
+              <a:rPr b="1"/>
+              <a:t>❌ デメリット</a:t>
+            </a:r>
+          </a:p>
+          <a:p>
+            <a:pPr lvl="0"/>
+            <a:r>
+              <a:rPr/>
+              <a:t>メニューに載っていない料理は注文不可</a:t>
+            </a:r>
+          </a:p>
+          <a:p>
+            <a:pPr lvl="0"/>
+            <a:r>
+              <a:rPr/>
+              <a:t>メニュー更新が手動</a:t>
+            </a:r>
+          </a:p>
+          <a:p>
+            <a:pPr lvl="0"/>
+            <a:r>
+              <a:rPr/>
+              <a:t>ウェイターに質問できない</a:t>
+            </a:r>
+          </a:p>
+        </p:txBody>
+      </p:sp>
+    </p:spTree>
+  </p:cSld>
+</p:sld>
+</file>
+
+<file path=ppt/slides/slide6.xml><?xml version="1.0" encoding="utf-8"?>
+<p:sld xmlns:a="http://schemas.openxmlformats.org/drawingml/2006/main" xmlns:r="http://schemas.openxmlformats.org/officeDocument/2006/relationships" xmlns:p="http://schemas.openxmlformats.org/presentationml/2006/main">
+  <p:cSld>
+    <p:spTree>
+      <p:nvGrpSpPr>
+        <p:cNvPr id="1" name=""/>
+        <p:cNvGrpSpPr/>
+        <p:nvPr/>
+      </p:nvGrpSpPr>
+      <p:grpSpPr>
+        <a:xfrm>
+          <a:off x="0" y="0"/>
+          <a:ext cx="0" cy="0"/>
+          <a:chOff x="0" y="0"/>
+          <a:chExt cx="0" cy="0"/>
+        </a:xfrm>
+      </p:grpSpPr>
+      <p:sp>
+        <p:nvSpPr>
+          <p:cNvPr id="2" name="Title 1"/>
+          <p:cNvSpPr>
+            <a:spLocks noGrp="1"/>
+          </p:cNvSpPr>
+          <p:nvPr>
+            <p:ph type="title"/>
+          </p:nvPr>
+        </p:nvSpPr>
+        <p:spPr/>
+        <p:txBody>
+          <a:bodyPr/>
+          <a:lstStyle/>
+          <a:p>
+            <a:pPr lvl="0" indent="0" marL="0">
+              <a:buNone/>
+            </a:pPr>
+            <a:r>
+              <a:rPr/>
+              <a:t>📖 MCP = スマートウェイター</a:t>
+            </a:r>
+          </a:p>
+        </p:txBody>
+      </p:sp>
+      <p:sp>
+        <p:nvSpPr>
+          <p:cNvPr id="3" name="Content Placeholder 2"/>
+          <p:cNvSpPr>
+            <a:spLocks noGrp="1"/>
+          </p:cNvSpPr>
+          <p:nvPr>
+            <p:ph idx="1"/>
+          </p:nvPr>
+        </p:nvSpPr>
+        <p:spPr/>
+        <p:txBody>
+          <a:bodyPr/>
+          <a:lstStyle/>
+          <a:p>
+            <a:pPr lvl="0" indent="0" marL="0">
+              <a:spcBef>
+                <a:spcPts val="3000"/>
+              </a:spcBef>
+              <a:buNone/>
+            </a:pPr>
+            <a:r>
+              <a:rPr b="1"/>
+              <a:t>使い方</a:t>
+            </a:r>
+          </a:p>
+          <a:p>
+            <a:pPr lvl="0" indent="-342900" marL="342900">
+              <a:buAutoNum type="arabicPeriod"/>
+            </a:pPr>
+            <a:r>
+              <a:rPr/>
+              <a:t>ウェイターに話しかける</a:t>
+            </a:r>
+          </a:p>
+          <a:p>
+            <a:pPr lvl="0" indent="-342900" marL="342900">
+              <a:buAutoNum type="arabicPeriod"/>
+            </a:pPr>
+            <a:r>
+              <a:rPr/>
+              <a:t>「今日のメニューは？」と聞く</a:t>
+            </a:r>
+          </a:p>
+          <a:p>
+            <a:pPr lvl="0" indent="-342900" marL="342900">
+              <a:buAutoNum type="arabicPeriod"/>
+            </a:pPr>
+            <a:r>
+              <a:rPr/>
+              <a:t>ウェイターが説明＆提案</a:t>
+            </a:r>
+          </a:p>
+          <a:p>
+            <a:pPr lvl="0" indent="-342900" marL="342900">
+              <a:buAutoNum type="arabicPeriod"/>
+            </a:pPr>
+            <a:r>
+              <a:rPr/>
+              <a:t>対話的に注文</a:t>
+            </a:r>
+          </a:p>
+        </p:txBody>
+      </p:sp>
     </p:spTree>
   </p:cSld>
 </p:sld>
@@ -5030,6 +5924,31 @@
       </p:grpSpPr>
       <p:sp>
         <p:nvSpPr>
+          <p:cNvPr id="2" name="Title 1"/>
+          <p:cNvSpPr>
+            <a:spLocks noGrp="1"/>
+          </p:cNvSpPr>
+          <p:nvPr>
+            <p:ph type="title"/>
+          </p:nvPr>
+        </p:nvSpPr>
+        <p:spPr/>
+        <p:txBody>
+          <a:bodyPr/>
+          <a:lstStyle/>
+          <a:p>
+            <a:pPr lvl="0" indent="0" marL="0">
+              <a:buNone/>
+            </a:pPr>
+            <a:r>
+              <a:rPr/>
+              <a:t>MCPの特徴</a:t>
+            </a:r>
+          </a:p>
+        </p:txBody>
+      </p:sp>
+      <p:sp>
+        <p:nvSpPr>
           <p:cNvPr id="3" name="Content Placeholder 2"/>
           <p:cNvSpPr>
             <a:spLocks noGrp="1"/>
@@ -5044,23 +5963,42 @@
           <a:lstStyle/>
           <a:p>
             <a:pPr lvl="0" indent="0" marL="0">
+              <a:spcBef>
+                <a:spcPts val="3000"/>
+              </a:spcBef>
               <a:buNone/>
             </a:pPr>
             <a:r>
               <a:rPr b="1"/>
-              <a:t>向いているケース:</a:t>
-            </a:r>
-            <a:r>
-              <a:rPr/>
-              <a:t> - </a:t>
-            </a:r>
-            <a:r>
-              <a:rPr b="1"/>
-              <a:t>AIアシスタントとの統合</a:t>
-            </a:r>
-            <a:r>
-              <a:rPr/>
-              <a:t> - 社内の業務自動化ツール - エージェントシステム - 頻繁に機能が変わるシステム</a:t>
+              <a:t>✅ メリット</a:t>
+            </a:r>
+          </a:p>
+          <a:p>
+            <a:pPr lvl="0"/>
+            <a:r>
+              <a:rPr/>
+              <a:t>システムが「何ができるか」を説明</a:t>
+            </a:r>
+          </a:p>
+          <a:p>
+            <a:pPr lvl="0"/>
+            <a:r>
+              <a:rPr/>
+              <a:t>AIと対話しながら使える</a:t>
+            </a:r>
+          </a:p>
+          <a:p>
+            <a:pPr lvl="0"/>
+            <a:r>
+              <a:rPr/>
+              <a:t>メニュー変更に自動対応</a:t>
+            </a:r>
+          </a:p>
+          <a:p>
+            <a:pPr lvl="0"/>
+            <a:r>
+              <a:rPr/>
+              <a:t>質問に答えられる</a:t>
             </a:r>
           </a:p>
         </p:txBody>
@@ -5089,6 +6027,31 @@
       </p:grpSpPr>
       <p:sp>
         <p:nvSpPr>
+          <p:cNvPr id="2" name="Title 1"/>
+          <p:cNvSpPr>
+            <a:spLocks noGrp="1"/>
+          </p:cNvSpPr>
+          <p:nvPr>
+            <p:ph type="title"/>
+          </p:nvPr>
+        </p:nvSpPr>
+        <p:spPr/>
+        <p:txBody>
+          <a:bodyPr/>
+          <a:lstStyle/>
+          <a:p>
+            <a:pPr lvl="0" indent="0" marL="0">
+              <a:buNone/>
+            </a:pPr>
+            <a:r>
+              <a:rPr/>
+              <a:t>📊 実際の使い方（1/2）</a:t>
+            </a:r>
+          </a:p>
+        </p:txBody>
+      </p:sp>
+      <p:sp>
+        <p:nvSpPr>
           <p:cNvPr id="3" name="Content Placeholder 2"/>
           <p:cNvSpPr>
             <a:spLocks noGrp="1"/>
@@ -5110,7 +6073,7 @@
             </a:pPr>
             <a:r>
               <a:rPr b="1"/>
-              <a:t>💡 具体的なユースケース</a:t>
+              <a:t>タスク一覧の取得</a:t>
             </a:r>
           </a:p>
           <a:p>
@@ -5122,41 +6085,19 @@
             </a:pPr>
             <a:r>
               <a:rPr b="1"/>
-              <a:t>REST API が適している例</a:t>
-            </a:r>
-          </a:p>
-          <a:p>
-            <a:pPr lvl="0" indent="0" marL="0">
-              <a:buNone/>
-            </a:pPr>
-            <a:r>
-              <a:rPr/>
-              <a:t>✅ </a:t>
-            </a:r>
-            <a:r>
-              <a:rPr b="1"/>
-              <a:t>ECサイトのAPI</a:t>
-            </a:r>
-            <a:r>
-              <a:rPr/>
-              <a:t> - 商品検索、カート、注文など、決まった操作が中心 - 多くのユーザーが同じ方法で使う - 外部パートナーにも公開する</a:t>
-            </a:r>
-          </a:p>
-          <a:p>
-            <a:pPr lvl="0" indent="0" marL="0">
-              <a:buNone/>
-            </a:pPr>
-            <a:r>
-              <a:rPr/>
-              <a:t>✅ </a:t>
-            </a:r>
-            <a:r>
-              <a:rPr b="1"/>
-              <a:t>SNSのAPI</a:t>
-            </a:r>
-            <a:r>
-              <a:rPr/>
-              <a:t> - 投稿、いいね、フォローなど、標準的な機能 - 広く使われる必要がある</a:t>
+              <a:t>REST API</a:t>
+            </a:r>
+          </a:p>
+          <a:p>
+            <a:pPr lvl="0" indent="0">
+              <a:buNone/>
+            </a:pPr>
+            <a:r>
+              <a:rPr>
+                <a:latin typeface="Courier"/>
+              </a:rPr>
+              <a:t>http://example.com/tasks にアクセス
+→ タスク一覧表示</a:t>
             </a:r>
           </a:p>
           <a:p>
@@ -5168,58 +6109,21 @@
             </a:pPr>
             <a:r>
               <a:rPr b="1"/>
-              <a:t>MCP が適している例</a:t>
-            </a:r>
-          </a:p>
-          <a:p>
-            <a:pPr lvl="0" indent="0" marL="0">
-              <a:buNone/>
-            </a:pPr>
-            <a:r>
-              <a:rPr/>
-              <a:t>✅ </a:t>
-            </a:r>
-            <a:r>
-              <a:rPr b="1"/>
-              <a:t>AIアシスタント連携</a:t>
-            </a:r>
-            <a:r>
-              <a:rPr/>
-              <a:t> - 「来週の会議資料を準備して」→ AIが必要なツールを自動選択 - 「先月の売上をまとめて」→ AIがデータを取得・分析</a:t>
-            </a:r>
-          </a:p>
-          <a:p>
-            <a:pPr lvl="0" indent="0" marL="0">
-              <a:buNone/>
-            </a:pPr>
-            <a:r>
-              <a:rPr/>
-              <a:t>✅ </a:t>
-            </a:r>
-            <a:r>
-              <a:rPr b="1"/>
-              <a:t>社内業務の自動化</a:t>
-            </a:r>
-            <a:r>
-              <a:rPr/>
-              <a:t> - 機能が頻繁に追加・変更される - 部署ごとに使い方が違う - AI が文脈を理解して適切に操作する必要がある</a:t>
-            </a:r>
-          </a:p>
-          <a:p>
-            <a:pPr lvl="0" indent="0" marL="0">
-              <a:buNone/>
-            </a:pPr>
-            <a:r>
-              <a:rPr/>
-              <a:t>✅ </a:t>
-            </a:r>
-            <a:r>
-              <a:rPr b="1"/>
-              <a:t>複雑な業務フロー</a:t>
-            </a:r>
-            <a:r>
-              <a:rPr/>
-              <a:t> - 「承認が必要なタスクを洗い出して、優先度順に並べて」 - AIが複数のツールを組み合わせて実行</a:t>
+              <a:t>MCP</a:t>
+            </a:r>
+          </a:p>
+          <a:p>
+            <a:pPr lvl="0" indent="0">
+              <a:buNone/>
+            </a:pPr>
+            <a:r>
+              <a:rPr>
+                <a:latin typeface="Courier"/>
+              </a:rPr>
+              <a:t>AI: 「何ができる？」
+→ システム: 「タスク一覧を見れます」
+→ AI: 「見せて」
+→ タスク一覧表示</a:t>
             </a:r>
           </a:p>
         </p:txBody>
@@ -5248,6 +6152,31 @@
       </p:grpSpPr>
       <p:sp>
         <p:nvSpPr>
+          <p:cNvPr id="2" name="Title 1"/>
+          <p:cNvSpPr>
+            <a:spLocks noGrp="1"/>
+          </p:cNvSpPr>
+          <p:nvPr>
+            <p:ph type="title"/>
+          </p:nvPr>
+        </p:nvSpPr>
+        <p:spPr/>
+        <p:txBody>
+          <a:bodyPr/>
+          <a:lstStyle/>
+          <a:p>
+            <a:pPr lvl="0" indent="0" marL="0">
+              <a:buNone/>
+            </a:pPr>
+            <a:r>
+              <a:rPr/>
+              <a:t>📊 実際の使い方（2/2）</a:t>
+            </a:r>
+          </a:p>
+        </p:txBody>
+      </p:sp>
+      <p:sp>
+        <p:nvSpPr>
           <p:cNvPr id="3" name="Content Placeholder 2"/>
           <p:cNvSpPr>
             <a:spLocks noGrp="1"/>
@@ -5269,7 +6198,7 @@
             </a:pPr>
             <a:r>
               <a:rPr b="1"/>
-              <a:t>📈 将来性</a:t>
+              <a:t>新規タスクの作成</a:t>
             </a:r>
           </a:p>
           <a:p>
@@ -5285,24 +6214,15 @@
             </a:r>
           </a:p>
           <a:p>
-            <a:pPr lvl="0"/>
-            <a:r>
-              <a:rPr/>
-              <a:t>✅ すでに広く普及</a:t>
-            </a:r>
-          </a:p>
-          <a:p>
-            <a:pPr lvl="0"/>
-            <a:r>
-              <a:rPr/>
-              <a:t>✅ 多くのツール・ライブラリがある</a:t>
-            </a:r>
-          </a:p>
-          <a:p>
-            <a:pPr lvl="0"/>
-            <a:r>
-              <a:rPr/>
-              <a:t>⚠️ AI時代においては追加の工夫が必要</a:t>
+            <a:pPr lvl="0" indent="0">
+              <a:buNone/>
+            </a:pPr>
+            <a:r>
+              <a:rPr>
+                <a:latin typeface="Courier"/>
+              </a:rPr>
+              <a:t>POST /tasks に JSONデータ送信
+→ 事前にURLとフォーマットを知る必要がある</a:t>
             </a:r>
           </a:p>
           <a:p>
@@ -5318,31 +6238,17 @@
             </a:r>
           </a:p>
           <a:p>
-            <a:pPr lvl="0"/>
-            <a:r>
-              <a:rPr/>
-              <a:t>🆕 2024年に登場した新しい技術</a:t>
-            </a:r>
-          </a:p>
-          <a:p>
-            <a:pPr lvl="0"/>
-            <a:r>
-              <a:rPr/>
-              <a:t>📈 AI・エージェント時代に最適化</a:t>
-            </a:r>
-          </a:p>
-          <a:p>
-            <a:pPr lvl="0"/>
-            <a:r>
-              <a:rPr/>
-              <a:t>🚀 今後の成長が期待される</a:t>
-            </a:r>
-          </a:p>
-          <a:p>
-            <a:pPr lvl="0"/>
-            <a:r>
-              <a:rPr/>
-              <a:t>💡 AnthropicのClaude、他の大手AIツールが採用開始</a:t>
+            <a:pPr lvl="0" indent="0">
+              <a:buNone/>
+            </a:pPr>
+            <a:r>
+              <a:rPr>
+                <a:latin typeface="Courier"/>
+              </a:rPr>
+              <a:t>AI: 「どんな操作ができる？」
+→ システム: 「create_taskで作成できます」
+→ AI: 「タスクを作成して」
+→ 作成完了</a:t>
             </a:r>
           </a:p>
         </p:txBody>

</xml_diff>

<commit_message>
docs: Further simplify presentation text
- Reduce text per slide significantly
- Remove code blocks and technical details
- Shorten bullet points
- Split long content into more slides
- Ensure all text fits within slide boundaries
</commit_message>
<xml_diff>
--- a/chapter-01/quickguide.pptx
+++ b/chapter-01/quickguide.pptx
@@ -34,6 +34,9 @@
     <p:sldId id="282" r:id="rId28"/>
     <p:sldId id="283" r:id="rId29"/>
     <p:sldId id="284" r:id="rId30"/>
+    <p:sldId id="285" r:id="rId31"/>
+    <p:sldId id="286" r:id="rId32"/>
+    <p:sldId id="287" r:id="rId33"/>
   </p:sldIdLst>
   <p:sldSz cx="9144000" cy="5143500" type="screen16x9"/>
   <p:notesSz cx="6858000" cy="9144000"/>
@@ -3245,7 +3248,60 @@
             </a:pPr>
             <a:r>
               <a:rPr/>
-              <a:t>🎯 ビジネス価値の比較</a:t>
+              <a:t>📊 タスクの作成（2/2）</a:t>
+            </a:r>
+          </a:p>
+        </p:txBody>
+      </p:sp>
+      <p:sp>
+        <p:nvSpPr>
+          <p:cNvPr id="3" name="Content Placeholder 2"/>
+          <p:cNvSpPr>
+            <a:spLocks noGrp="1"/>
+          </p:cNvSpPr>
+          <p:nvPr>
+            <p:ph idx="1"/>
+          </p:nvPr>
+        </p:nvSpPr>
+        <p:spPr/>
+        <p:txBody>
+          <a:bodyPr/>
+          <a:lstStyle/>
+          <a:p>
+            <a:pPr lvl="0" indent="0" marL="0">
+              <a:buNone/>
+            </a:pPr>
+            <a:r>
+              <a:rPr b="1"/>
+              <a:t>MCP</a:t>
+            </a:r>
+          </a:p>
+          <a:p>
+            <a:pPr lvl="0"/>
+            <a:r>
+              <a:rPr/>
+              <a:t>AI: 「操作は？」</a:t>
+            </a:r>
+          </a:p>
+          <a:p>
+            <a:pPr lvl="0"/>
+            <a:r>
+              <a:rPr/>
+              <a:t>システム: 「作成できます」</a:t>
+            </a:r>
+          </a:p>
+          <a:p>
+            <a:pPr lvl="0"/>
+            <a:r>
+              <a:rPr/>
+              <a:t>AI: 「作成して」</a:t>
+            </a:r>
+          </a:p>
+          <a:p>
+            <a:pPr lvl="0"/>
+            <a:r>
+              <a:rPr/>
+              <a:t>完了</a:t>
             </a:r>
           </a:p>
         </p:txBody>
@@ -3256,6 +3312,53 @@
 </file>
 
 <file path=ppt/slides/slide11.xml><?xml version="1.0" encoding="utf-8"?>
+<p:sld xmlns:a="http://schemas.openxmlformats.org/drawingml/2006/main" xmlns:r="http://schemas.openxmlformats.org/officeDocument/2006/relationships" xmlns:p="http://schemas.openxmlformats.org/presentationml/2006/main">
+  <p:cSld>
+    <p:spTree>
+      <p:nvGrpSpPr>
+        <p:cNvPr id="1" name=""/>
+        <p:cNvGrpSpPr/>
+        <p:nvPr/>
+      </p:nvGrpSpPr>
+      <p:grpSpPr>
+        <a:xfrm>
+          <a:off x="0" y="0"/>
+          <a:ext cx="0" cy="0"/>
+          <a:chOff x="0" y="0"/>
+          <a:chExt cx="0" cy="0"/>
+        </a:xfrm>
+      </p:grpSpPr>
+      <p:sp>
+        <p:nvSpPr>
+          <p:cNvPr id="2" name="Title 1"/>
+          <p:cNvSpPr>
+            <a:spLocks noGrp="1"/>
+          </p:cNvSpPr>
+          <p:nvPr>
+            <p:ph type="title"/>
+          </p:nvPr>
+        </p:nvSpPr>
+        <p:spPr/>
+        <p:txBody>
+          <a:bodyPr/>
+          <a:lstStyle/>
+          <a:p>
+            <a:pPr lvl="0" indent="0" marL="0">
+              <a:buNone/>
+            </a:pPr>
+            <a:r>
+              <a:rPr/>
+              <a:t>🎯 ビジネス価値</a:t>
+            </a:r>
+          </a:p>
+        </p:txBody>
+      </p:sp>
+    </p:spTree>
+  </p:cSld>
+</p:sld>
+</file>
+
+<file path=ppt/slides/slide12.xml><?xml version="1.0" encoding="utf-8"?>
 <p:sld xmlns:a="http://schemas.openxmlformats.org/drawingml/2006/main" xmlns:r="http://schemas.openxmlformats.org/officeDocument/2006/relationships" xmlns:p="http://schemas.openxmlformats.org/presentationml/2006/main">
   <p:cSld>
     <p:spTree>
@@ -3332,7 +3435,7 @@
                       </a:pPr>
                       <a:r>
                         <a:rPr/>
-                        <a:t>観点</a:t>
+                        <a:t>項目</a:t>
                       </a:r>
                     </a:p>
                   </a:txBody>
@@ -3366,7 +3469,7 @@
                       </a:pPr>
                       <a:r>
                         <a:rPr/>
-                        <a:t>導入のしやすさ</a:t>
+                        <a:t>導入</a:t>
                       </a:r>
                     </a:p>
                   </a:txBody>
@@ -3398,7 +3501,7 @@
                       </a:pPr>
                       <a:r>
                         <a:rPr/>
-                        <a:t>開発コスト</a:t>
+                        <a:t>コスト</a:t>
                       </a:r>
                     </a:p>
                   </a:txBody>
@@ -3430,7 +3533,7 @@
                       </a:pPr>
                       <a:r>
                         <a:rPr/>
-                        <a:t>ドキュメント作成</a:t>
+                        <a:t>ドキュメント</a:t>
                       </a:r>
                     </a:p>
                   </a:txBody>
@@ -3494,7 +3597,7 @@
                       </a:pPr>
                       <a:r>
                         <a:rPr/>
-                        <a:t>変更への対応</a:t>
+                        <a:t>変更対応</a:t>
                       </a:r>
                     </a:p>
                   </a:txBody>
@@ -3524,7 +3627,7 @@
 </p:sld>
 </file>
 
-<file path=ppt/slides/slide12.xml><?xml version="1.0" encoding="utf-8"?>
+<file path=ppt/slides/slide13.xml><?xml version="1.0" encoding="utf-8"?>
 <p:sld xmlns:a="http://schemas.openxmlformats.org/drawingml/2006/main" xmlns:r="http://schemas.openxmlformats.org/officeDocument/2006/relationships" xmlns:p="http://schemas.openxmlformats.org/presentationml/2006/main">
   <p:cSld>
     <p:spTree>
@@ -3543,6 +3646,31 @@
       </p:grpSpPr>
       <p:sp>
         <p:nvSpPr>
+          <p:cNvPr id="2" name="Title 1"/>
+          <p:cNvSpPr>
+            <a:spLocks noGrp="1"/>
+          </p:cNvSpPr>
+          <p:nvPr>
+            <p:ph type="title"/>
+          </p:nvPr>
+        </p:nvSpPr>
+        <p:spPr/>
+        <p:txBody>
+          <a:bodyPr/>
+          <a:lstStyle/>
+          <a:p>
+            <a:pPr lvl="0" indent="0" marL="0">
+              <a:buNone/>
+            </a:pPr>
+            <a:r>
+              <a:rPr/>
+              <a:t>REST API 向いているケース</a:t>
+            </a:r>
+          </a:p>
+        </p:txBody>
+      </p:sp>
+      <p:sp>
+        <p:nvSpPr>
           <p:cNvPr id="3" name="Content Placeholder 2"/>
           <p:cNvSpPr>
             <a:spLocks noGrp="1"/>
@@ -3556,16 +3684,31 @@
           <a:bodyPr/>
           <a:lstStyle/>
           <a:p>
-            <a:pPr lvl="0" indent="0" marL="0">
-              <a:buNone/>
-            </a:pPr>
-            <a:r>
-              <a:rPr b="1"/>
-              <a:t>向いているケース</a:t>
-            </a:r>
-            <a:r>
-              <a:rPr/>
-              <a:t> - Webサイト、モバイルアプリ - 外部公開API</a:t>
+            <a:pPr lvl="0"/>
+            <a:r>
+              <a:rPr/>
+              <a:t>Webサイト</a:t>
+            </a:r>
+          </a:p>
+          <a:p>
+            <a:pPr lvl="0"/>
+            <a:r>
+              <a:rPr/>
+              <a:t>モバイルアプリ</a:t>
+            </a:r>
+          </a:p>
+          <a:p>
+            <a:pPr lvl="0"/>
+            <a:r>
+              <a:rPr/>
+              <a:t>外部公開API</a:t>
+            </a:r>
+          </a:p>
+          <a:p>
+            <a:pPr lvl="0"/>
+            <a:r>
+              <a:rPr/>
+              <a:t>標準的な機能</a:t>
             </a:r>
           </a:p>
         </p:txBody>
@@ -3575,7 +3718,7 @@
 </p:sld>
 </file>
 
-<file path=ppt/slides/slide13.xml><?xml version="1.0" encoding="utf-8"?>
+<file path=ppt/slides/slide14.xml><?xml version="1.0" encoding="utf-8"?>
 <p:sld xmlns:a="http://schemas.openxmlformats.org/drawingml/2006/main" xmlns:r="http://schemas.openxmlformats.org/officeDocument/2006/relationships" xmlns:p="http://schemas.openxmlformats.org/presentationml/2006/main">
   <p:cSld>
     <p:spTree>
@@ -3652,7 +3795,7 @@
                       </a:pPr>
                       <a:r>
                         <a:rPr/>
-                        <a:t>観点</a:t>
+                        <a:t>項目</a:t>
                       </a:r>
                     </a:p>
                   </a:txBody>
@@ -3686,7 +3829,7 @@
                       </a:pPr>
                       <a:r>
                         <a:rPr/>
-                        <a:t>導入のしやすさ</a:t>
+                        <a:t>導入</a:t>
                       </a:r>
                     </a:p>
                   </a:txBody>
@@ -3718,7 +3861,7 @@
                       </a:pPr>
                       <a:r>
                         <a:rPr/>
-                        <a:t>開発コスト</a:t>
+                        <a:t>コスト</a:t>
                       </a:r>
                     </a:p>
                   </a:txBody>
@@ -3750,7 +3893,7 @@
                       </a:pPr>
                       <a:r>
                         <a:rPr/>
-                        <a:t>ドキュメント作成</a:t>
+                        <a:t>ドキュメント</a:t>
                       </a:r>
                     </a:p>
                   </a:txBody>
@@ -3814,7 +3957,7 @@
                       </a:pPr>
                       <a:r>
                         <a:rPr/>
-                        <a:t>変更への対応</a:t>
+                        <a:t>変更対応</a:t>
                       </a:r>
                     </a:p>
                   </a:txBody>
@@ -3844,57 +3987,6 @@
 </p:sld>
 </file>
 
-<file path=ppt/slides/slide14.xml><?xml version="1.0" encoding="utf-8"?>
-<p:sld xmlns:a="http://schemas.openxmlformats.org/drawingml/2006/main" xmlns:r="http://schemas.openxmlformats.org/officeDocument/2006/relationships" xmlns:p="http://schemas.openxmlformats.org/presentationml/2006/main">
-  <p:cSld>
-    <p:spTree>
-      <p:nvGrpSpPr>
-        <p:cNvPr id="1" name=""/>
-        <p:cNvGrpSpPr/>
-        <p:nvPr/>
-      </p:nvGrpSpPr>
-      <p:grpSpPr>
-        <a:xfrm>
-          <a:off x="0" y="0"/>
-          <a:ext cx="0" cy="0"/>
-          <a:chOff x="0" y="0"/>
-          <a:chExt cx="0" cy="0"/>
-        </a:xfrm>
-      </p:grpSpPr>
-      <p:sp>
-        <p:nvSpPr>
-          <p:cNvPr id="3" name="Content Placeholder 2"/>
-          <p:cNvSpPr>
-            <a:spLocks noGrp="1"/>
-          </p:cNvSpPr>
-          <p:nvPr>
-            <p:ph idx="1"/>
-          </p:nvPr>
-        </p:nvSpPr>
-        <p:spPr/>
-        <p:txBody>
-          <a:bodyPr/>
-          <a:lstStyle/>
-          <a:p>
-            <a:pPr lvl="0" indent="0" marL="0">
-              <a:buNone/>
-            </a:pPr>
-            <a:r>
-              <a:rPr b="1"/>
-              <a:t>向いているケース</a:t>
-            </a:r>
-            <a:r>
-              <a:rPr/>
-              <a:t> - AIアシスタント統合 - 社内業務自動化</a:t>
-            </a:r>
-          </a:p>
-        </p:txBody>
-      </p:sp>
-    </p:spTree>
-  </p:cSld>
-</p:sld>
-</file>
-
 <file path=ppt/slides/slide15.xml><?xml version="1.0" encoding="utf-8"?>
 <p:sld xmlns:a="http://schemas.openxmlformats.org/drawingml/2006/main" xmlns:r="http://schemas.openxmlformats.org/officeDocument/2006/relationships" xmlns:p="http://schemas.openxmlformats.org/presentationml/2006/main">
   <p:cSld>
@@ -3932,7 +4024,7 @@
             </a:pPr>
             <a:r>
               <a:rPr/>
-              <a:t>💡 REST API が適している例</a:t>
+              <a:t>MCP 向いているケース</a:t>
             </a:r>
           </a:p>
         </p:txBody>
@@ -3952,55 +4044,31 @@
           <a:bodyPr/>
           <a:lstStyle/>
           <a:p>
-            <a:pPr lvl="0" indent="0" marL="0">
-              <a:spcBef>
-                <a:spcPts val="3000"/>
-              </a:spcBef>
-              <a:buNone/>
-            </a:pPr>
-            <a:r>
-              <a:rPr b="1"/>
-              <a:t>✅ ECサイトのAPI</a:t>
-            </a:r>
-          </a:p>
-          <a:p>
             <a:pPr lvl="0"/>
             <a:r>
               <a:rPr/>
-              <a:t>商品検索、カート、注文</a:t>
+              <a:t>AIアシスタント統合</a:t>
             </a:r>
           </a:p>
           <a:p>
             <a:pPr lvl="0"/>
             <a:r>
               <a:rPr/>
-              <a:t>多くのユーザーが同じ方法で使用</a:t>
-            </a:r>
-          </a:p>
-          <a:p>
-            <a:pPr lvl="0" indent="0" marL="0">
-              <a:spcBef>
-                <a:spcPts val="3000"/>
-              </a:spcBef>
-              <a:buNone/>
-            </a:pPr>
-            <a:r>
-              <a:rPr b="1"/>
-              <a:t>✅ SNSのAPI</a:t>
+              <a:t>社内業務自動化</a:t>
             </a:r>
           </a:p>
           <a:p>
             <a:pPr lvl="0"/>
             <a:r>
               <a:rPr/>
-              <a:t>投稿、いいね、フォロー</a:t>
+              <a:t>頻繁な機能変更</a:t>
             </a:r>
           </a:p>
           <a:p>
             <a:pPr lvl="0"/>
             <a:r>
               <a:rPr/>
-              <a:t>広く使われる標準的な機能</a:t>
+              <a:t>エージェントシステム</a:t>
             </a:r>
           </a:p>
         </p:txBody>
@@ -4047,7 +4115,7 @@
             </a:pPr>
             <a:r>
               <a:rPr/>
-              <a:t>💡 MCPが適している例</a:t>
+              <a:t>💡 具体例: ECサイト</a:t>
             </a:r>
           </a:p>
         </p:txBody>
@@ -4068,73 +4136,39 @@
           <a:lstStyle/>
           <a:p>
             <a:pPr lvl="0" indent="0" marL="0">
-              <a:spcBef>
-                <a:spcPts val="3000"/>
-              </a:spcBef>
               <a:buNone/>
             </a:pPr>
             <a:r>
               <a:rPr b="1"/>
-              <a:t>✅ AIアシスタント連携</a:t>
+              <a:t>REST APIが適している</a:t>
             </a:r>
           </a:p>
           <a:p>
             <a:pPr lvl="0"/>
             <a:r>
               <a:rPr/>
-              <a:t>「会議資料を準備して」</a:t>
+              <a:t>商品検索</a:t>
             </a:r>
           </a:p>
           <a:p>
             <a:pPr lvl="0"/>
             <a:r>
               <a:rPr/>
-              <a:t>AIが必要なツールを自動選択</a:t>
-            </a:r>
-          </a:p>
-          <a:p>
-            <a:pPr lvl="0" indent="0" marL="0">
-              <a:spcBef>
-                <a:spcPts val="3000"/>
-              </a:spcBef>
-              <a:buNone/>
-            </a:pPr>
-            <a:r>
-              <a:rPr b="1"/>
-              <a:t>✅ 社内業務の自動化</a:t>
+              <a:t>カート</a:t>
             </a:r>
           </a:p>
           <a:p>
             <a:pPr lvl="0"/>
             <a:r>
               <a:rPr/>
-              <a:t>機能が頻繁に追加・変更</a:t>
+              <a:t>注文処理</a:t>
             </a:r>
           </a:p>
           <a:p>
             <a:pPr lvl="0"/>
             <a:r>
               <a:rPr/>
-              <a:t>部署ごとに使い方が違う</a:t>
-            </a:r>
-          </a:p>
-          <a:p>
-            <a:pPr lvl="0" indent="0" marL="0">
-              <a:spcBef>
-                <a:spcPts val="3000"/>
-              </a:spcBef>
-              <a:buNone/>
-            </a:pPr>
-            <a:r>
-              <a:rPr b="1"/>
-              <a:t>✅ 複雑な業務フロー</a:t>
-            </a:r>
-          </a:p>
-          <a:p>
-            <a:pPr lvl="0"/>
-            <a:r>
-              <a:rPr/>
-              <a:t>AIが複数のツールを組み合わせ</a:t>
+              <a:t>標準的な操作</a:t>
             </a:r>
           </a:p>
         </p:txBody>
@@ -4181,7 +4215,7 @@
             </a:pPr>
             <a:r>
               <a:rPr/>
-              <a:t>📈 将来性</a:t>
+              <a:t>💡 具体例: AI連携</a:t>
             </a:r>
           </a:p>
         </p:txBody>
@@ -4202,75 +4236,32 @@
           <a:lstStyle/>
           <a:p>
             <a:pPr lvl="0" indent="0" marL="0">
-              <a:spcBef>
-                <a:spcPts val="3000"/>
-              </a:spcBef>
               <a:buNone/>
             </a:pPr>
             <a:r>
               <a:rPr b="1"/>
-              <a:t>REST API</a:t>
+              <a:t>MCPが適している</a:t>
             </a:r>
           </a:p>
           <a:p>
             <a:pPr lvl="0"/>
             <a:r>
               <a:rPr/>
-              <a:t>✅ 広く普及済み</a:t>
+              <a:t>「会議資料を準備して」</a:t>
             </a:r>
           </a:p>
           <a:p>
             <a:pPr lvl="0"/>
             <a:r>
               <a:rPr/>
-              <a:t>✅ 豊富なツール・ライブラリ</a:t>
+              <a:t>AIが自動でツール選択</a:t>
             </a:r>
           </a:p>
           <a:p>
             <a:pPr lvl="0"/>
             <a:r>
               <a:rPr/>
-              <a:t>⚠️ AI時代は追加工夫が必要</a:t>
-            </a:r>
-          </a:p>
-          <a:p>
-            <a:pPr lvl="0" indent="0" marL="0">
-              <a:spcBef>
-                <a:spcPts val="3000"/>
-              </a:spcBef>
-              <a:buNone/>
-            </a:pPr>
-            <a:r>
-              <a:rPr b="1"/>
-              <a:t>MCP</a:t>
-            </a:r>
-          </a:p>
-          <a:p>
-            <a:pPr lvl="0"/>
-            <a:r>
-              <a:rPr/>
-              <a:t>🆕 2024年登場の新技術</a:t>
-            </a:r>
-          </a:p>
-          <a:p>
-            <a:pPr lvl="0"/>
-            <a:r>
-              <a:rPr/>
-              <a:t>📈 AI・エージェント時代に最適</a:t>
-            </a:r>
-          </a:p>
-          <a:p>
-            <a:pPr lvl="0"/>
-            <a:r>
-              <a:rPr/>
-              <a:t>🚀 今後の成長が期待</a:t>
-            </a:r>
-          </a:p>
-          <a:p>
-            <a:pPr lvl="0"/>
-            <a:r>
-              <a:rPr/>
-              <a:t>💡 AnthropicのClaudeが採用</a:t>
+              <a:t>対話的に作業完了</a:t>
             </a:r>
           </a:p>
         </p:txBody>
@@ -4317,7 +4308,7 @@
             </a:pPr>
             <a:r>
               <a:rPr/>
-              <a:t>🤝 併用も可能</a:t>
+              <a:t>💡 具体例: 業務自動化</a:t>
             </a:r>
           </a:p>
         </p:txBody>
@@ -4338,60 +4329,32 @@
           <a:lstStyle/>
           <a:p>
             <a:pPr lvl="0" indent="0" marL="0">
-              <a:spcBef>
-                <a:spcPts val="3000"/>
-              </a:spcBef>
               <a:buNone/>
             </a:pPr>
             <a:r>
               <a:rPr b="1"/>
-              <a:t>使い分け</a:t>
-            </a:r>
-          </a:p>
-          <a:p>
-            <a:pPr lvl="0" indent="0">
-              <a:buNone/>
-            </a:pPr>
-            <a:r>
-              <a:rPr>
-                <a:latin typeface="Courier"/>
-              </a:rPr>
-              <a:t>外部向けAPI → REST API
-     +
-AI連携機能 → MCP</a:t>
-            </a:r>
-          </a:p>
-          <a:p>
-            <a:pPr lvl="0" indent="0" marL="0">
-              <a:spcBef>
-                <a:spcPts val="3000"/>
-              </a:spcBef>
-              <a:buNone/>
-            </a:pPr>
-            <a:r>
-              <a:rPr b="1"/>
-              <a:t>実際の例</a:t>
+              <a:t>MCPが適している</a:t>
             </a:r>
           </a:p>
           <a:p>
             <a:pPr lvl="0"/>
             <a:r>
               <a:rPr/>
-              <a:t>一般ユーザー向け: REST API</a:t>
+              <a:t>機能の頻繁な追加</a:t>
             </a:r>
           </a:p>
           <a:p>
             <a:pPr lvl="0"/>
             <a:r>
               <a:rPr/>
-              <a:t>AIアシスタント向け: MCP</a:t>
+              <a:t>部署ごとに違う使い方</a:t>
             </a:r>
           </a:p>
           <a:p>
             <a:pPr lvl="0"/>
             <a:r>
-              <a:rPr b="1"/>
-              <a:t>両方を提供可能</a:t>
+              <a:rPr/>
+              <a:t>複雑な業務フロー</a:t>
             </a:r>
           </a:p>
         </p:txBody>
@@ -4438,7 +4401,44 @@
             </a:pPr>
             <a:r>
               <a:rPr/>
-              <a:t>✅ まとめ: 5つのポイント</a:t>
+              <a:t>📈 将来性: REST API</a:t>
+            </a:r>
+          </a:p>
+        </p:txBody>
+      </p:sp>
+      <p:sp>
+        <p:nvSpPr>
+          <p:cNvPr id="3" name="Content Placeholder 2"/>
+          <p:cNvSpPr>
+            <a:spLocks noGrp="1"/>
+          </p:cNvSpPr>
+          <p:nvPr>
+            <p:ph idx="1"/>
+          </p:nvPr>
+        </p:nvSpPr>
+        <p:spPr/>
+        <p:txBody>
+          <a:bodyPr/>
+          <a:lstStyle/>
+          <a:p>
+            <a:pPr lvl="0"/>
+            <a:r>
+              <a:rPr/>
+              <a:t>✅ 広く普及</a:t>
+            </a:r>
+          </a:p>
+          <a:p>
+            <a:pPr lvl="0"/>
+            <a:r>
+              <a:rPr/>
+              <a:t>✅ 豊富なツール</a:t>
+            </a:r>
+          </a:p>
+          <a:p>
+            <a:pPr lvl="0"/>
+            <a:r>
+              <a:rPr/>
+              <a:t>⚠️ AI時代は工夫必要</a:t>
             </a:r>
           </a:p>
         </p:txBody>
@@ -4576,7 +4576,7 @@
             </a:pPr>
             <a:r>
               <a:rPr/>
-              <a:t>1. 自己説明性</a:t>
+              <a:t>📈 将来性: MCP</a:t>
             </a:r>
           </a:p>
         </p:txBody>
@@ -4598,23 +4598,29 @@
           <a:p>
             <a:pPr lvl="0"/>
             <a:r>
-              <a:rPr b="1"/>
-              <a:t>REST API:</a:t>
-            </a:r>
-            <a:r>
-              <a:rPr/>
-              <a:t> ドキュメントを読む必要がある</a:t>
+              <a:rPr/>
+              <a:t>🆕 2024年登場</a:t>
             </a:r>
           </a:p>
           <a:p>
             <a:pPr lvl="0"/>
             <a:r>
-              <a:rPr b="1"/>
-              <a:t>MCP:</a:t>
-            </a:r>
-            <a:r>
-              <a:rPr/>
-              <a:t> システムが「何ができるか」を自動で説明</a:t>
+              <a:rPr/>
+              <a:t>📈 AI時代に最適</a:t>
+            </a:r>
+          </a:p>
+          <a:p>
+            <a:pPr lvl="0"/>
+            <a:r>
+              <a:rPr/>
+              <a:t>🚀 成長が期待</a:t>
+            </a:r>
+          </a:p>
+          <a:p>
+            <a:pPr lvl="0"/>
+            <a:r>
+              <a:rPr/>
+              <a:t>💡 Claudeが採用</a:t>
             </a:r>
           </a:p>
         </p:txBody>
@@ -4661,7 +4667,7 @@
             </a:pPr>
             <a:r>
               <a:rPr/>
-              <a:t>2. AI対応</a:t>
+              <a:t>🤝 併用も可能</a:t>
             </a:r>
           </a:p>
         </p:txBody>
@@ -4681,25 +4687,40 @@
           <a:bodyPr/>
           <a:lstStyle/>
           <a:p>
-            <a:pPr lvl="0"/>
+            <a:pPr lvl="0" indent="0" marL="0">
+              <a:buNone/>
+            </a:pPr>
             <a:r>
               <a:rPr b="1"/>
-              <a:t>REST API:</a:t>
-            </a:r>
-            <a:r>
-              <a:rPr/>
-              <a:t> AIに使わせるには追加設定が必要</a:t>
-            </a:r>
-          </a:p>
-          <a:p>
-            <a:pPr lvl="0"/>
+              <a:t>外部向け</a:t>
+            </a:r>
+            <a:br/>
+            <a:r>
+              <a:rPr/>
+              <a:t>REST API</a:t>
+            </a:r>
+          </a:p>
+          <a:p>
+            <a:pPr lvl="0" indent="0" marL="0">
+              <a:buNone/>
+            </a:pPr>
             <a:r>
               <a:rPr b="1"/>
-              <a:t>MCP:</a:t>
-            </a:r>
-            <a:r>
-              <a:rPr/>
-              <a:t> AIがそのまま理解して使える</a:t>
+              <a:t>AI連携</a:t>
+            </a:r>
+            <a:br/>
+            <a:r>
+              <a:rPr/>
+              <a:t>MCP</a:t>
+            </a:r>
+          </a:p>
+          <a:p>
+            <a:pPr lvl="0" indent="0" marL="0">
+              <a:buNone/>
+            </a:pPr>
+            <a:r>
+              <a:rPr b="1"/>
+              <a:t>両方を提供できる！</a:t>
             </a:r>
           </a:p>
         </p:txBody>
@@ -4746,7 +4767,7 @@
             </a:pPr>
             <a:r>
               <a:rPr/>
-              <a:t>3. 変更への対応</a:t>
+              <a:t>✅ まとめ</a:t>
             </a:r>
           </a:p>
         </p:txBody>
@@ -4766,25 +4787,12 @@
           <a:bodyPr/>
           <a:lstStyle/>
           <a:p>
-            <a:pPr lvl="0"/>
-            <a:r>
-              <a:rPr b="1"/>
-              <a:t>REST API:</a:t>
-            </a:r>
-            <a:r>
-              <a:rPr/>
-              <a:t> 変更時にドキュメントも更新が必要</a:t>
-            </a:r>
-          </a:p>
-          <a:p>
-            <a:pPr lvl="0"/>
-            <a:r>
-              <a:rPr b="1"/>
-              <a:t>MCP:</a:t>
-            </a:r>
-            <a:r>
-              <a:rPr/>
-              <a:t> システムが自動で最新情報を提供</a:t>
+            <a:pPr lvl="0" indent="0" marL="0">
+              <a:buNone/>
+            </a:pPr>
+            <a:r>
+              <a:rPr/>
+              <a:t>5つのポイント</a:t>
             </a:r>
           </a:p>
         </p:txBody>
@@ -4831,7 +4839,7 @@
             </a:pPr>
             <a:r>
               <a:rPr/>
-              <a:t>4. 使い分け</a:t>
+              <a:t>1. 自己説明性</a:t>
             </a:r>
           </a:p>
         </p:txBody>
@@ -4851,25 +4859,31 @@
           <a:bodyPr/>
           <a:lstStyle/>
           <a:p>
-            <a:pPr lvl="0"/>
+            <a:pPr lvl="0" indent="0" marL="0">
+              <a:buNone/>
+            </a:pPr>
             <a:r>
               <a:rPr b="1"/>
-              <a:t>REST API:</a:t>
-            </a:r>
-            <a:r>
-              <a:rPr/>
-              <a:t> 一般的なWebサービス、外部公開API</a:t>
-            </a:r>
-          </a:p>
-          <a:p>
-            <a:pPr lvl="0"/>
+              <a:t>REST API</a:t>
+            </a:r>
+            <a:br/>
+            <a:r>
+              <a:rPr/>
+              <a:t>ドキュメントが必要</a:t>
+            </a:r>
+          </a:p>
+          <a:p>
+            <a:pPr lvl="0" indent="0" marL="0">
+              <a:buNone/>
+            </a:pPr>
             <a:r>
               <a:rPr b="1"/>
-              <a:t>MCP:</a:t>
-            </a:r>
-            <a:r>
-              <a:rPr/>
-              <a:t> AI連携、社内ツール、エージェントシステム</a:t>
+              <a:t>MCP</a:t>
+            </a:r>
+            <a:br/>
+            <a:r>
+              <a:rPr/>
+              <a:t>システムが自動説明</a:t>
             </a:r>
           </a:p>
         </p:txBody>
@@ -4916,7 +4930,7 @@
             </a:pPr>
             <a:r>
               <a:rPr/>
-              <a:t>5. 将来性</a:t>
+              <a:t>2. AI対応</a:t>
             </a:r>
           </a:p>
         </p:txBody>
@@ -4936,25 +4950,31 @@
           <a:bodyPr/>
           <a:lstStyle/>
           <a:p>
-            <a:pPr lvl="0"/>
+            <a:pPr lvl="0" indent="0" marL="0">
+              <a:buNone/>
+            </a:pPr>
             <a:r>
               <a:rPr b="1"/>
-              <a:t>REST API:</a:t>
-            </a:r>
-            <a:r>
-              <a:rPr/>
-              <a:t> 実績豊富で安定</a:t>
-            </a:r>
-          </a:p>
-          <a:p>
-            <a:pPr lvl="0"/>
+              <a:t>REST API</a:t>
+            </a:r>
+            <a:br/>
+            <a:r>
+              <a:rPr/>
+              <a:t>追加設定が必要</a:t>
+            </a:r>
+          </a:p>
+          <a:p>
+            <a:pPr lvl="0" indent="0" marL="0">
+              <a:buNone/>
+            </a:pPr>
             <a:r>
               <a:rPr b="1"/>
-              <a:t>MCP:</a:t>
-            </a:r>
-            <a:r>
-              <a:rPr/>
-              <a:t> AI時代の新しい標準として期待</a:t>
+              <a:t>MCP</a:t>
+            </a:r>
+            <a:br/>
+            <a:r>
+              <a:rPr/>
+              <a:t>そのまま使える</a:t>
             </a:r>
           </a:p>
         </p:txBody>
@@ -5001,7 +5021,7 @@
             </a:pPr>
             <a:r>
               <a:rPr/>
-              <a:t>💡 よくある質問（1/3）</a:t>
+              <a:t>3. 変更対応</a:t>
             </a:r>
           </a:p>
         </p:txBody>
@@ -5022,14 +5042,16 @@
           <a:lstStyle/>
           <a:p>
             <a:pPr lvl="0" indent="0" marL="0">
-              <a:spcBef>
-                <a:spcPts val="3000"/>
-              </a:spcBef>
               <a:buNone/>
             </a:pPr>
             <a:r>
               <a:rPr b="1"/>
-              <a:t>Q: REST APIから移行すべき？</a:t>
+              <a:t>REST API</a:t>
+            </a:r>
+            <a:br/>
+            <a:r>
+              <a:rPr/>
+              <a:t>手動更新が必要</a:t>
             </a:r>
           </a:p>
           <a:p>
@@ -5038,16 +5060,12 @@
             </a:pPr>
             <a:r>
               <a:rPr b="1"/>
-              <a:t>A:</a:t>
-            </a:r>
-            <a:r>
-              <a:rPr/>
-              <a:t> いいえ。既存のREST APIはそのまま継続。</a:t>
+              <a:t>MCP</a:t>
             </a:r>
             <a:br/>
             <a:r>
               <a:rPr/>
-              <a:t>AI連携が必要な部分だけMCPを追加することも可能。</a:t>
+              <a:t>自動で最新情報</a:t>
             </a:r>
           </a:p>
         </p:txBody>
@@ -5094,7 +5112,7 @@
             </a:pPr>
             <a:r>
               <a:rPr/>
-              <a:t>💡 よくある質問（2/3）</a:t>
+              <a:t>4. 使い分け</a:t>
             </a:r>
           </a:p>
         </p:txBody>
@@ -5115,14 +5133,16 @@
           <a:lstStyle/>
           <a:p>
             <a:pPr lvl="0" indent="0" marL="0">
-              <a:spcBef>
-                <a:spcPts val="3000"/>
-              </a:spcBef>
               <a:buNone/>
             </a:pPr>
             <a:r>
               <a:rPr b="1"/>
-              <a:t>Q: MCPは難しい技術？</a:t>
+              <a:t>REST API</a:t>
+            </a:r>
+            <a:br/>
+            <a:r>
+              <a:rPr/>
+              <a:t>Webサービス、外部公開</a:t>
             </a:r>
           </a:p>
           <a:p>
@@ -5131,21 +5151,12 @@
             </a:pPr>
             <a:r>
               <a:rPr b="1"/>
-              <a:t>A:</a:t>
-            </a:r>
-            <a:r>
-              <a:rPr/>
-              <a:t> エンジニアにとって新しいですが、</a:t>
+              <a:t>MCP</a:t>
             </a:r>
             <a:br/>
             <a:r>
               <a:rPr/>
-              <a:t>特別に難しくはありません。</a:t>
-            </a:r>
-            <a:br/>
-            <a:r>
-              <a:rPr/>
-              <a:t>むしろ使う側は楽になります。</a:t>
+              <a:t>AI連携、社内ツール</a:t>
             </a:r>
           </a:p>
         </p:txBody>
@@ -5192,7 +5203,7 @@
             </a:pPr>
             <a:r>
               <a:rPr/>
-              <a:t>💡 よくある質問（3/3）</a:t>
+              <a:t>5. 将来性</a:t>
             </a:r>
           </a:p>
         </p:txBody>
@@ -5213,14 +5224,16 @@
           <a:lstStyle/>
           <a:p>
             <a:pPr lvl="0" indent="0" marL="0">
-              <a:spcBef>
-                <a:spcPts val="3000"/>
-              </a:spcBef>
               <a:buNone/>
             </a:pPr>
             <a:r>
               <a:rPr b="1"/>
-              <a:t>Q: いつまでに導入を検討すべき？</a:t>
+              <a:t>REST API</a:t>
+            </a:r>
+            <a:br/>
+            <a:r>
+              <a:rPr/>
+              <a:t>実績豊富で安定</a:t>
             </a:r>
           </a:p>
           <a:p>
@@ -5229,21 +5242,12 @@
             </a:pPr>
             <a:r>
               <a:rPr b="1"/>
-              <a:t>A:</a:t>
-            </a:r>
-            <a:r>
-              <a:rPr/>
-              <a:t> AI活用を進めている企業は、</a:t>
+              <a:t>MCP</a:t>
             </a:r>
             <a:br/>
             <a:r>
               <a:rPr/>
-              <a:t>今から検証開始をお勧めします。</a:t>
-            </a:r>
-            <a:br/>
-            <a:r>
-              <a:rPr/>
-              <a:t>2-3年後には標準的な選択肢の一つに。</a:t>
+              <a:t>AI時代の新標準</a:t>
             </a:r>
           </a:p>
         </p:txBody>
@@ -5290,7 +5294,7 @@
             </a:pPr>
             <a:r>
               <a:rPr/>
-              <a:t>🎓 Next Steps</a:t>
+              <a:t>💡 FAQ (1/3)</a:t>
             </a:r>
           </a:p>
         </p:txBody>
@@ -5311,59 +5315,30 @@
           <a:lstStyle/>
           <a:p>
             <a:pPr lvl="0" indent="0" marL="0">
-              <a:spcBef>
-                <a:spcPts val="3000"/>
-              </a:spcBef>
               <a:buNone/>
             </a:pPr>
             <a:r>
               <a:rPr b="1"/>
-              <a:t>1. 体験してみる</a:t>
-            </a:r>
-          </a:p>
-          <a:p>
-            <a:pPr lvl="0"/>
-            <a:r>
-              <a:rPr/>
-              <a:t>エンジニアと一緒に5分試す</a:t>
-            </a:r>
-          </a:p>
-          <a:p>
-            <a:pPr lvl="0" indent="0" marL="0">
-              <a:spcBef>
-                <a:spcPts val="3000"/>
-              </a:spcBef>
-              <a:buNone/>
-            </a:pPr>
-            <a:r>
-              <a:rPr b="1"/>
-              <a:t>2. ビジネス検討</a:t>
-            </a:r>
-          </a:p>
-          <a:p>
-            <a:pPr lvl="0"/>
-            <a:r>
-              <a:rPr/>
-              <a:t>自社のAI活用戦略との適合性</a:t>
-            </a:r>
-          </a:p>
-          <a:p>
-            <a:pPr lvl="0" indent="0" marL="0">
-              <a:spcBef>
-                <a:spcPts val="3000"/>
-              </a:spcBef>
-              <a:buNone/>
-            </a:pPr>
-            <a:r>
-              <a:rPr b="1"/>
-              <a:t>3. 詳細を学ぶ</a:t>
-            </a:r>
-          </a:p>
-          <a:p>
-            <a:pPr lvl="0"/>
-            <a:r>
-              <a:rPr/>
-              <a:t>技術詳細は guide.md を参照</a:t>
+              <a:t>Q: 移行すべき？</a:t>
+            </a:r>
+          </a:p>
+          <a:p>
+            <a:pPr lvl="0" indent="0" marL="0">
+              <a:buNone/>
+            </a:pPr>
+            <a:r>
+              <a:rPr/>
+              <a:t>A: いいえ</a:t>
+            </a:r>
+            <a:br/>
+            <a:r>
+              <a:rPr/>
+              <a:t>既存APIは継続</a:t>
+            </a:r>
+            <a:br/>
+            <a:r>
+              <a:rPr/>
+              <a:t>AI部分だけMCP追加も可能</a:t>
             </a:r>
           </a:p>
         </p:txBody>
@@ -5410,7 +5385,7 @@
             </a:pPr>
             <a:r>
               <a:rPr/>
-              <a:t>ご清聴ありがとうございました</a:t>
+              <a:t>💡 FAQ (2/3)</a:t>
             </a:r>
           </a:p>
         </p:txBody>
@@ -5435,27 +5410,26 @@
             </a:pPr>
             <a:r>
               <a:rPr b="1"/>
-              <a:t>質問・お問い合わせ</a:t>
-            </a:r>
-          </a:p>
-          <a:p>
-            <a:pPr lvl="0" indent="0" marL="0">
-              <a:buNone/>
-            </a:pPr>
-            <a:r>
-              <a:rPr/>
-              <a:t>詳細な技術ドキュメント:</a:t>
+              <a:t>Q: 難しい技術？</a:t>
+            </a:r>
+          </a:p>
+          <a:p>
+            <a:pPr lvl="0" indent="0" marL="0">
+              <a:buNone/>
+            </a:pPr>
+            <a:r>
+              <a:rPr/>
+              <a:t>A: いいえ</a:t>
             </a:r>
             <a:br/>
             <a:r>
-              <a:rPr>
-                <a:latin typeface="Courier"/>
-              </a:rPr>
-              <a:t>guide.md</a:t>
-            </a:r>
-            <a:r>
-              <a:rPr/>
-              <a:t> を参照してください</a:t>
+              <a:rPr/>
+              <a:t>新しいが特別難しくない</a:t>
+            </a:r>
+            <a:br/>
+            <a:r>
+              <a:rPr/>
+              <a:t>使う側は楽になる</a:t>
             </a:r>
           </a:p>
         </p:txBody>
@@ -5523,44 +5497,293 @@
           <a:lstStyle/>
           <a:p>
             <a:pPr lvl="0" indent="0" marL="0">
-              <a:spcBef>
-                <a:spcPts val="3000"/>
-              </a:spcBef>
               <a:buNone/>
             </a:pPr>
             <a:r>
               <a:rPr b="1"/>
               <a:t>REST API</a:t>
             </a:r>
-          </a:p>
-          <a:p>
-            <a:pPr lvl="0" indent="0" marL="0">
-              <a:buNone/>
-            </a:pPr>
-            <a:r>
-              <a:rPr b="1"/>
+            <a:br/>
+            <a:r>
+              <a:rPr/>
               <a:t>レストランのメニュー（紙）</a:t>
             </a:r>
           </a:p>
           <a:p>
             <a:pPr lvl="0" indent="0" marL="0">
-              <a:spcBef>
-                <a:spcPts val="3000"/>
-              </a:spcBef>
               <a:buNone/>
             </a:pPr>
             <a:r>
               <a:rPr b="1"/>
               <a:t>MCP</a:t>
             </a:r>
-          </a:p>
+            <a:br/>
+            <a:r>
+              <a:rPr/>
+              <a:t>スマートなウェイター（AI対応）</a:t>
+            </a:r>
+          </a:p>
+        </p:txBody>
+      </p:sp>
+    </p:spTree>
+  </p:cSld>
+</p:sld>
+</file>
+
+<file path=ppt/slides/slide30.xml><?xml version="1.0" encoding="utf-8"?>
+<p:sld xmlns:a="http://schemas.openxmlformats.org/drawingml/2006/main" xmlns:r="http://schemas.openxmlformats.org/officeDocument/2006/relationships" xmlns:p="http://schemas.openxmlformats.org/presentationml/2006/main">
+  <p:cSld>
+    <p:spTree>
+      <p:nvGrpSpPr>
+        <p:cNvPr id="1" name=""/>
+        <p:cNvGrpSpPr/>
+        <p:nvPr/>
+      </p:nvGrpSpPr>
+      <p:grpSpPr>
+        <a:xfrm>
+          <a:off x="0" y="0"/>
+          <a:ext cx="0" cy="0"/>
+          <a:chOff x="0" y="0"/>
+          <a:chExt cx="0" cy="0"/>
+        </a:xfrm>
+      </p:grpSpPr>
+      <p:sp>
+        <p:nvSpPr>
+          <p:cNvPr id="2" name="Title 1"/>
+          <p:cNvSpPr>
+            <a:spLocks noGrp="1"/>
+          </p:cNvSpPr>
+          <p:nvPr>
+            <p:ph type="title"/>
+          </p:nvPr>
+        </p:nvSpPr>
+        <p:spPr/>
+        <p:txBody>
+          <a:bodyPr/>
+          <a:lstStyle/>
+          <a:p>
+            <a:pPr lvl="0" indent="0" marL="0">
+              <a:buNone/>
+            </a:pPr>
+            <a:r>
+              <a:rPr/>
+              <a:t>💡 FAQ (3/3)</a:t>
+            </a:r>
+          </a:p>
+        </p:txBody>
+      </p:sp>
+      <p:sp>
+        <p:nvSpPr>
+          <p:cNvPr id="3" name="Content Placeholder 2"/>
+          <p:cNvSpPr>
+            <a:spLocks noGrp="1"/>
+          </p:cNvSpPr>
+          <p:nvPr>
+            <p:ph idx="1"/>
+          </p:nvPr>
+        </p:nvSpPr>
+        <p:spPr/>
+        <p:txBody>
+          <a:bodyPr/>
+          <a:lstStyle/>
           <a:p>
             <a:pPr lvl="0" indent="0" marL="0">
               <a:buNone/>
             </a:pPr>
             <a:r>
               <a:rPr b="1"/>
-              <a:t>スマートなウェイター（AI対応）</a:t>
+              <a:t>Q: いつ導入検討？</a:t>
+            </a:r>
+          </a:p>
+          <a:p>
+            <a:pPr lvl="0" indent="0" marL="0">
+              <a:buNone/>
+            </a:pPr>
+            <a:r>
+              <a:rPr/>
+              <a:t>A: AI活用企業は今から</a:t>
+            </a:r>
+            <a:br/>
+            <a:r>
+              <a:rPr/>
+              <a:t>2-3年後に標準化予想</a:t>
+            </a:r>
+          </a:p>
+        </p:txBody>
+      </p:sp>
+    </p:spTree>
+  </p:cSld>
+</p:sld>
+</file>
+
+<file path=ppt/slides/slide31.xml><?xml version="1.0" encoding="utf-8"?>
+<p:sld xmlns:a="http://schemas.openxmlformats.org/drawingml/2006/main" xmlns:r="http://schemas.openxmlformats.org/officeDocument/2006/relationships" xmlns:p="http://schemas.openxmlformats.org/presentationml/2006/main">
+  <p:cSld>
+    <p:spTree>
+      <p:nvGrpSpPr>
+        <p:cNvPr id="1" name=""/>
+        <p:cNvGrpSpPr/>
+        <p:nvPr/>
+      </p:nvGrpSpPr>
+      <p:grpSpPr>
+        <a:xfrm>
+          <a:off x="0" y="0"/>
+          <a:ext cx="0" cy="0"/>
+          <a:chOff x="0" y="0"/>
+          <a:chExt cx="0" cy="0"/>
+        </a:xfrm>
+      </p:grpSpPr>
+      <p:sp>
+        <p:nvSpPr>
+          <p:cNvPr id="2" name="Title 1"/>
+          <p:cNvSpPr>
+            <a:spLocks noGrp="1"/>
+          </p:cNvSpPr>
+          <p:nvPr>
+            <p:ph type="title"/>
+          </p:nvPr>
+        </p:nvSpPr>
+        <p:spPr/>
+        <p:txBody>
+          <a:bodyPr/>
+          <a:lstStyle/>
+          <a:p>
+            <a:pPr lvl="0" indent="0" marL="0">
+              <a:buNone/>
+            </a:pPr>
+            <a:r>
+              <a:rPr/>
+              <a:t>🎓 Next Steps</a:t>
+            </a:r>
+          </a:p>
+        </p:txBody>
+      </p:sp>
+      <p:sp>
+        <p:nvSpPr>
+          <p:cNvPr id="3" name="Content Placeholder 2"/>
+          <p:cNvSpPr>
+            <a:spLocks noGrp="1"/>
+          </p:cNvSpPr>
+          <p:nvPr>
+            <p:ph idx="1"/>
+          </p:nvPr>
+        </p:nvSpPr>
+        <p:spPr/>
+        <p:txBody>
+          <a:bodyPr/>
+          <a:lstStyle/>
+          <a:p>
+            <a:pPr lvl="0" indent="0" marL="0">
+              <a:buNone/>
+            </a:pPr>
+            <a:r>
+              <a:rPr b="1"/>
+              <a:t>1. 体験</a:t>
+            </a:r>
+            <a:br/>
+            <a:r>
+              <a:rPr/>
+              <a:t>エンジニアと5分試す</a:t>
+            </a:r>
+          </a:p>
+          <a:p>
+            <a:pPr lvl="0" indent="0" marL="0">
+              <a:buNone/>
+            </a:pPr>
+            <a:r>
+              <a:rPr b="1"/>
+              <a:t>2. 検討</a:t>
+            </a:r>
+            <a:br/>
+            <a:r>
+              <a:rPr/>
+              <a:t>AI戦略との適合性</a:t>
+            </a:r>
+          </a:p>
+          <a:p>
+            <a:pPr lvl="0" indent="0" marL="0">
+              <a:buNone/>
+            </a:pPr>
+            <a:r>
+              <a:rPr b="1"/>
+              <a:t>3. 学習</a:t>
+            </a:r>
+            <a:br/>
+            <a:r>
+              <a:rPr/>
+              <a:t>guide.md で詳細確認</a:t>
+            </a:r>
+          </a:p>
+        </p:txBody>
+      </p:sp>
+    </p:spTree>
+  </p:cSld>
+</p:sld>
+</file>
+
+<file path=ppt/slides/slide32.xml><?xml version="1.0" encoding="utf-8"?>
+<p:sld xmlns:a="http://schemas.openxmlformats.org/drawingml/2006/main" xmlns:r="http://schemas.openxmlformats.org/officeDocument/2006/relationships" xmlns:p="http://schemas.openxmlformats.org/presentationml/2006/main">
+  <p:cSld>
+    <p:spTree>
+      <p:nvGrpSpPr>
+        <p:cNvPr id="1" name=""/>
+        <p:cNvGrpSpPr/>
+        <p:nvPr/>
+      </p:nvGrpSpPr>
+      <p:grpSpPr>
+        <a:xfrm>
+          <a:off x="0" y="0"/>
+          <a:ext cx="0" cy="0"/>
+          <a:chOff x="0" y="0"/>
+          <a:chExt cx="0" cy="0"/>
+        </a:xfrm>
+      </p:grpSpPr>
+      <p:sp>
+        <p:nvSpPr>
+          <p:cNvPr id="2" name="Title 1"/>
+          <p:cNvSpPr>
+            <a:spLocks noGrp="1"/>
+          </p:cNvSpPr>
+          <p:nvPr>
+            <p:ph type="title"/>
+          </p:nvPr>
+        </p:nvSpPr>
+        <p:spPr/>
+        <p:txBody>
+          <a:bodyPr/>
+          <a:lstStyle/>
+          <a:p>
+            <a:pPr lvl="0" indent="0" marL="0">
+              <a:buNone/>
+            </a:pPr>
+            <a:r>
+              <a:rPr/>
+              <a:t>ありがとうございました</a:t>
+            </a:r>
+          </a:p>
+        </p:txBody>
+      </p:sp>
+      <p:sp>
+        <p:nvSpPr>
+          <p:cNvPr id="3" name="Content Placeholder 2"/>
+          <p:cNvSpPr>
+            <a:spLocks noGrp="1"/>
+          </p:cNvSpPr>
+          <p:nvPr>
+            <p:ph idx="1"/>
+          </p:nvPr>
+        </p:nvSpPr>
+        <p:spPr/>
+        <p:txBody>
+          <a:bodyPr/>
+          <a:lstStyle/>
+          <a:p>
+            <a:pPr lvl="0" indent="0" marL="0">
+              <a:buNone/>
+            </a:pPr>
+            <a:r>
+              <a:rPr b="1"/>
+              <a:t>詳細は guide.md へ</a:t>
             </a:r>
           </a:p>
         </p:txBody>
@@ -5607,7 +5830,7 @@
             </a:pPr>
             <a:r>
               <a:rPr/>
-              <a:t>📖 REST API = 紙のメニュー</a:t>
+              <a:t>📖 REST API</a:t>
             </a:r>
           </a:p>
         </p:txBody>
@@ -5635,7 +5858,7 @@
             </a:pPr>
             <a:r>
               <a:rPr b="1"/>
-              <a:t>使い方</a:t>
+              <a:t>紙のメニュー方式</a:t>
             </a:r>
           </a:p>
           <a:p>
@@ -5644,7 +5867,7 @@
             </a:pPr>
             <a:r>
               <a:rPr/>
-              <a:t>紙のメニューを見る</a:t>
+              <a:t>メニューを見る</a:t>
             </a:r>
           </a:p>
           <a:p>
@@ -5662,7 +5885,7 @@
             </a:pPr>
             <a:r>
               <a:rPr/>
-              <a:t>ウェイターが持ってくる</a:t>
+              <a:t>料理が届く</a:t>
             </a:r>
           </a:p>
         </p:txBody>
@@ -5730,61 +5953,29 @@
           <a:lstStyle/>
           <a:p>
             <a:pPr lvl="0" indent="0" marL="0">
-              <a:spcBef>
-                <a:spcPts val="3000"/>
-              </a:spcBef>
               <a:buNone/>
             </a:pPr>
             <a:r>
               <a:rPr b="1"/>
-              <a:t>✅ メリット</a:t>
-            </a:r>
-          </a:p>
-          <a:p>
-            <a:pPr lvl="0"/>
-            <a:r>
-              <a:rPr/>
-              <a:t>シンプルで分かりやすい</a:t>
-            </a:r>
-          </a:p>
-          <a:p>
-            <a:pPr lvl="0"/>
-            <a:r>
-              <a:rPr/>
-              <a:t>誰でも使える</a:t>
-            </a:r>
-          </a:p>
-          <a:p>
-            <a:pPr lvl="0" indent="0" marL="0">
-              <a:spcBef>
-                <a:spcPts val="3000"/>
-              </a:spcBef>
+              <a:t>メリット</a:t>
+            </a:r>
+            <a:r>
+              <a:rPr/>
+              <a:t> - シンプル - 誰でも使える</a:t>
+            </a:r>
+          </a:p>
+          <a:p>
+            <a:pPr lvl="0" indent="0" marL="0">
               <a:buNone/>
             </a:pPr>
             <a:r>
               <a:rPr b="1"/>
-              <a:t>❌ デメリット</a:t>
-            </a:r>
-          </a:p>
-          <a:p>
-            <a:pPr lvl="0"/>
-            <a:r>
-              <a:rPr/>
-              <a:t>メニューに載っていない料理は注文不可</a:t>
-            </a:r>
-          </a:p>
-          <a:p>
-            <a:pPr lvl="0"/>
-            <a:r>
-              <a:rPr/>
-              <a:t>メニュー更新が手動</a:t>
-            </a:r>
-          </a:p>
-          <a:p>
-            <a:pPr lvl="0"/>
-            <a:r>
-              <a:rPr/>
-              <a:t>ウェイターに質問できない</a:t>
+              <a:t>デメリット</a:t>
+            </a:r>
+            <a:br/>
+            <a:r>
+              <a:rPr/>
+              <a:t>- メニュー外は注文不可 - 手動更新が必要 - 質問できない</a:t>
             </a:r>
           </a:p>
         </p:txBody>
@@ -5831,7 +6022,7 @@
             </a:pPr>
             <a:r>
               <a:rPr/>
-              <a:t>📖 MCP = スマートウェイター</a:t>
+              <a:t>📖 MCP</a:t>
             </a:r>
           </a:p>
         </p:txBody>
@@ -5859,7 +6050,7 @@
             </a:pPr>
             <a:r>
               <a:rPr b="1"/>
-              <a:t>使い方</a:t>
+              <a:t>スマートウェイター方式</a:t>
             </a:r>
           </a:p>
           <a:p>
@@ -5877,7 +6068,7 @@
             </a:pPr>
             <a:r>
               <a:rPr/>
-              <a:t>「今日のメニューは？」と聞く</a:t>
+              <a:t>おすすめを聞く</a:t>
             </a:r>
           </a:p>
           <a:p>
@@ -5886,7 +6077,7 @@
             </a:pPr>
             <a:r>
               <a:rPr/>
-              <a:t>ウェイターが説明＆提案</a:t>
+              <a:t>対話的に注文</a:t>
             </a:r>
           </a:p>
           <a:p>
@@ -5895,7 +6086,7 @@
             </a:pPr>
             <a:r>
               <a:rPr/>
-              <a:t>対話的に注文</a:t>
+              <a:t>最適な料理が届く</a:t>
             </a:r>
           </a:p>
         </p:txBody>
@@ -5963,42 +6154,15 @@
           <a:lstStyle/>
           <a:p>
             <a:pPr lvl="0" indent="0" marL="0">
-              <a:spcBef>
-                <a:spcPts val="3000"/>
-              </a:spcBef>
               <a:buNone/>
             </a:pPr>
             <a:r>
               <a:rPr b="1"/>
-              <a:t>✅ メリット</a:t>
-            </a:r>
-          </a:p>
-          <a:p>
-            <a:pPr lvl="0"/>
-            <a:r>
-              <a:rPr/>
-              <a:t>システムが「何ができるか」を説明</a:t>
-            </a:r>
-          </a:p>
-          <a:p>
-            <a:pPr lvl="0"/>
-            <a:r>
-              <a:rPr/>
-              <a:t>AIと対話しながら使える</a:t>
-            </a:r>
-          </a:p>
-          <a:p>
-            <a:pPr lvl="0"/>
-            <a:r>
-              <a:rPr/>
-              <a:t>メニュー変更に自動対応</a:t>
-            </a:r>
-          </a:p>
-          <a:p>
-            <a:pPr lvl="0"/>
-            <a:r>
-              <a:rPr/>
-              <a:t>質問に答えられる</a:t>
+              <a:t>メリット</a:t>
+            </a:r>
+            <a:r>
+              <a:rPr/>
+              <a:t> - 何ができるか自動説明 - AI対応 - 自動更新 - 質問に回答</a:t>
             </a:r>
           </a:p>
         </p:txBody>
@@ -6045,7 +6209,7 @@
             </a:pPr>
             <a:r>
               <a:rPr/>
-              <a:t>📊 実際の使い方（1/2）</a:t>
+              <a:t>📊 タスク一覧の取得</a:t>
             </a:r>
           </a:p>
         </p:txBody>
@@ -6066,64 +6230,28 @@
           <a:lstStyle/>
           <a:p>
             <a:pPr lvl="0" indent="0" marL="0">
-              <a:spcBef>
-                <a:spcPts val="3000"/>
-              </a:spcBef>
-              <a:buNone/>
-            </a:pPr>
-            <a:r>
-              <a:rPr b="1"/>
-              <a:t>タスク一覧の取得</a:t>
-            </a:r>
-          </a:p>
-          <a:p>
-            <a:pPr lvl="0" indent="0" marL="0">
-              <a:spcBef>
-                <a:spcPts val="3000"/>
-              </a:spcBef>
               <a:buNone/>
             </a:pPr>
             <a:r>
               <a:rPr b="1"/>
               <a:t>REST API</a:t>
             </a:r>
-          </a:p>
-          <a:p>
-            <a:pPr lvl="0" indent="0">
-              <a:buNone/>
-            </a:pPr>
-            <a:r>
-              <a:rPr>
-                <a:latin typeface="Courier"/>
-              </a:rPr>
-              <a:t>http://example.com/tasks にアクセス
-→ タスク一覧表示</a:t>
-            </a:r>
-          </a:p>
-          <a:p>
-            <a:pPr lvl="0" indent="0" marL="0">
-              <a:spcBef>
-                <a:spcPts val="3000"/>
-              </a:spcBef>
+            <a:r>
+              <a:rPr/>
+              <a:t> - URLにアクセス - タスク一覧表示</a:t>
+            </a:r>
+          </a:p>
+          <a:p>
+            <a:pPr lvl="0" indent="0" marL="0">
               <a:buNone/>
             </a:pPr>
             <a:r>
               <a:rPr b="1"/>
               <a:t>MCP</a:t>
             </a:r>
-          </a:p>
-          <a:p>
-            <a:pPr lvl="0" indent="0">
-              <a:buNone/>
-            </a:pPr>
-            <a:r>
-              <a:rPr>
-                <a:latin typeface="Courier"/>
-              </a:rPr>
-              <a:t>AI: 「何ができる？」
-→ システム: 「タスク一覧を見れます」
-→ AI: 「見せて」
-→ タスク一覧表示</a:t>
+            <a:r>
+              <a:rPr/>
+              <a:t> - AI: 「何ができる？」 - システム: 「一覧を表示できます」 - タスク一覧表示</a:t>
             </a:r>
           </a:p>
         </p:txBody>
@@ -6170,7 +6298,7 @@
             </a:pPr>
             <a:r>
               <a:rPr/>
-              <a:t>📊 実際の使い方（2/2）</a:t>
+              <a:t>📊 タスクの作成（1/2）</a:t>
             </a:r>
           </a:p>
         </p:txBody>
@@ -6191,21 +6319,6 @@
           <a:lstStyle/>
           <a:p>
             <a:pPr lvl="0" indent="0" marL="0">
-              <a:spcBef>
-                <a:spcPts val="3000"/>
-              </a:spcBef>
-              <a:buNone/>
-            </a:pPr>
-            <a:r>
-              <a:rPr b="1"/>
-              <a:t>新規タスクの作成</a:t>
-            </a:r>
-          </a:p>
-          <a:p>
-            <a:pPr lvl="0" indent="0" marL="0">
-              <a:spcBef>
-                <a:spcPts val="3000"/>
-              </a:spcBef>
               <a:buNone/>
             </a:pPr>
             <a:r>
@@ -6214,41 +6327,17 @@
             </a:r>
           </a:p>
           <a:p>
-            <a:pPr lvl="0" indent="0">
-              <a:buNone/>
-            </a:pPr>
-            <a:r>
-              <a:rPr>
-                <a:latin typeface="Courier"/>
-              </a:rPr>
-              <a:t>POST /tasks に JSONデータ送信
-→ 事前にURLとフォーマットを知る必要がある</a:t>
-            </a:r>
-          </a:p>
-          <a:p>
-            <a:pPr lvl="0" indent="0" marL="0">
-              <a:spcBef>
-                <a:spcPts val="3000"/>
-              </a:spcBef>
-              <a:buNone/>
-            </a:pPr>
-            <a:r>
-              <a:rPr b="1"/>
-              <a:t>MCP</a:t>
-            </a:r>
-          </a:p>
-          <a:p>
-            <a:pPr lvl="0" indent="0">
-              <a:buNone/>
-            </a:pPr>
-            <a:r>
-              <a:rPr>
-                <a:latin typeface="Courier"/>
-              </a:rPr>
-              <a:t>AI: 「どんな操作ができる？」
-→ システム: 「create_taskで作成できます」
-→ AI: 「タスクを作成して」
-→ 作成完了</a:t>
+            <a:pPr lvl="0"/>
+            <a:r>
+              <a:rPr/>
+              <a:t>専用URLにデータ送信</a:t>
+            </a:r>
+          </a:p>
+          <a:p>
+            <a:pPr lvl="0"/>
+            <a:r>
+              <a:rPr/>
+              <a:t>事前に仕様を確認が必要</a:t>
             </a:r>
           </a:p>
         </p:txBody>

</xml_diff>